<commit_message>
added further slide contents for class-2
</commit_message>
<xml_diff>
--- a/class-2-Basic AngularJs/slides/basic angularjs.pptx
+++ b/class-2-Basic AngularJs/slides/basic angularjs.pptx
@@ -4,6 +4,9 @@
   <p:sldMasterIdLst>
     <p:sldMasterId id="2147483648" r:id="rId1"/>
   </p:sldMasterIdLst>
+  <p:notesMasterIdLst>
+    <p:notesMasterId r:id="rId39"/>
+  </p:notesMasterIdLst>
   <p:sldIdLst>
     <p:sldId id="256" r:id="rId2"/>
     <p:sldId id="257" r:id="rId3"/>
@@ -15,6 +18,33 @@
     <p:sldId id="263" r:id="rId9"/>
     <p:sldId id="264" r:id="rId10"/>
     <p:sldId id="265" r:id="rId11"/>
+    <p:sldId id="266" r:id="rId12"/>
+    <p:sldId id="267" r:id="rId13"/>
+    <p:sldId id="269" r:id="rId14"/>
+    <p:sldId id="268" r:id="rId15"/>
+    <p:sldId id="270" r:id="rId16"/>
+    <p:sldId id="271" r:id="rId17"/>
+    <p:sldId id="272" r:id="rId18"/>
+    <p:sldId id="273" r:id="rId19"/>
+    <p:sldId id="274" r:id="rId20"/>
+    <p:sldId id="275" r:id="rId21"/>
+    <p:sldId id="280" r:id="rId22"/>
+    <p:sldId id="277" r:id="rId23"/>
+    <p:sldId id="278" r:id="rId24"/>
+    <p:sldId id="279" r:id="rId25"/>
+    <p:sldId id="281" r:id="rId26"/>
+    <p:sldId id="282" r:id="rId27"/>
+    <p:sldId id="283" r:id="rId28"/>
+    <p:sldId id="284" r:id="rId29"/>
+    <p:sldId id="285" r:id="rId30"/>
+    <p:sldId id="286" r:id="rId31"/>
+    <p:sldId id="287" r:id="rId32"/>
+    <p:sldId id="276" r:id="rId33"/>
+    <p:sldId id="291" r:id="rId34"/>
+    <p:sldId id="288" r:id="rId35"/>
+    <p:sldId id="289" r:id="rId36"/>
+    <p:sldId id="290" r:id="rId37"/>
+    <p:sldId id="293" r:id="rId38"/>
   </p:sldIdLst>
   <p:sldSz cx="9144000" cy="6858000" type="screen4x3"/>
   <p:notesSz cx="6858000" cy="9144000"/>
@@ -116,6 +146,511 @@
 </p:presentation>
 </file>
 
+<file path=ppt/notesMasters/notesMaster1.xml><?xml version="1.0" encoding="utf-8"?>
+<p:notesMaster xmlns:a="http://schemas.openxmlformats.org/drawingml/2006/main" xmlns:r="http://schemas.openxmlformats.org/officeDocument/2006/relationships" xmlns:p="http://schemas.openxmlformats.org/presentationml/2006/main">
+  <p:cSld>
+    <p:bg>
+      <p:bgRef idx="1001">
+        <a:schemeClr val="bg1"/>
+      </p:bgRef>
+    </p:bg>
+    <p:spTree>
+      <p:nvGrpSpPr>
+        <p:cNvPr id="1" name=""/>
+        <p:cNvGrpSpPr/>
+        <p:nvPr/>
+      </p:nvGrpSpPr>
+      <p:grpSpPr>
+        <a:xfrm>
+          <a:off x="0" y="0"/>
+          <a:ext cx="0" cy="0"/>
+          <a:chOff x="0" y="0"/>
+          <a:chExt cx="0" cy="0"/>
+        </a:xfrm>
+      </p:grpSpPr>
+      <p:sp>
+        <p:nvSpPr>
+          <p:cNvPr id="2" name="Header Placeholder 1"/>
+          <p:cNvSpPr>
+            <a:spLocks noGrp="1"/>
+          </p:cNvSpPr>
+          <p:nvPr>
+            <p:ph type="hdr" sz="quarter"/>
+          </p:nvPr>
+        </p:nvSpPr>
+        <p:spPr>
+          <a:xfrm>
+            <a:off x="0" y="0"/>
+            <a:ext cx="2971800" cy="457200"/>
+          </a:xfrm>
+          <a:prstGeom prst="rect">
+            <a:avLst/>
+          </a:prstGeom>
+        </p:spPr>
+        <p:txBody>
+          <a:bodyPr vert="horz" lIns="91440" tIns="45720" rIns="91440" bIns="45720" rtlCol="0"/>
+          <a:lstStyle>
+            <a:lvl1pPr algn="l">
+              <a:defRPr sz="1200"/>
+            </a:lvl1pPr>
+          </a:lstStyle>
+          <a:p>
+            <a:endParaRPr lang="en-US"/>
+          </a:p>
+        </p:txBody>
+      </p:sp>
+      <p:sp>
+        <p:nvSpPr>
+          <p:cNvPr id="3" name="Date Placeholder 2"/>
+          <p:cNvSpPr>
+            <a:spLocks noGrp="1"/>
+          </p:cNvSpPr>
+          <p:nvPr>
+            <p:ph type="dt" idx="1"/>
+          </p:nvPr>
+        </p:nvSpPr>
+        <p:spPr>
+          <a:xfrm>
+            <a:off x="3884613" y="0"/>
+            <a:ext cx="2971800" cy="457200"/>
+          </a:xfrm>
+          <a:prstGeom prst="rect">
+            <a:avLst/>
+          </a:prstGeom>
+        </p:spPr>
+        <p:txBody>
+          <a:bodyPr vert="horz" lIns="91440" tIns="45720" rIns="91440" bIns="45720" rtlCol="0"/>
+          <a:lstStyle>
+            <a:lvl1pPr algn="r">
+              <a:defRPr sz="1200"/>
+            </a:lvl1pPr>
+          </a:lstStyle>
+          <a:p>
+            <a:fld id="{F9C3EE13-C31A-4CAB-97DF-93F46CB008FB}" type="datetimeFigureOut">
+              <a:rPr lang="en-US" smtClean="0"/>
+              <a:t>06-11-14</a:t>
+            </a:fld>
+            <a:endParaRPr lang="en-US"/>
+          </a:p>
+        </p:txBody>
+      </p:sp>
+      <p:sp>
+        <p:nvSpPr>
+          <p:cNvPr id="4" name="Slide Image Placeholder 3"/>
+          <p:cNvSpPr>
+            <a:spLocks noGrp="1" noRot="1" noChangeAspect="1"/>
+          </p:cNvSpPr>
+          <p:nvPr>
+            <p:ph type="sldImg" idx="2"/>
+          </p:nvPr>
+        </p:nvSpPr>
+        <p:spPr>
+          <a:xfrm>
+            <a:off x="1143000" y="685800"/>
+            <a:ext cx="4572000" cy="3429000"/>
+          </a:xfrm>
+          <a:prstGeom prst="rect">
+            <a:avLst/>
+          </a:prstGeom>
+          <a:noFill/>
+          <a:ln w="12700">
+            <a:solidFill>
+              <a:prstClr val="black"/>
+            </a:solidFill>
+          </a:ln>
+        </p:spPr>
+        <p:txBody>
+          <a:bodyPr vert="horz" lIns="91440" tIns="45720" rIns="91440" bIns="45720" rtlCol="0" anchor="ctr"/>
+          <a:lstStyle/>
+          <a:p>
+            <a:endParaRPr lang="en-US"/>
+          </a:p>
+        </p:txBody>
+      </p:sp>
+      <p:sp>
+        <p:nvSpPr>
+          <p:cNvPr id="5" name="Notes Placeholder 4"/>
+          <p:cNvSpPr>
+            <a:spLocks noGrp="1"/>
+          </p:cNvSpPr>
+          <p:nvPr>
+            <p:ph type="body" sz="quarter" idx="3"/>
+          </p:nvPr>
+        </p:nvSpPr>
+        <p:spPr>
+          <a:xfrm>
+            <a:off x="685800" y="4343400"/>
+            <a:ext cx="5486400" cy="4114800"/>
+          </a:xfrm>
+          <a:prstGeom prst="rect">
+            <a:avLst/>
+          </a:prstGeom>
+        </p:spPr>
+        <p:txBody>
+          <a:bodyPr vert="horz" lIns="91440" tIns="45720" rIns="91440" bIns="45720" rtlCol="0">
+            <a:normAutofit/>
+          </a:bodyPr>
+          <a:lstStyle/>
+          <a:p>
+            <a:pPr lvl="0"/>
+            <a:r>
+              <a:rPr lang="en-US" smtClean="0"/>
+              <a:t>Click to edit Master text styles</a:t>
+            </a:r>
+          </a:p>
+          <a:p>
+            <a:pPr lvl="1"/>
+            <a:r>
+              <a:rPr lang="en-US" smtClean="0"/>
+              <a:t>Second level</a:t>
+            </a:r>
+          </a:p>
+          <a:p>
+            <a:pPr lvl="2"/>
+            <a:r>
+              <a:rPr lang="en-US" smtClean="0"/>
+              <a:t>Third level</a:t>
+            </a:r>
+          </a:p>
+          <a:p>
+            <a:pPr lvl="3"/>
+            <a:r>
+              <a:rPr lang="en-US" smtClean="0"/>
+              <a:t>Fourth level</a:t>
+            </a:r>
+          </a:p>
+          <a:p>
+            <a:pPr lvl="4"/>
+            <a:r>
+              <a:rPr lang="en-US" smtClean="0"/>
+              <a:t>Fifth level</a:t>
+            </a:r>
+            <a:endParaRPr lang="en-US"/>
+          </a:p>
+        </p:txBody>
+      </p:sp>
+      <p:sp>
+        <p:nvSpPr>
+          <p:cNvPr id="6" name="Footer Placeholder 5"/>
+          <p:cNvSpPr>
+            <a:spLocks noGrp="1"/>
+          </p:cNvSpPr>
+          <p:nvPr>
+            <p:ph type="ftr" sz="quarter" idx="4"/>
+          </p:nvPr>
+        </p:nvSpPr>
+        <p:spPr>
+          <a:xfrm>
+            <a:off x="0" y="8685213"/>
+            <a:ext cx="2971800" cy="457200"/>
+          </a:xfrm>
+          <a:prstGeom prst="rect">
+            <a:avLst/>
+          </a:prstGeom>
+        </p:spPr>
+        <p:txBody>
+          <a:bodyPr vert="horz" lIns="91440" tIns="45720" rIns="91440" bIns="45720" rtlCol="0" anchor="b"/>
+          <a:lstStyle>
+            <a:lvl1pPr algn="l">
+              <a:defRPr sz="1200"/>
+            </a:lvl1pPr>
+          </a:lstStyle>
+          <a:p>
+            <a:endParaRPr lang="en-US"/>
+          </a:p>
+        </p:txBody>
+      </p:sp>
+      <p:sp>
+        <p:nvSpPr>
+          <p:cNvPr id="7" name="Slide Number Placeholder 6"/>
+          <p:cNvSpPr>
+            <a:spLocks noGrp="1"/>
+          </p:cNvSpPr>
+          <p:nvPr>
+            <p:ph type="sldNum" sz="quarter" idx="5"/>
+          </p:nvPr>
+        </p:nvSpPr>
+        <p:spPr>
+          <a:xfrm>
+            <a:off x="3884613" y="8685213"/>
+            <a:ext cx="2971800" cy="457200"/>
+          </a:xfrm>
+          <a:prstGeom prst="rect">
+            <a:avLst/>
+          </a:prstGeom>
+        </p:spPr>
+        <p:txBody>
+          <a:bodyPr vert="horz" lIns="91440" tIns="45720" rIns="91440" bIns="45720" rtlCol="0" anchor="b"/>
+          <a:lstStyle>
+            <a:lvl1pPr algn="r">
+              <a:defRPr sz="1200"/>
+            </a:lvl1pPr>
+          </a:lstStyle>
+          <a:p>
+            <a:fld id="{A076328B-7173-4E88-B3C4-6611655CCF22}" type="slidenum">
+              <a:rPr lang="en-US" smtClean="0"/>
+              <a:t>‹#›</a:t>
+            </a:fld>
+            <a:endParaRPr lang="en-US"/>
+          </a:p>
+        </p:txBody>
+      </p:sp>
+    </p:spTree>
+  </p:cSld>
+  <p:clrMap bg1="lt1" tx1="dk1" bg2="lt2" tx2="dk2" accent1="accent1" accent2="accent2" accent3="accent3" accent4="accent4" accent5="accent5" accent6="accent6" hlink="hlink" folHlink="folHlink"/>
+  <p:notesStyle>
+    <a:lvl1pPr marL="0" algn="l" defTabSz="914400" rtl="0" eaLnBrk="1" latinLnBrk="0" hangingPunct="1">
+      <a:defRPr sz="1200" kern="1200">
+        <a:solidFill>
+          <a:schemeClr val="tx1"/>
+        </a:solidFill>
+        <a:latin typeface="+mn-lt"/>
+        <a:ea typeface="+mn-ea"/>
+        <a:cs typeface="+mn-cs"/>
+      </a:defRPr>
+    </a:lvl1pPr>
+    <a:lvl2pPr marL="457200" algn="l" defTabSz="914400" rtl="0" eaLnBrk="1" latinLnBrk="0" hangingPunct="1">
+      <a:defRPr sz="1200" kern="1200">
+        <a:solidFill>
+          <a:schemeClr val="tx1"/>
+        </a:solidFill>
+        <a:latin typeface="+mn-lt"/>
+        <a:ea typeface="+mn-ea"/>
+        <a:cs typeface="+mn-cs"/>
+      </a:defRPr>
+    </a:lvl2pPr>
+    <a:lvl3pPr marL="914400" algn="l" defTabSz="914400" rtl="0" eaLnBrk="1" latinLnBrk="0" hangingPunct="1">
+      <a:defRPr sz="1200" kern="1200">
+        <a:solidFill>
+          <a:schemeClr val="tx1"/>
+        </a:solidFill>
+        <a:latin typeface="+mn-lt"/>
+        <a:ea typeface="+mn-ea"/>
+        <a:cs typeface="+mn-cs"/>
+      </a:defRPr>
+    </a:lvl3pPr>
+    <a:lvl4pPr marL="1371600" algn="l" defTabSz="914400" rtl="0" eaLnBrk="1" latinLnBrk="0" hangingPunct="1">
+      <a:defRPr sz="1200" kern="1200">
+        <a:solidFill>
+          <a:schemeClr val="tx1"/>
+        </a:solidFill>
+        <a:latin typeface="+mn-lt"/>
+        <a:ea typeface="+mn-ea"/>
+        <a:cs typeface="+mn-cs"/>
+      </a:defRPr>
+    </a:lvl4pPr>
+    <a:lvl5pPr marL="1828800" algn="l" defTabSz="914400" rtl="0" eaLnBrk="1" latinLnBrk="0" hangingPunct="1">
+      <a:defRPr sz="1200" kern="1200">
+        <a:solidFill>
+          <a:schemeClr val="tx1"/>
+        </a:solidFill>
+        <a:latin typeface="+mn-lt"/>
+        <a:ea typeface="+mn-ea"/>
+        <a:cs typeface="+mn-cs"/>
+      </a:defRPr>
+    </a:lvl5pPr>
+    <a:lvl6pPr marL="2286000" algn="l" defTabSz="914400" rtl="0" eaLnBrk="1" latinLnBrk="0" hangingPunct="1">
+      <a:defRPr sz="1200" kern="1200">
+        <a:solidFill>
+          <a:schemeClr val="tx1"/>
+        </a:solidFill>
+        <a:latin typeface="+mn-lt"/>
+        <a:ea typeface="+mn-ea"/>
+        <a:cs typeface="+mn-cs"/>
+      </a:defRPr>
+    </a:lvl6pPr>
+    <a:lvl7pPr marL="2743200" algn="l" defTabSz="914400" rtl="0" eaLnBrk="1" latinLnBrk="0" hangingPunct="1">
+      <a:defRPr sz="1200" kern="1200">
+        <a:solidFill>
+          <a:schemeClr val="tx1"/>
+        </a:solidFill>
+        <a:latin typeface="+mn-lt"/>
+        <a:ea typeface="+mn-ea"/>
+        <a:cs typeface="+mn-cs"/>
+      </a:defRPr>
+    </a:lvl7pPr>
+    <a:lvl8pPr marL="3200400" algn="l" defTabSz="914400" rtl="0" eaLnBrk="1" latinLnBrk="0" hangingPunct="1">
+      <a:defRPr sz="1200" kern="1200">
+        <a:solidFill>
+          <a:schemeClr val="tx1"/>
+        </a:solidFill>
+        <a:latin typeface="+mn-lt"/>
+        <a:ea typeface="+mn-ea"/>
+        <a:cs typeface="+mn-cs"/>
+      </a:defRPr>
+    </a:lvl8pPr>
+    <a:lvl9pPr marL="3657600" algn="l" defTabSz="914400" rtl="0" eaLnBrk="1" latinLnBrk="0" hangingPunct="1">
+      <a:defRPr sz="1200" kern="1200">
+        <a:solidFill>
+          <a:schemeClr val="tx1"/>
+        </a:solidFill>
+        <a:latin typeface="+mn-lt"/>
+        <a:ea typeface="+mn-ea"/>
+        <a:cs typeface="+mn-cs"/>
+      </a:defRPr>
+    </a:lvl9pPr>
+  </p:notesStyle>
+</p:notesMaster>
+</file>
+
+<file path=ppt/notesSlides/notesSlide1.xml><?xml version="1.0" encoding="utf-8"?>
+<p:notes xmlns:a="http://schemas.openxmlformats.org/drawingml/2006/main" xmlns:r="http://schemas.openxmlformats.org/officeDocument/2006/relationships" xmlns:p="http://schemas.openxmlformats.org/presentationml/2006/main">
+  <p:cSld>
+    <p:spTree>
+      <p:nvGrpSpPr>
+        <p:cNvPr id="1" name=""/>
+        <p:cNvGrpSpPr/>
+        <p:nvPr/>
+      </p:nvGrpSpPr>
+      <p:grpSpPr>
+        <a:xfrm>
+          <a:off x="0" y="0"/>
+          <a:ext cx="0" cy="0"/>
+          <a:chOff x="0" y="0"/>
+          <a:chExt cx="0" cy="0"/>
+        </a:xfrm>
+      </p:grpSpPr>
+      <p:sp>
+        <p:nvSpPr>
+          <p:cNvPr id="2" name="Slide Image Placeholder 1"/>
+          <p:cNvSpPr>
+            <a:spLocks noGrp="1" noRot="1" noChangeAspect="1"/>
+          </p:cNvSpPr>
+          <p:nvPr>
+            <p:ph type="sldImg"/>
+          </p:nvPr>
+        </p:nvSpPr>
+        <p:spPr/>
+      </p:sp>
+      <p:sp>
+        <p:nvSpPr>
+          <p:cNvPr id="3" name="Notes Placeholder 2"/>
+          <p:cNvSpPr>
+            <a:spLocks noGrp="1"/>
+          </p:cNvSpPr>
+          <p:nvPr>
+            <p:ph type="body" idx="1"/>
+          </p:nvPr>
+        </p:nvSpPr>
+        <p:spPr/>
+        <p:txBody>
+          <a:bodyPr>
+            <a:normAutofit/>
+          </a:bodyPr>
+          <a:lstStyle/>
+          <a:p>
+            <a:r>
+              <a:rPr lang="en-US" sz="1200" b="0" i="0" kern="1200" dirty="0" smtClean="0">
+                <a:solidFill>
+                  <a:schemeClr val="tx1"/>
+                </a:solidFill>
+                <a:latin typeface="+mn-lt"/>
+                <a:ea typeface="+mn-ea"/>
+                <a:cs typeface="+mn-cs"/>
+              </a:rPr>
+              <a:t>The browser's event-loop waits for an event to arrive. The event's callback gets executed... Once the callback executes, the browser leaves the JavaScript context and re-renders the view based on DOM changes. Angular modifies the normal JavaScript flow by providing its own event processing loop. This splits the JavaScript into classical and Angular execution context... Angular executes [some] </a:t>
+            </a:r>
+            <a:r>
+              <a:rPr lang="en-US" sz="1200" b="0" i="0" kern="1200" dirty="0" err="1" smtClean="0">
+                <a:solidFill>
+                  <a:schemeClr val="tx1"/>
+                </a:solidFill>
+                <a:latin typeface="+mn-lt"/>
+                <a:ea typeface="+mn-ea"/>
+                <a:cs typeface="+mn-cs"/>
+              </a:rPr>
+              <a:t>stimulusFn</a:t>
+            </a:r>
+            <a:r>
+              <a:rPr lang="en-US" sz="1200" b="0" i="0" kern="1200" dirty="0" smtClean="0">
+                <a:solidFill>
+                  <a:schemeClr val="tx1"/>
+                </a:solidFill>
+                <a:latin typeface="+mn-lt"/>
+                <a:ea typeface="+mn-ea"/>
+                <a:cs typeface="+mn-cs"/>
+              </a:rPr>
+              <a:t>(), which typically modifies application state. Angular enters the $digest loop. The loop is made up of two smaller loops which process $</a:t>
+            </a:r>
+            <a:r>
+              <a:rPr lang="en-US" sz="1200" b="0" i="0" kern="1200" dirty="0" err="1" smtClean="0">
+                <a:solidFill>
+                  <a:schemeClr val="tx1"/>
+                </a:solidFill>
+                <a:latin typeface="+mn-lt"/>
+                <a:ea typeface="+mn-ea"/>
+                <a:cs typeface="+mn-cs"/>
+              </a:rPr>
+              <a:t>evalAsync</a:t>
+            </a:r>
+            <a:r>
+              <a:rPr lang="en-US" sz="1200" b="0" i="0" kern="1200" dirty="0" smtClean="0">
+                <a:solidFill>
+                  <a:schemeClr val="tx1"/>
+                </a:solidFill>
+                <a:latin typeface="+mn-lt"/>
+                <a:ea typeface="+mn-ea"/>
+                <a:cs typeface="+mn-cs"/>
+              </a:rPr>
+              <a:t> queue and the $watch list. The $digest loop keeps iterating until the model stabilizes, which means that the $</a:t>
+            </a:r>
+            <a:r>
+              <a:rPr lang="en-US" sz="1200" b="0" i="0" kern="1200" dirty="0" err="1" smtClean="0">
+                <a:solidFill>
+                  <a:schemeClr val="tx1"/>
+                </a:solidFill>
+                <a:latin typeface="+mn-lt"/>
+                <a:ea typeface="+mn-ea"/>
+                <a:cs typeface="+mn-cs"/>
+              </a:rPr>
+              <a:t>evalAsync</a:t>
+            </a:r>
+            <a:r>
+              <a:rPr lang="en-US" sz="1200" b="0" i="0" kern="1200" dirty="0" smtClean="0">
+                <a:solidFill>
+                  <a:schemeClr val="tx1"/>
+                </a:solidFill>
+                <a:latin typeface="+mn-lt"/>
+                <a:ea typeface="+mn-ea"/>
+                <a:cs typeface="+mn-cs"/>
+              </a:rPr>
+              <a:t> queue is empty and the $watch list does not detect any changes. The $watch list is a set of expressions which may have changed since last iteration. If a change is detected then the $watch function is called which typically updates the DOM with the new value.</a:t>
+            </a:r>
+            <a:endParaRPr lang="en-US" dirty="0"/>
+          </a:p>
+        </p:txBody>
+      </p:sp>
+      <p:sp>
+        <p:nvSpPr>
+          <p:cNvPr id="4" name="Slide Number Placeholder 3"/>
+          <p:cNvSpPr>
+            <a:spLocks noGrp="1"/>
+          </p:cNvSpPr>
+          <p:nvPr>
+            <p:ph type="sldNum" sz="quarter" idx="10"/>
+          </p:nvPr>
+        </p:nvSpPr>
+        <p:spPr/>
+        <p:txBody>
+          <a:bodyPr/>
+          <a:lstStyle/>
+          <a:p>
+            <a:fld id="{A076328B-7173-4E88-B3C4-6611655CCF22}" type="slidenum">
+              <a:rPr lang="en-US" smtClean="0"/>
+              <a:t>16</a:t>
+            </a:fld>
+            <a:endParaRPr lang="en-US"/>
+          </a:p>
+        </p:txBody>
+      </p:sp>
+    </p:spTree>
+  </p:cSld>
+  <p:clrMapOvr>
+    <a:masterClrMapping/>
+  </p:clrMapOvr>
+</p:notes>
+</file>
+
 <file path=ppt/slideLayouts/slideLayout1.xml><?xml version="1.0" encoding="utf-8"?>
 <p:sldLayout xmlns:a="http://schemas.openxmlformats.org/drawingml/2006/main" xmlns:r="http://schemas.openxmlformats.org/officeDocument/2006/relationships" xmlns:p="http://schemas.openxmlformats.org/presentationml/2006/main" type="title" preserve="1">
   <p:cSld name="Title Slide">
@@ -298,7 +833,7 @@
             <a:fld id="{1D8BD707-D9CF-40AE-B4C6-C98DA3205C09}" type="datetimeFigureOut">
               <a:rPr lang="en-US" smtClean="0"/>
               <a:pPr/>
-              <a:t>11/5/2014</a:t>
+              <a:t>06-11-14</a:t>
             </a:fld>
             <a:endParaRPr lang="en-US"/>
           </a:p>
@@ -465,7 +1000,7 @@
             <a:fld id="{1D8BD707-D9CF-40AE-B4C6-C98DA3205C09}" type="datetimeFigureOut">
               <a:rPr lang="en-US" smtClean="0"/>
               <a:pPr/>
-              <a:t>11/5/2014</a:t>
+              <a:t>06-11-14</a:t>
             </a:fld>
             <a:endParaRPr lang="en-US"/>
           </a:p>
@@ -642,7 +1177,7 @@
             <a:fld id="{1D8BD707-D9CF-40AE-B4C6-C98DA3205C09}" type="datetimeFigureOut">
               <a:rPr lang="en-US" smtClean="0"/>
               <a:pPr/>
-              <a:t>11/5/2014</a:t>
+              <a:t>06-11-14</a:t>
             </a:fld>
             <a:endParaRPr lang="en-US"/>
           </a:p>
@@ -809,7 +1344,7 @@
             <a:fld id="{1D8BD707-D9CF-40AE-B4C6-C98DA3205C09}" type="datetimeFigureOut">
               <a:rPr lang="en-US" smtClean="0"/>
               <a:pPr/>
-              <a:t>11/5/2014</a:t>
+              <a:t>06-11-14</a:t>
             </a:fld>
             <a:endParaRPr lang="en-US"/>
           </a:p>
@@ -1052,7 +1587,7 @@
             <a:fld id="{1D8BD707-D9CF-40AE-B4C6-C98DA3205C09}" type="datetimeFigureOut">
               <a:rPr lang="en-US" smtClean="0"/>
               <a:pPr/>
-              <a:t>11/5/2014</a:t>
+              <a:t>06-11-14</a:t>
             </a:fld>
             <a:endParaRPr lang="en-US"/>
           </a:p>
@@ -1337,7 +1872,7 @@
             <a:fld id="{1D8BD707-D9CF-40AE-B4C6-C98DA3205C09}" type="datetimeFigureOut">
               <a:rPr lang="en-US" smtClean="0"/>
               <a:pPr/>
-              <a:t>11/5/2014</a:t>
+              <a:t>06-11-14</a:t>
             </a:fld>
             <a:endParaRPr lang="en-US"/>
           </a:p>
@@ -1756,7 +2291,7 @@
             <a:fld id="{1D8BD707-D9CF-40AE-B4C6-C98DA3205C09}" type="datetimeFigureOut">
               <a:rPr lang="en-US" smtClean="0"/>
               <a:pPr/>
-              <a:t>11/5/2014</a:t>
+              <a:t>06-11-14</a:t>
             </a:fld>
             <a:endParaRPr lang="en-US"/>
           </a:p>
@@ -1871,7 +2406,7 @@
             <a:fld id="{1D8BD707-D9CF-40AE-B4C6-C98DA3205C09}" type="datetimeFigureOut">
               <a:rPr lang="en-US" smtClean="0"/>
               <a:pPr/>
-              <a:t>11/5/2014</a:t>
+              <a:t>06-11-14</a:t>
             </a:fld>
             <a:endParaRPr lang="en-US"/>
           </a:p>
@@ -1963,7 +2498,7 @@
             <a:fld id="{1D8BD707-D9CF-40AE-B4C6-C98DA3205C09}" type="datetimeFigureOut">
               <a:rPr lang="en-US" smtClean="0"/>
               <a:pPr/>
-              <a:t>11/5/2014</a:t>
+              <a:t>06-11-14</a:t>
             </a:fld>
             <a:endParaRPr lang="en-US"/>
           </a:p>
@@ -2237,7 +2772,7 @@
             <a:fld id="{1D8BD707-D9CF-40AE-B4C6-C98DA3205C09}" type="datetimeFigureOut">
               <a:rPr lang="en-US" smtClean="0"/>
               <a:pPr/>
-              <a:t>11/5/2014</a:t>
+              <a:t>06-11-14</a:t>
             </a:fld>
             <a:endParaRPr lang="en-US"/>
           </a:p>
@@ -2487,7 +3022,7 @@
             <a:fld id="{1D8BD707-D9CF-40AE-B4C6-C98DA3205C09}" type="datetimeFigureOut">
               <a:rPr lang="en-US" smtClean="0"/>
               <a:pPr/>
-              <a:t>11/5/2014</a:t>
+              <a:t>06-11-14</a:t>
             </a:fld>
             <a:endParaRPr lang="en-US"/>
           </a:p>
@@ -2697,7 +3232,7 @@
             <a:fld id="{1D8BD707-D9CF-40AE-B4C6-C98DA3205C09}" type="datetimeFigureOut">
               <a:rPr lang="en-US" smtClean="0"/>
               <a:pPr/>
-              <a:t>11/5/2014</a:t>
+              <a:t>06-11-14</a:t>
             </a:fld>
             <a:endParaRPr lang="en-US"/>
           </a:p>
@@ -3147,7 +3682,7 @@
     </p:spTree>
     <p:extLst>
       <p:ext uri="{BB962C8B-B14F-4D97-AF65-F5344CB8AC3E}">
-        <p14:creationId xmlns:p14="http://schemas.microsoft.com/office/powerpoint/2010/main" val="582859480"/>
+        <p14:creationId xmlns:p14="http://schemas.microsoft.com/office/powerpoint/2010/main" xmlns="" val="582859480"/>
       </p:ext>
     </p:extLst>
   </p:cSld>
@@ -3191,7 +3726,15 @@
           <a:p>
             <a:r>
               <a:rPr lang="en-US" dirty="0" smtClean="0"/>
-              <a:t>What is Angular anyway ?</a:t>
+              <a:t>Think in </a:t>
+            </a:r>
+            <a:r>
+              <a:rPr lang="en-US" dirty="0" err="1" smtClean="0"/>
+              <a:t>AngularJs</a:t>
+            </a:r>
+            <a:r>
+              <a:rPr lang="en-US" dirty="0" smtClean="0"/>
+              <a:t> !</a:t>
             </a:r>
             <a:endParaRPr lang="en-US" dirty="0"/>
           </a:p>
@@ -3212,6 +3755,80 @@
           <a:bodyPr/>
           <a:lstStyle/>
           <a:p>
+            <a:r>
+              <a:rPr lang="en-US" dirty="0" smtClean="0"/>
+              <a:t>Architect your application instead of design a page</a:t>
+            </a:r>
+          </a:p>
+          <a:p>
+            <a:r>
+              <a:rPr lang="en-US" dirty="0" smtClean="0"/>
+              <a:t>Don’t augment </a:t>
+            </a:r>
+            <a:r>
+              <a:rPr lang="en-US" dirty="0" err="1" smtClean="0"/>
+              <a:t>jQuery</a:t>
+            </a:r>
+            <a:r>
+              <a:rPr lang="en-US" dirty="0" smtClean="0"/>
+              <a:t> with </a:t>
+            </a:r>
+            <a:r>
+              <a:rPr lang="en-US" dirty="0" err="1" smtClean="0"/>
+              <a:t>AngularJs</a:t>
+            </a:r>
+            <a:endParaRPr lang="en-US" dirty="0" smtClean="0"/>
+          </a:p>
+          <a:p>
+            <a:r>
+              <a:rPr lang="en-US" dirty="0" smtClean="0"/>
+              <a:t>Always think in terms of Architecture</a:t>
+            </a:r>
+          </a:p>
+          <a:p>
+            <a:pPr lvl="1"/>
+            <a:r>
+              <a:rPr lang="en-US" dirty="0" smtClean="0"/>
+              <a:t>What is Single Page Application</a:t>
+            </a:r>
+          </a:p>
+          <a:p>
+            <a:pPr lvl="2"/>
+            <a:r>
+              <a:rPr lang="en-US" dirty="0" smtClean="0"/>
+              <a:t>This is application not just bunch of web pages !!</a:t>
+            </a:r>
+            <a:endParaRPr lang="en-US" dirty="0"/>
+          </a:p>
+        </p:txBody>
+      </p:sp>
+      <p:sp>
+        <p:nvSpPr>
+          <p:cNvPr id="4" name="Rectangle 3"/>
+          <p:cNvSpPr/>
+          <p:nvPr/>
+        </p:nvSpPr>
+        <p:spPr>
+          <a:xfrm>
+            <a:off x="0" y="6211669"/>
+            <a:ext cx="9144000" cy="646331"/>
+          </a:xfrm>
+          <a:prstGeom prst="rect">
+            <a:avLst/>
+          </a:prstGeom>
+        </p:spPr>
+        <p:txBody>
+          <a:bodyPr wrap="square">
+            <a:spAutoFit/>
+          </a:bodyPr>
+          <a:lstStyle/>
+          <a:p>
+            <a:r>
+              <a:rPr lang="en-US" dirty="0" smtClean="0">
+                <a:hlinkClick r:id="rId2"/>
+              </a:rPr>
+              <a:t>http://stackoverflow.com/questions/14994391/thinking-in-angularjs-if-i-have-a-jquery-background?lq=1</a:t>
+            </a:r>
             <a:endParaRPr lang="en-US" dirty="0"/>
           </a:p>
         </p:txBody>
@@ -3219,9 +3836,1701 @@
     </p:spTree>
     <p:extLst>
       <p:ext uri="{BB962C8B-B14F-4D97-AF65-F5344CB8AC3E}">
-        <p14:creationId xmlns:p14="http://schemas.microsoft.com/office/powerpoint/2010/main" val="603966949"/>
+        <p14:creationId xmlns:p14="http://schemas.microsoft.com/office/powerpoint/2010/main" xmlns="" val="603966949"/>
       </p:ext>
     </p:extLst>
+  </p:cSld>
+  <p:clrMapOvr>
+    <a:masterClrMapping/>
+  </p:clrMapOvr>
+</p:sld>
+</file>
+
+<file path=ppt/slides/slide11.xml><?xml version="1.0" encoding="utf-8"?>
+<p:sld xmlns:a="http://schemas.openxmlformats.org/drawingml/2006/main" xmlns:r="http://schemas.openxmlformats.org/officeDocument/2006/relationships" xmlns:p="http://schemas.openxmlformats.org/presentationml/2006/main">
+  <p:cSld>
+    <p:spTree>
+      <p:nvGrpSpPr>
+        <p:cNvPr id="1" name=""/>
+        <p:cNvGrpSpPr/>
+        <p:nvPr/>
+      </p:nvGrpSpPr>
+      <p:grpSpPr>
+        <a:xfrm>
+          <a:off x="0" y="0"/>
+          <a:ext cx="0" cy="0"/>
+          <a:chOff x="0" y="0"/>
+          <a:chExt cx="0" cy="0"/>
+        </a:xfrm>
+      </p:grpSpPr>
+      <p:sp>
+        <p:nvSpPr>
+          <p:cNvPr id="2" name="Title 1"/>
+          <p:cNvSpPr>
+            <a:spLocks noGrp="1"/>
+          </p:cNvSpPr>
+          <p:nvPr>
+            <p:ph type="title"/>
+          </p:nvPr>
+        </p:nvSpPr>
+        <p:spPr/>
+        <p:txBody>
+          <a:bodyPr/>
+          <a:lstStyle/>
+          <a:p>
+            <a:r>
+              <a:rPr lang="en-US" dirty="0" smtClean="0"/>
+              <a:t>Think in </a:t>
+            </a:r>
+            <a:r>
+              <a:rPr lang="en-US" dirty="0" err="1" smtClean="0"/>
+              <a:t>AngularJs</a:t>
+            </a:r>
+            <a:r>
+              <a:rPr lang="en-US" dirty="0" smtClean="0"/>
+              <a:t> !</a:t>
+            </a:r>
+            <a:endParaRPr lang="en-US" dirty="0"/>
+          </a:p>
+        </p:txBody>
+      </p:sp>
+      <p:sp>
+        <p:nvSpPr>
+          <p:cNvPr id="3" name="Content Placeholder 2"/>
+          <p:cNvSpPr>
+            <a:spLocks noGrp="1"/>
+          </p:cNvSpPr>
+          <p:nvPr>
+            <p:ph idx="1"/>
+          </p:nvPr>
+        </p:nvSpPr>
+        <p:spPr/>
+        <p:txBody>
+          <a:bodyPr/>
+          <a:lstStyle/>
+          <a:p>
+            <a:r>
+              <a:rPr lang="en-US" dirty="0" smtClean="0"/>
+              <a:t>Look at the view</a:t>
+            </a:r>
+          </a:p>
+          <a:p>
+            <a:pPr lvl="1"/>
+            <a:r>
+              <a:rPr lang="en-US" dirty="0" smtClean="0"/>
+              <a:t>In </a:t>
+            </a:r>
+            <a:r>
+              <a:rPr lang="en-US" dirty="0" err="1" smtClean="0"/>
+              <a:t>jQuery</a:t>
+            </a:r>
+            <a:endParaRPr lang="en-US" dirty="0" smtClean="0"/>
+          </a:p>
+          <a:p>
+            <a:pPr lvl="1">
+              <a:buNone/>
+            </a:pPr>
+            <a:r>
+              <a:rPr lang="en-US" dirty="0" smtClean="0">
+                <a:solidFill>
+                  <a:srgbClr val="800000"/>
+                </a:solidFill>
+              </a:rPr>
+              <a:t>&lt;</a:t>
+            </a:r>
+            <a:r>
+              <a:rPr lang="en-US" dirty="0" err="1" smtClean="0">
+                <a:solidFill>
+                  <a:srgbClr val="800000"/>
+                </a:solidFill>
+              </a:rPr>
+              <a:t>ul</a:t>
+            </a:r>
+            <a:r>
+              <a:rPr lang="en-US" dirty="0" smtClean="0">
+                <a:solidFill>
+                  <a:srgbClr val="000000"/>
+                </a:solidFill>
+              </a:rPr>
+              <a:t> </a:t>
+            </a:r>
+            <a:r>
+              <a:rPr lang="en-US" dirty="0" smtClean="0">
+                <a:solidFill>
+                  <a:srgbClr val="FF0000"/>
+                </a:solidFill>
+              </a:rPr>
+              <a:t>class</a:t>
+            </a:r>
+            <a:r>
+              <a:rPr lang="en-US" dirty="0" smtClean="0">
+                <a:solidFill>
+                  <a:srgbClr val="000000"/>
+                </a:solidFill>
+              </a:rPr>
+              <a:t>=</a:t>
+            </a:r>
+            <a:r>
+              <a:rPr lang="en-US" dirty="0" smtClean="0">
+                <a:solidFill>
+                  <a:srgbClr val="0000FF"/>
+                </a:solidFill>
+              </a:rPr>
+              <a:t>"main-menu"</a:t>
+            </a:r>
+            <a:r>
+              <a:rPr lang="en-US" dirty="0" smtClean="0">
+                <a:solidFill>
+                  <a:srgbClr val="800000"/>
+                </a:solidFill>
+              </a:rPr>
+              <a:t>&gt;</a:t>
+            </a:r>
+            <a:r>
+              <a:rPr lang="en-US" dirty="0" smtClean="0">
+                <a:solidFill>
+                  <a:srgbClr val="000000"/>
+                </a:solidFill>
+              </a:rPr>
+              <a:t> </a:t>
+            </a:r>
+            <a:endParaRPr lang="en-US" dirty="0" smtClean="0">
+              <a:solidFill>
+                <a:srgbClr val="000000"/>
+              </a:solidFill>
+            </a:endParaRPr>
+          </a:p>
+          <a:p>
+            <a:pPr lvl="1">
+              <a:buNone/>
+            </a:pPr>
+            <a:r>
+              <a:rPr lang="en-US" dirty="0" smtClean="0">
+                <a:solidFill>
+                  <a:srgbClr val="000000"/>
+                </a:solidFill>
+              </a:rPr>
+              <a:t>	</a:t>
+            </a:r>
+            <a:r>
+              <a:rPr lang="en-US" dirty="0" smtClean="0">
+                <a:solidFill>
+                  <a:srgbClr val="800000"/>
+                </a:solidFill>
+              </a:rPr>
+              <a:t>&lt;</a:t>
+            </a:r>
+            <a:r>
+              <a:rPr lang="en-US" dirty="0" err="1" smtClean="0">
+                <a:solidFill>
+                  <a:srgbClr val="800000"/>
+                </a:solidFill>
+              </a:rPr>
+              <a:t>li</a:t>
+            </a:r>
+            <a:r>
+              <a:rPr lang="en-US" dirty="0" smtClean="0">
+                <a:solidFill>
+                  <a:srgbClr val="000000"/>
+                </a:solidFill>
+              </a:rPr>
+              <a:t> </a:t>
+            </a:r>
+            <a:r>
+              <a:rPr lang="en-US" dirty="0" smtClean="0">
+                <a:solidFill>
+                  <a:srgbClr val="FF0000"/>
+                </a:solidFill>
+              </a:rPr>
+              <a:t>class</a:t>
+            </a:r>
+            <a:r>
+              <a:rPr lang="en-US" dirty="0" smtClean="0">
+                <a:solidFill>
+                  <a:srgbClr val="000000"/>
+                </a:solidFill>
+              </a:rPr>
+              <a:t>=</a:t>
+            </a:r>
+            <a:r>
+              <a:rPr lang="en-US" dirty="0" smtClean="0">
+                <a:solidFill>
+                  <a:srgbClr val="0000FF"/>
+                </a:solidFill>
+              </a:rPr>
+              <a:t>"active"</a:t>
+            </a:r>
+            <a:r>
+              <a:rPr lang="en-US" dirty="0" smtClean="0">
+                <a:solidFill>
+                  <a:srgbClr val="800000"/>
+                </a:solidFill>
+              </a:rPr>
+              <a:t>&gt;</a:t>
+            </a:r>
+            <a:r>
+              <a:rPr lang="en-US" dirty="0" smtClean="0">
+                <a:solidFill>
+                  <a:srgbClr val="000000"/>
+                </a:solidFill>
+              </a:rPr>
+              <a:t> </a:t>
+            </a:r>
+            <a:endParaRPr lang="en-US" dirty="0" smtClean="0">
+              <a:solidFill>
+                <a:srgbClr val="000000"/>
+              </a:solidFill>
+            </a:endParaRPr>
+          </a:p>
+          <a:p>
+            <a:pPr lvl="1">
+              <a:buNone/>
+            </a:pPr>
+            <a:r>
+              <a:rPr lang="en-US" dirty="0" smtClean="0">
+                <a:solidFill>
+                  <a:srgbClr val="000000"/>
+                </a:solidFill>
+              </a:rPr>
+              <a:t>	</a:t>
+            </a:r>
+            <a:r>
+              <a:rPr lang="en-US" dirty="0" smtClean="0">
+                <a:solidFill>
+                  <a:srgbClr val="000000"/>
+                </a:solidFill>
+              </a:rPr>
+              <a:t>	</a:t>
+            </a:r>
+            <a:r>
+              <a:rPr lang="en-US" dirty="0" smtClean="0">
+                <a:solidFill>
+                  <a:srgbClr val="800000"/>
+                </a:solidFill>
+              </a:rPr>
+              <a:t>&lt;</a:t>
+            </a:r>
+            <a:r>
+              <a:rPr lang="en-US" dirty="0" smtClean="0">
+                <a:solidFill>
+                  <a:srgbClr val="800000"/>
+                </a:solidFill>
+              </a:rPr>
+              <a:t>a</a:t>
+            </a:r>
+            <a:r>
+              <a:rPr lang="en-US" dirty="0" smtClean="0">
+                <a:solidFill>
+                  <a:srgbClr val="000000"/>
+                </a:solidFill>
+              </a:rPr>
+              <a:t> </a:t>
+            </a:r>
+            <a:r>
+              <a:rPr lang="en-US" dirty="0" err="1" smtClean="0">
+                <a:solidFill>
+                  <a:srgbClr val="FF0000"/>
+                </a:solidFill>
+              </a:rPr>
+              <a:t>href</a:t>
+            </a:r>
+            <a:r>
+              <a:rPr lang="en-US" dirty="0" smtClean="0">
+                <a:solidFill>
+                  <a:srgbClr val="000000"/>
+                </a:solidFill>
+              </a:rPr>
+              <a:t>=</a:t>
+            </a:r>
+            <a:r>
+              <a:rPr lang="en-US" dirty="0" smtClean="0">
+                <a:solidFill>
+                  <a:srgbClr val="0000FF"/>
+                </a:solidFill>
+              </a:rPr>
+              <a:t>"#/home"</a:t>
+            </a:r>
+            <a:r>
+              <a:rPr lang="en-US" dirty="0" smtClean="0">
+                <a:solidFill>
+                  <a:srgbClr val="800000"/>
+                </a:solidFill>
+              </a:rPr>
+              <a:t>&gt;</a:t>
+            </a:r>
+            <a:r>
+              <a:rPr lang="en-US" dirty="0" smtClean="0">
+                <a:solidFill>
+                  <a:srgbClr val="000000"/>
+                </a:solidFill>
+              </a:rPr>
+              <a:t>Home</a:t>
+            </a:r>
+            <a:r>
+              <a:rPr lang="en-US" dirty="0" smtClean="0">
+                <a:solidFill>
+                  <a:srgbClr val="800000"/>
+                </a:solidFill>
+              </a:rPr>
+              <a:t>&lt;/a&gt;</a:t>
+            </a:r>
+            <a:r>
+              <a:rPr lang="en-US" dirty="0" smtClean="0">
+                <a:solidFill>
+                  <a:srgbClr val="000000"/>
+                </a:solidFill>
+              </a:rPr>
+              <a:t> </a:t>
+            </a:r>
+            <a:endParaRPr lang="en-US" dirty="0" smtClean="0">
+              <a:solidFill>
+                <a:srgbClr val="000000"/>
+              </a:solidFill>
+            </a:endParaRPr>
+          </a:p>
+          <a:p>
+            <a:pPr lvl="1">
+              <a:buNone/>
+            </a:pPr>
+            <a:r>
+              <a:rPr lang="en-US" dirty="0" smtClean="0">
+                <a:solidFill>
+                  <a:srgbClr val="000000"/>
+                </a:solidFill>
+              </a:rPr>
+              <a:t>	</a:t>
+            </a:r>
+            <a:r>
+              <a:rPr lang="en-US" dirty="0" smtClean="0">
+                <a:solidFill>
+                  <a:srgbClr val="800000"/>
+                </a:solidFill>
+              </a:rPr>
+              <a:t>&lt;/</a:t>
+            </a:r>
+            <a:r>
+              <a:rPr lang="en-US" dirty="0" err="1" smtClean="0">
+                <a:solidFill>
+                  <a:srgbClr val="800000"/>
+                </a:solidFill>
+              </a:rPr>
+              <a:t>li</a:t>
+            </a:r>
+            <a:r>
+              <a:rPr lang="en-US" dirty="0" smtClean="0">
+                <a:solidFill>
+                  <a:srgbClr val="800000"/>
+                </a:solidFill>
+              </a:rPr>
+              <a:t>&gt;</a:t>
+            </a:r>
+          </a:p>
+          <a:p>
+            <a:pPr lvl="1">
+              <a:buNone/>
+            </a:pPr>
+            <a:r>
+              <a:rPr lang="en-US" dirty="0" smtClean="0">
+                <a:solidFill>
+                  <a:srgbClr val="800000"/>
+                </a:solidFill>
+              </a:rPr>
+              <a:t>&lt;</a:t>
+            </a:r>
+            <a:r>
+              <a:rPr lang="en-US" dirty="0" err="1" smtClean="0">
+                <a:solidFill>
+                  <a:srgbClr val="800000"/>
+                </a:solidFill>
+              </a:rPr>
+              <a:t>ul</a:t>
+            </a:r>
+            <a:r>
+              <a:rPr lang="en-US" dirty="0" smtClean="0">
+                <a:solidFill>
+                  <a:srgbClr val="800000"/>
+                </a:solidFill>
+              </a:rPr>
+              <a:t>&gt;</a:t>
+            </a:r>
+          </a:p>
+          <a:p>
+            <a:pPr lvl="1">
+              <a:buNone/>
+            </a:pPr>
+            <a:r>
+              <a:rPr lang="en-US" dirty="0" smtClean="0">
+                <a:solidFill>
+                  <a:srgbClr val="000000"/>
+                </a:solidFill>
+              </a:rPr>
+              <a:t>$(</a:t>
+            </a:r>
+            <a:r>
+              <a:rPr lang="en-US" dirty="0" smtClean="0">
+                <a:solidFill>
+                  <a:srgbClr val="800000"/>
+                </a:solidFill>
+              </a:rPr>
+              <a:t>'.main-menu'</a:t>
+            </a:r>
+            <a:r>
+              <a:rPr lang="en-US" dirty="0" smtClean="0">
+                <a:solidFill>
+                  <a:srgbClr val="000000"/>
+                </a:solidFill>
+              </a:rPr>
+              <a:t>).</a:t>
+            </a:r>
+            <a:r>
+              <a:rPr lang="en-US" dirty="0" err="1" smtClean="0">
+                <a:solidFill>
+                  <a:srgbClr val="000000"/>
+                </a:solidFill>
+              </a:rPr>
+              <a:t>dropdownMenu</a:t>
+            </a:r>
+            <a:r>
+              <a:rPr lang="en-US" dirty="0" smtClean="0">
+                <a:solidFill>
+                  <a:srgbClr val="000000"/>
+                </a:solidFill>
+              </a:rPr>
+              <a:t>();</a:t>
+            </a:r>
+            <a:endParaRPr lang="en-US" dirty="0"/>
+          </a:p>
+        </p:txBody>
+      </p:sp>
+    </p:spTree>
+  </p:cSld>
+  <p:clrMapOvr>
+    <a:masterClrMapping/>
+  </p:clrMapOvr>
+</p:sld>
+</file>
+
+<file path=ppt/slides/slide12.xml><?xml version="1.0" encoding="utf-8"?>
+<p:sld xmlns:a="http://schemas.openxmlformats.org/drawingml/2006/main" xmlns:r="http://schemas.openxmlformats.org/officeDocument/2006/relationships" xmlns:p="http://schemas.openxmlformats.org/presentationml/2006/main">
+  <p:cSld>
+    <p:spTree>
+      <p:nvGrpSpPr>
+        <p:cNvPr id="1" name=""/>
+        <p:cNvGrpSpPr/>
+        <p:nvPr/>
+      </p:nvGrpSpPr>
+      <p:grpSpPr>
+        <a:xfrm>
+          <a:off x="0" y="0"/>
+          <a:ext cx="0" cy="0"/>
+          <a:chOff x="0" y="0"/>
+          <a:chExt cx="0" cy="0"/>
+        </a:xfrm>
+      </p:grpSpPr>
+      <p:sp>
+        <p:nvSpPr>
+          <p:cNvPr id="2" name="Title 1"/>
+          <p:cNvSpPr>
+            <a:spLocks noGrp="1"/>
+          </p:cNvSpPr>
+          <p:nvPr>
+            <p:ph type="title"/>
+          </p:nvPr>
+        </p:nvSpPr>
+        <p:spPr/>
+        <p:txBody>
+          <a:bodyPr/>
+          <a:lstStyle/>
+          <a:p>
+            <a:r>
+              <a:rPr lang="en-US" dirty="0" smtClean="0"/>
+              <a:t>Think in </a:t>
+            </a:r>
+            <a:r>
+              <a:rPr lang="en-US" dirty="0" err="1" smtClean="0"/>
+              <a:t>AngularJs</a:t>
+            </a:r>
+            <a:r>
+              <a:rPr lang="en-US" dirty="0" smtClean="0"/>
+              <a:t> !</a:t>
+            </a:r>
+            <a:endParaRPr lang="en-US" dirty="0"/>
+          </a:p>
+        </p:txBody>
+      </p:sp>
+      <p:sp>
+        <p:nvSpPr>
+          <p:cNvPr id="3" name="Content Placeholder 2"/>
+          <p:cNvSpPr>
+            <a:spLocks noGrp="1"/>
+          </p:cNvSpPr>
+          <p:nvPr>
+            <p:ph idx="1"/>
+          </p:nvPr>
+        </p:nvSpPr>
+        <p:spPr/>
+        <p:txBody>
+          <a:bodyPr/>
+          <a:lstStyle/>
+          <a:p>
+            <a:pPr lvl="1"/>
+            <a:r>
+              <a:rPr lang="en-US" dirty="0" smtClean="0"/>
+              <a:t>In </a:t>
+            </a:r>
+            <a:r>
+              <a:rPr lang="en-US" dirty="0" err="1" smtClean="0"/>
+              <a:t>AngularJs</a:t>
+            </a:r>
+            <a:endParaRPr lang="en-US" dirty="0" smtClean="0"/>
+          </a:p>
+          <a:p>
+            <a:pPr lvl="1">
+              <a:buNone/>
+            </a:pPr>
+            <a:r>
+              <a:rPr lang="en-US" dirty="0" smtClean="0">
+                <a:solidFill>
+                  <a:srgbClr val="800000"/>
+                </a:solidFill>
+              </a:rPr>
+              <a:t>&lt;</a:t>
+            </a:r>
+            <a:r>
+              <a:rPr lang="en-US" dirty="0" err="1" smtClean="0">
+                <a:solidFill>
+                  <a:srgbClr val="800000"/>
+                </a:solidFill>
+              </a:rPr>
+              <a:t>ul</a:t>
+            </a:r>
+            <a:r>
+              <a:rPr lang="en-US" dirty="0" smtClean="0">
+                <a:solidFill>
+                  <a:srgbClr val="000000"/>
+                </a:solidFill>
+              </a:rPr>
+              <a:t> </a:t>
+            </a:r>
+            <a:r>
+              <a:rPr lang="en-US" dirty="0" smtClean="0">
+                <a:solidFill>
+                  <a:srgbClr val="FF0000"/>
+                </a:solidFill>
+              </a:rPr>
+              <a:t>class</a:t>
+            </a:r>
+            <a:r>
+              <a:rPr lang="en-US" dirty="0" smtClean="0">
+                <a:solidFill>
+                  <a:srgbClr val="000000"/>
+                </a:solidFill>
+              </a:rPr>
+              <a:t>=</a:t>
+            </a:r>
+            <a:r>
+              <a:rPr lang="en-US" dirty="0" smtClean="0">
+                <a:solidFill>
+                  <a:srgbClr val="0000FF"/>
+                </a:solidFill>
+              </a:rPr>
+              <a:t>"main-menu"</a:t>
+            </a:r>
+            <a:r>
+              <a:rPr lang="en-US" dirty="0" smtClean="0">
+                <a:solidFill>
+                  <a:srgbClr val="000000"/>
+                </a:solidFill>
+              </a:rPr>
+              <a:t> </a:t>
+            </a:r>
+            <a:r>
+              <a:rPr lang="en-US" dirty="0" smtClean="0">
+                <a:solidFill>
+                  <a:srgbClr val="FF0000"/>
+                </a:solidFill>
+              </a:rPr>
+              <a:t>dropdown-menu</a:t>
+            </a:r>
+            <a:r>
+              <a:rPr lang="en-US" dirty="0" smtClean="0">
+                <a:solidFill>
+                  <a:srgbClr val="800000"/>
+                </a:solidFill>
+              </a:rPr>
+              <a:t>&gt;</a:t>
+            </a:r>
+            <a:r>
+              <a:rPr lang="en-US" dirty="0" smtClean="0">
+                <a:solidFill>
+                  <a:srgbClr val="000000"/>
+                </a:solidFill>
+              </a:rPr>
+              <a:t> ... </a:t>
+            </a:r>
+            <a:r>
+              <a:rPr lang="en-US" dirty="0" smtClean="0">
+                <a:solidFill>
+                  <a:srgbClr val="800000"/>
+                </a:solidFill>
+              </a:rPr>
+              <a:t>&lt;/</a:t>
+            </a:r>
+            <a:r>
+              <a:rPr lang="en-US" dirty="0" err="1" smtClean="0">
+                <a:solidFill>
+                  <a:srgbClr val="800000"/>
+                </a:solidFill>
+              </a:rPr>
+              <a:t>ul</a:t>
+            </a:r>
+            <a:r>
+              <a:rPr lang="en-US" dirty="0" smtClean="0">
+                <a:solidFill>
+                  <a:srgbClr val="800000"/>
+                </a:solidFill>
+              </a:rPr>
+              <a:t>&gt;</a:t>
+            </a:r>
+          </a:p>
+          <a:p>
+            <a:r>
+              <a:rPr lang="en-US" dirty="0" smtClean="0"/>
+              <a:t>This is called </a:t>
+            </a:r>
+            <a:r>
+              <a:rPr lang="en-US" i="1" dirty="0" smtClean="0"/>
+              <a:t>Declarative </a:t>
+            </a:r>
+            <a:r>
+              <a:rPr lang="en-US" dirty="0" smtClean="0"/>
+              <a:t>approach</a:t>
+            </a:r>
+          </a:p>
+          <a:p>
+            <a:r>
+              <a:rPr lang="en-US" dirty="0" smtClean="0"/>
+              <a:t>Here ‘</a:t>
+            </a:r>
+            <a:r>
+              <a:rPr lang="en-US" dirty="0" smtClean="0">
+                <a:solidFill>
+                  <a:srgbClr val="FF0000"/>
+                </a:solidFill>
+              </a:rPr>
+              <a:t>dropdown-menu</a:t>
+            </a:r>
+            <a:r>
+              <a:rPr lang="en-US" dirty="0" smtClean="0"/>
+              <a:t>’ is </a:t>
+            </a:r>
+            <a:r>
+              <a:rPr lang="en-US" i="1" dirty="0" smtClean="0"/>
+              <a:t>Directive</a:t>
+            </a:r>
+          </a:p>
+          <a:p>
+            <a:r>
+              <a:rPr lang="en-US" dirty="0" smtClean="0"/>
+              <a:t>Directive</a:t>
+            </a:r>
+          </a:p>
+          <a:p>
+            <a:pPr lvl="1"/>
+            <a:r>
+              <a:rPr lang="en-US" dirty="0" smtClean="0"/>
+              <a:t>This is place where you can manipulate your Markup.</a:t>
+            </a:r>
+            <a:endParaRPr lang="en-US" dirty="0"/>
+          </a:p>
+        </p:txBody>
+      </p:sp>
+      <p:sp>
+        <p:nvSpPr>
+          <p:cNvPr id="4" name="Rectangle 3"/>
+          <p:cNvSpPr/>
+          <p:nvPr/>
+        </p:nvSpPr>
+        <p:spPr>
+          <a:xfrm>
+            <a:off x="0" y="5486400"/>
+            <a:ext cx="9144000" cy="400110"/>
+          </a:xfrm>
+          <a:prstGeom prst="rect">
+            <a:avLst/>
+          </a:prstGeom>
+        </p:spPr>
+        <p:txBody>
+          <a:bodyPr wrap="square">
+            <a:spAutoFit/>
+          </a:bodyPr>
+          <a:lstStyle/>
+          <a:p>
+            <a:r>
+              <a:rPr lang="en-US" sz="2000" b="1" dirty="0" smtClean="0">
+                <a:solidFill>
+                  <a:srgbClr val="C00000"/>
+                </a:solidFill>
+              </a:rPr>
+              <a:t>Remember: don't design, and then mark up. You must architect, and then design.</a:t>
+            </a:r>
+            <a:endParaRPr lang="en-US" sz="2000" b="1" dirty="0">
+              <a:solidFill>
+                <a:srgbClr val="C00000"/>
+              </a:solidFill>
+            </a:endParaRPr>
+          </a:p>
+        </p:txBody>
+      </p:sp>
+    </p:spTree>
+  </p:cSld>
+  <p:clrMapOvr>
+    <a:masterClrMapping/>
+  </p:clrMapOvr>
+</p:sld>
+</file>
+
+<file path=ppt/slides/slide13.xml><?xml version="1.0" encoding="utf-8"?>
+<p:sld xmlns:a="http://schemas.openxmlformats.org/drawingml/2006/main" xmlns:r="http://schemas.openxmlformats.org/officeDocument/2006/relationships" xmlns:p="http://schemas.openxmlformats.org/presentationml/2006/main">
+  <p:cSld>
+    <p:spTree>
+      <p:nvGrpSpPr>
+        <p:cNvPr id="1" name=""/>
+        <p:cNvGrpSpPr/>
+        <p:nvPr/>
+      </p:nvGrpSpPr>
+      <p:grpSpPr>
+        <a:xfrm>
+          <a:off x="0" y="0"/>
+          <a:ext cx="0" cy="0"/>
+          <a:chOff x="0" y="0"/>
+          <a:chExt cx="0" cy="0"/>
+        </a:xfrm>
+      </p:grpSpPr>
+      <p:sp>
+        <p:nvSpPr>
+          <p:cNvPr id="2" name="Title 1"/>
+          <p:cNvSpPr>
+            <a:spLocks noGrp="1"/>
+          </p:cNvSpPr>
+          <p:nvPr>
+            <p:ph type="title"/>
+          </p:nvPr>
+        </p:nvSpPr>
+        <p:spPr/>
+        <p:txBody>
+          <a:bodyPr/>
+          <a:lstStyle/>
+          <a:p>
+            <a:r>
+              <a:rPr lang="en-US" dirty="0" smtClean="0"/>
+              <a:t>Think in </a:t>
+            </a:r>
+            <a:r>
+              <a:rPr lang="en-US" dirty="0" err="1" smtClean="0"/>
+              <a:t>AngularJs</a:t>
+            </a:r>
+            <a:r>
+              <a:rPr lang="en-US" dirty="0" smtClean="0"/>
+              <a:t> !</a:t>
+            </a:r>
+            <a:endParaRPr lang="en-US" dirty="0"/>
+          </a:p>
+        </p:txBody>
+      </p:sp>
+      <p:sp>
+        <p:nvSpPr>
+          <p:cNvPr id="3" name="Content Placeholder 2"/>
+          <p:cNvSpPr>
+            <a:spLocks noGrp="1"/>
+          </p:cNvSpPr>
+          <p:nvPr>
+            <p:ph idx="1"/>
+          </p:nvPr>
+        </p:nvSpPr>
+        <p:spPr/>
+        <p:txBody>
+          <a:bodyPr/>
+          <a:lstStyle/>
+          <a:p>
+            <a:r>
+              <a:rPr lang="en-US" dirty="0" smtClean="0"/>
+              <a:t>Data Binding</a:t>
+            </a:r>
+          </a:p>
+          <a:p>
+            <a:pPr lvl="1"/>
+            <a:r>
+              <a:rPr lang="en-US" dirty="0" smtClean="0"/>
+              <a:t>In </a:t>
+            </a:r>
+            <a:r>
+              <a:rPr lang="en-US" dirty="0" err="1" smtClean="0"/>
+              <a:t>jQuery</a:t>
+            </a:r>
+            <a:endParaRPr lang="en-US" dirty="0" smtClean="0"/>
+          </a:p>
+          <a:p>
+            <a:pPr lvl="1">
+              <a:buNone/>
+            </a:pPr>
+            <a:r>
+              <a:rPr lang="en-US" dirty="0" smtClean="0">
+                <a:solidFill>
+                  <a:srgbClr val="800000"/>
+                </a:solidFill>
+              </a:rPr>
+              <a:t>&lt;input</a:t>
+            </a:r>
+            <a:r>
+              <a:rPr lang="en-US" dirty="0" smtClean="0">
+                <a:solidFill>
+                  <a:srgbClr val="000000"/>
+                </a:solidFill>
+              </a:rPr>
+              <a:t> </a:t>
+            </a:r>
+            <a:r>
+              <a:rPr lang="en-US" dirty="0" smtClean="0">
+                <a:solidFill>
+                  <a:srgbClr val="FF0000"/>
+                </a:solidFill>
+              </a:rPr>
+              <a:t>id</a:t>
+            </a:r>
+            <a:r>
+              <a:rPr lang="en-US" dirty="0" smtClean="0">
+                <a:solidFill>
+                  <a:srgbClr val="000000"/>
+                </a:solidFill>
+              </a:rPr>
+              <a:t>=</a:t>
+            </a:r>
+            <a:r>
+              <a:rPr lang="en-US" dirty="0" smtClean="0">
+                <a:solidFill>
+                  <a:srgbClr val="0000FF"/>
+                </a:solidFill>
+              </a:rPr>
+              <a:t>"username"</a:t>
+            </a:r>
+            <a:r>
+              <a:rPr lang="en-US" dirty="0" smtClean="0">
+                <a:solidFill>
+                  <a:srgbClr val="800000"/>
+                </a:solidFill>
+              </a:rPr>
+              <a:t>&gt;</a:t>
+            </a:r>
+          </a:p>
+          <a:p>
+            <a:pPr lvl="1">
+              <a:buNone/>
+            </a:pPr>
+            <a:r>
+              <a:rPr lang="en-US" dirty="0" smtClean="0">
+                <a:solidFill>
+                  <a:srgbClr val="000000"/>
+                </a:solidFill>
+              </a:rPr>
+              <a:t>$(</a:t>
+            </a:r>
+            <a:r>
+              <a:rPr lang="en-US" dirty="0" smtClean="0">
+                <a:solidFill>
+                  <a:srgbClr val="800000"/>
+                </a:solidFill>
+              </a:rPr>
+              <a:t>'.username'</a:t>
+            </a:r>
+            <a:r>
+              <a:rPr lang="en-US" dirty="0" smtClean="0">
+                <a:solidFill>
+                  <a:srgbClr val="000000"/>
+                </a:solidFill>
+              </a:rPr>
+              <a:t>).</a:t>
+            </a:r>
+            <a:r>
+              <a:rPr lang="en-US" dirty="0" err="1" smtClean="0">
+                <a:solidFill>
+                  <a:srgbClr val="000000"/>
+                </a:solidFill>
+              </a:rPr>
+              <a:t>val</a:t>
+            </a:r>
+            <a:r>
+              <a:rPr lang="en-US" dirty="0" smtClean="0">
+                <a:solidFill>
+                  <a:srgbClr val="000000"/>
+                </a:solidFill>
+              </a:rPr>
+              <a:t>(</a:t>
+            </a:r>
+            <a:r>
+              <a:rPr lang="en-US" dirty="0" smtClean="0">
+                <a:solidFill>
+                  <a:srgbClr val="800000"/>
+                </a:solidFill>
+              </a:rPr>
+              <a:t>'Reza'</a:t>
+            </a:r>
+            <a:r>
+              <a:rPr lang="en-US" dirty="0" smtClean="0">
+                <a:solidFill>
+                  <a:srgbClr val="000000"/>
+                </a:solidFill>
+              </a:rPr>
+              <a:t>)</a:t>
+            </a:r>
+            <a:endParaRPr lang="en-US" dirty="0" smtClean="0">
+              <a:solidFill>
+                <a:srgbClr val="000000"/>
+              </a:solidFill>
+            </a:endParaRPr>
+          </a:p>
+          <a:p>
+            <a:pPr lvl="1"/>
+            <a:r>
+              <a:rPr lang="en-US" dirty="0" smtClean="0">
+                <a:solidFill>
+                  <a:srgbClr val="000000"/>
+                </a:solidFill>
+              </a:rPr>
+              <a:t>In </a:t>
+            </a:r>
+            <a:r>
+              <a:rPr lang="en-US" dirty="0" err="1" smtClean="0">
+                <a:solidFill>
+                  <a:srgbClr val="000000"/>
+                </a:solidFill>
+              </a:rPr>
+              <a:t>AngularJs</a:t>
+            </a:r>
+            <a:endParaRPr lang="en-US" dirty="0" smtClean="0">
+              <a:solidFill>
+                <a:srgbClr val="000000"/>
+              </a:solidFill>
+            </a:endParaRPr>
+          </a:p>
+          <a:p>
+            <a:pPr lvl="1">
+              <a:buNone/>
+            </a:pPr>
+            <a:r>
+              <a:rPr lang="en-US" dirty="0" smtClean="0">
+                <a:solidFill>
+                  <a:srgbClr val="800000"/>
+                </a:solidFill>
+              </a:rPr>
+              <a:t>&lt;input</a:t>
+            </a:r>
+            <a:r>
+              <a:rPr lang="en-US" dirty="0" smtClean="0">
+                <a:solidFill>
+                  <a:srgbClr val="000000"/>
+                </a:solidFill>
+              </a:rPr>
+              <a:t> </a:t>
+            </a:r>
+            <a:r>
+              <a:rPr lang="en-US" dirty="0" smtClean="0">
+                <a:solidFill>
+                  <a:srgbClr val="FF0000"/>
+                </a:solidFill>
+              </a:rPr>
+              <a:t>id</a:t>
+            </a:r>
+            <a:r>
+              <a:rPr lang="en-US" dirty="0" smtClean="0">
+                <a:solidFill>
+                  <a:srgbClr val="000000"/>
+                </a:solidFill>
+              </a:rPr>
+              <a:t>=</a:t>
+            </a:r>
+            <a:r>
+              <a:rPr lang="en-US" dirty="0" smtClean="0">
+                <a:solidFill>
+                  <a:srgbClr val="0000FF"/>
+                </a:solidFill>
+              </a:rPr>
+              <a:t>"</a:t>
+            </a:r>
+            <a:r>
+              <a:rPr lang="en-US" dirty="0" smtClean="0">
+                <a:solidFill>
+                  <a:srgbClr val="0000FF"/>
+                </a:solidFill>
+              </a:rPr>
+              <a:t>username"  </a:t>
+            </a:r>
+            <a:r>
+              <a:rPr lang="en-US" dirty="0" err="1" smtClean="0">
+                <a:solidFill>
+                  <a:srgbClr val="FF0000"/>
+                </a:solidFill>
+              </a:rPr>
+              <a:t>ng</a:t>
+            </a:r>
+            <a:r>
+              <a:rPr lang="en-US" dirty="0" smtClean="0">
+                <a:solidFill>
+                  <a:srgbClr val="FF0000"/>
+                </a:solidFill>
+              </a:rPr>
+              <a:t>-model</a:t>
+            </a:r>
+            <a:r>
+              <a:rPr lang="en-US" dirty="0" smtClean="0">
+                <a:solidFill>
+                  <a:srgbClr val="000000"/>
+                </a:solidFill>
+              </a:rPr>
+              <a:t>=</a:t>
+            </a:r>
+            <a:r>
+              <a:rPr lang="en-US" dirty="0" smtClean="0">
+                <a:solidFill>
+                  <a:srgbClr val="0000FF"/>
+                </a:solidFill>
+              </a:rPr>
+              <a:t>"</a:t>
+            </a:r>
+            <a:r>
+              <a:rPr lang="en-US" dirty="0" smtClean="0">
+                <a:solidFill>
+                  <a:srgbClr val="0000FF"/>
+                </a:solidFill>
+              </a:rPr>
+              <a:t>username</a:t>
+            </a:r>
+            <a:r>
+              <a:rPr lang="en-US" dirty="0" smtClean="0">
+                <a:solidFill>
+                  <a:srgbClr val="0000FF"/>
+                </a:solidFill>
+              </a:rPr>
+              <a:t>"</a:t>
+            </a:r>
+            <a:r>
+              <a:rPr lang="en-US" dirty="0" smtClean="0">
+                <a:solidFill>
+                  <a:srgbClr val="800000"/>
+                </a:solidFill>
+              </a:rPr>
+              <a:t>&gt;</a:t>
+            </a:r>
+          </a:p>
+          <a:p>
+            <a:pPr lvl="1">
+              <a:buNone/>
+            </a:pPr>
+            <a:r>
+              <a:rPr lang="en-US" dirty="0" smtClean="0"/>
+              <a:t>$</a:t>
+            </a:r>
+            <a:r>
+              <a:rPr lang="en-US" dirty="0" err="1" smtClean="0"/>
+              <a:t>scope.username</a:t>
+            </a:r>
+            <a:r>
+              <a:rPr lang="en-US" dirty="0" smtClean="0"/>
+              <a:t> = </a:t>
+            </a:r>
+            <a:r>
+              <a:rPr lang="en-US" dirty="0" smtClean="0">
+                <a:solidFill>
+                  <a:srgbClr val="800000"/>
+                </a:solidFill>
+              </a:rPr>
+              <a:t>'Reza'</a:t>
+            </a:r>
+            <a:r>
+              <a:rPr lang="en-US" dirty="0" smtClean="0"/>
+              <a:t>;</a:t>
+            </a:r>
+            <a:endParaRPr lang="en-US" dirty="0" smtClean="0"/>
+          </a:p>
+          <a:p>
+            <a:r>
+              <a:rPr lang="en-US" dirty="0" smtClean="0"/>
+              <a:t>Distinct model layer</a:t>
+            </a:r>
+          </a:p>
+          <a:p>
+            <a:pPr lvl="1"/>
+            <a:endParaRPr lang="en-US" dirty="0"/>
+          </a:p>
+        </p:txBody>
+      </p:sp>
+    </p:spTree>
+  </p:cSld>
+  <p:clrMapOvr>
+    <a:masterClrMapping/>
+  </p:clrMapOvr>
+</p:sld>
+</file>
+
+<file path=ppt/slides/slide14.xml><?xml version="1.0" encoding="utf-8"?>
+<p:sld xmlns:a="http://schemas.openxmlformats.org/drawingml/2006/main" xmlns:r="http://schemas.openxmlformats.org/officeDocument/2006/relationships" xmlns:p="http://schemas.openxmlformats.org/presentationml/2006/main">
+  <p:cSld>
+    <p:spTree>
+      <p:nvGrpSpPr>
+        <p:cNvPr id="1" name=""/>
+        <p:cNvGrpSpPr/>
+        <p:nvPr/>
+      </p:nvGrpSpPr>
+      <p:grpSpPr>
+        <a:xfrm>
+          <a:off x="0" y="0"/>
+          <a:ext cx="0" cy="0"/>
+          <a:chOff x="0" y="0"/>
+          <a:chExt cx="0" cy="0"/>
+        </a:xfrm>
+      </p:grpSpPr>
+      <p:sp>
+        <p:nvSpPr>
+          <p:cNvPr id="2" name="Title 1"/>
+          <p:cNvSpPr>
+            <a:spLocks noGrp="1"/>
+          </p:cNvSpPr>
+          <p:nvPr>
+            <p:ph type="title"/>
+          </p:nvPr>
+        </p:nvSpPr>
+        <p:spPr/>
+        <p:txBody>
+          <a:bodyPr/>
+          <a:lstStyle/>
+          <a:p>
+            <a:r>
+              <a:rPr lang="en-US" dirty="0" smtClean="0"/>
+              <a:t>What is Angular anyway ?</a:t>
+            </a:r>
+            <a:endParaRPr lang="en-US" dirty="0"/>
+          </a:p>
+        </p:txBody>
+      </p:sp>
+      <p:pic>
+        <p:nvPicPr>
+          <p:cNvPr id="4" name="Content Placeholder 3" descr="angularjs-from-30k-feet.png"/>
+          <p:cNvPicPr>
+            <a:picLocks noGrp="1" noChangeAspect="1"/>
+          </p:cNvPicPr>
+          <p:nvPr>
+            <p:ph idx="1"/>
+          </p:nvPr>
+        </p:nvPicPr>
+        <p:blipFill>
+          <a:blip r:embed="rId2"/>
+          <a:stretch>
+            <a:fillRect/>
+          </a:stretch>
+        </p:blipFill>
+        <p:spPr>
+          <a:xfrm>
+            <a:off x="1714101" y="1819783"/>
+            <a:ext cx="5715798" cy="4086796"/>
+          </a:xfrm>
+        </p:spPr>
+      </p:pic>
+    </p:spTree>
+  </p:cSld>
+  <p:clrMapOvr>
+    <a:masterClrMapping/>
+  </p:clrMapOvr>
+</p:sld>
+</file>
+
+<file path=ppt/slides/slide15.xml><?xml version="1.0" encoding="utf-8"?>
+<p:sld xmlns:a="http://schemas.openxmlformats.org/drawingml/2006/main" xmlns:r="http://schemas.openxmlformats.org/officeDocument/2006/relationships" xmlns:p="http://schemas.openxmlformats.org/presentationml/2006/main">
+  <p:cSld>
+    <p:spTree>
+      <p:nvGrpSpPr>
+        <p:cNvPr id="1" name=""/>
+        <p:cNvGrpSpPr/>
+        <p:nvPr/>
+      </p:nvGrpSpPr>
+      <p:grpSpPr>
+        <a:xfrm>
+          <a:off x="0" y="0"/>
+          <a:ext cx="0" cy="0"/>
+          <a:chOff x="0" y="0"/>
+          <a:chExt cx="0" cy="0"/>
+        </a:xfrm>
+      </p:grpSpPr>
+      <p:sp>
+        <p:nvSpPr>
+          <p:cNvPr id="2" name="Title 1"/>
+          <p:cNvSpPr>
+            <a:spLocks noGrp="1"/>
+          </p:cNvSpPr>
+          <p:nvPr>
+            <p:ph type="title"/>
+          </p:nvPr>
+        </p:nvSpPr>
+        <p:spPr/>
+        <p:txBody>
+          <a:bodyPr/>
+          <a:lstStyle/>
+          <a:p>
+            <a:r>
+              <a:rPr lang="en-US" dirty="0" err="1" smtClean="0"/>
+              <a:t>AngularJs</a:t>
+            </a:r>
+            <a:r>
+              <a:rPr lang="en-US" dirty="0" smtClean="0"/>
+              <a:t> component</a:t>
+            </a:r>
+            <a:endParaRPr lang="en-US" dirty="0"/>
+          </a:p>
+        </p:txBody>
+      </p:sp>
+      <p:sp>
+        <p:nvSpPr>
+          <p:cNvPr id="3" name="Content Placeholder 2"/>
+          <p:cNvSpPr>
+            <a:spLocks noGrp="1"/>
+          </p:cNvSpPr>
+          <p:nvPr>
+            <p:ph idx="1"/>
+          </p:nvPr>
+        </p:nvSpPr>
+        <p:spPr/>
+        <p:txBody>
+          <a:bodyPr/>
+          <a:lstStyle/>
+          <a:p>
+            <a:r>
+              <a:rPr lang="en-US" dirty="0" smtClean="0"/>
+              <a:t>Data Binding</a:t>
+            </a:r>
+            <a:endParaRPr lang="en-US" dirty="0"/>
+          </a:p>
+        </p:txBody>
+      </p:sp>
+      <p:pic>
+        <p:nvPicPr>
+          <p:cNvPr id="4" name="Picture 3" descr="angularjs-guide.jpg"/>
+          <p:cNvPicPr>
+            <a:picLocks noChangeAspect="1"/>
+          </p:cNvPicPr>
+          <p:nvPr/>
+        </p:nvPicPr>
+        <p:blipFill>
+          <a:blip r:embed="rId2"/>
+          <a:stretch>
+            <a:fillRect/>
+          </a:stretch>
+        </p:blipFill>
+        <p:spPr>
+          <a:xfrm>
+            <a:off x="2362200" y="2438400"/>
+            <a:ext cx="4572000" cy="4114800"/>
+          </a:xfrm>
+          <a:prstGeom prst="rect">
+            <a:avLst/>
+          </a:prstGeom>
+        </p:spPr>
+      </p:pic>
+    </p:spTree>
+  </p:cSld>
+  <p:clrMapOvr>
+    <a:masterClrMapping/>
+  </p:clrMapOvr>
+</p:sld>
+</file>
+
+<file path=ppt/slides/slide16.xml><?xml version="1.0" encoding="utf-8"?>
+<p:sld xmlns:a="http://schemas.openxmlformats.org/drawingml/2006/main" xmlns:r="http://schemas.openxmlformats.org/officeDocument/2006/relationships" xmlns:p="http://schemas.openxmlformats.org/presentationml/2006/main">
+  <p:cSld>
+    <p:spTree>
+      <p:nvGrpSpPr>
+        <p:cNvPr id="1" name=""/>
+        <p:cNvGrpSpPr/>
+        <p:nvPr/>
+      </p:nvGrpSpPr>
+      <p:grpSpPr>
+        <a:xfrm>
+          <a:off x="0" y="0"/>
+          <a:ext cx="0" cy="0"/>
+          <a:chOff x="0" y="0"/>
+          <a:chExt cx="0" cy="0"/>
+        </a:xfrm>
+      </p:grpSpPr>
+      <p:sp>
+        <p:nvSpPr>
+          <p:cNvPr id="2" name="Title 1"/>
+          <p:cNvSpPr>
+            <a:spLocks noGrp="1"/>
+          </p:cNvSpPr>
+          <p:nvPr>
+            <p:ph type="title"/>
+          </p:nvPr>
+        </p:nvSpPr>
+        <p:spPr/>
+        <p:txBody>
+          <a:bodyPr/>
+          <a:lstStyle/>
+          <a:p>
+            <a:r>
+              <a:rPr lang="en-US" dirty="0" err="1" smtClean="0"/>
+              <a:t>AngularJs</a:t>
+            </a:r>
+            <a:r>
+              <a:rPr lang="en-US" dirty="0" smtClean="0"/>
+              <a:t> component</a:t>
+            </a:r>
+            <a:endParaRPr lang="en-US" dirty="0"/>
+          </a:p>
+        </p:txBody>
+      </p:sp>
+      <p:sp>
+        <p:nvSpPr>
+          <p:cNvPr id="3" name="Content Placeholder 2"/>
+          <p:cNvSpPr>
+            <a:spLocks noGrp="1"/>
+          </p:cNvSpPr>
+          <p:nvPr>
+            <p:ph idx="1"/>
+          </p:nvPr>
+        </p:nvSpPr>
+        <p:spPr/>
+        <p:txBody>
+          <a:bodyPr/>
+          <a:lstStyle/>
+          <a:p>
+            <a:r>
+              <a:rPr lang="en-US" dirty="0" smtClean="0"/>
+              <a:t>Data Binding Under the hood </a:t>
+            </a:r>
+            <a:endParaRPr lang="en-US" dirty="0"/>
+          </a:p>
+        </p:txBody>
+      </p:sp>
+      <p:pic>
+        <p:nvPicPr>
+          <p:cNvPr id="4" name="Picture 3" descr="EvHjB.png"/>
+          <p:cNvPicPr>
+            <a:picLocks noChangeAspect="1"/>
+          </p:cNvPicPr>
+          <p:nvPr/>
+        </p:nvPicPr>
+        <p:blipFill>
+          <a:blip r:embed="rId3"/>
+          <a:stretch>
+            <a:fillRect/>
+          </a:stretch>
+        </p:blipFill>
+        <p:spPr>
+          <a:xfrm>
+            <a:off x="2286000" y="2590800"/>
+            <a:ext cx="4437521" cy="3401287"/>
+          </a:xfrm>
+          <a:prstGeom prst="rect">
+            <a:avLst/>
+          </a:prstGeom>
+        </p:spPr>
+      </p:pic>
+    </p:spTree>
+  </p:cSld>
+  <p:clrMapOvr>
+    <a:masterClrMapping/>
+  </p:clrMapOvr>
+</p:sld>
+</file>
+
+<file path=ppt/slides/slide17.xml><?xml version="1.0" encoding="utf-8"?>
+<p:sld xmlns:a="http://schemas.openxmlformats.org/drawingml/2006/main" xmlns:r="http://schemas.openxmlformats.org/officeDocument/2006/relationships" xmlns:p="http://schemas.openxmlformats.org/presentationml/2006/main">
+  <p:cSld>
+    <p:spTree>
+      <p:nvGrpSpPr>
+        <p:cNvPr id="1" name=""/>
+        <p:cNvGrpSpPr/>
+        <p:nvPr/>
+      </p:nvGrpSpPr>
+      <p:grpSpPr>
+        <a:xfrm>
+          <a:off x="0" y="0"/>
+          <a:ext cx="0" cy="0"/>
+          <a:chOff x="0" y="0"/>
+          <a:chExt cx="0" cy="0"/>
+        </a:xfrm>
+      </p:grpSpPr>
+      <p:sp>
+        <p:nvSpPr>
+          <p:cNvPr id="2" name="Title 1"/>
+          <p:cNvSpPr>
+            <a:spLocks noGrp="1"/>
+          </p:cNvSpPr>
+          <p:nvPr>
+            <p:ph type="title"/>
+          </p:nvPr>
+        </p:nvSpPr>
+        <p:spPr/>
+        <p:txBody>
+          <a:bodyPr/>
+          <a:lstStyle/>
+          <a:p>
+            <a:r>
+              <a:rPr lang="en-US" dirty="0" err="1" smtClean="0"/>
+              <a:t>AngularJs</a:t>
+            </a:r>
+            <a:r>
+              <a:rPr lang="en-US" dirty="0" smtClean="0"/>
+              <a:t> component</a:t>
+            </a:r>
+            <a:endParaRPr lang="en-US" dirty="0"/>
+          </a:p>
+        </p:txBody>
+      </p:sp>
+      <p:sp>
+        <p:nvSpPr>
+          <p:cNvPr id="3" name="Content Placeholder 2"/>
+          <p:cNvSpPr>
+            <a:spLocks noGrp="1"/>
+          </p:cNvSpPr>
+          <p:nvPr>
+            <p:ph idx="1"/>
+          </p:nvPr>
+        </p:nvSpPr>
+        <p:spPr/>
+        <p:txBody>
+          <a:bodyPr/>
+          <a:lstStyle/>
+          <a:p>
+            <a:r>
+              <a:rPr lang="en-US" dirty="0" smtClean="0"/>
+              <a:t>MVC</a:t>
+            </a:r>
+            <a:endParaRPr lang="en-US" dirty="0"/>
+          </a:p>
+        </p:txBody>
+      </p:sp>
+      <p:pic>
+        <p:nvPicPr>
+          <p:cNvPr id="4" name="Picture 3" descr="angularjstutorialdotcom_model_view_controller.png"/>
+          <p:cNvPicPr>
+            <a:picLocks noChangeAspect="1"/>
+          </p:cNvPicPr>
+          <p:nvPr/>
+        </p:nvPicPr>
+        <p:blipFill>
+          <a:blip r:embed="rId2"/>
+          <a:stretch>
+            <a:fillRect/>
+          </a:stretch>
+        </p:blipFill>
+        <p:spPr>
+          <a:xfrm>
+            <a:off x="1981200" y="1524000"/>
+            <a:ext cx="6781800" cy="4942237"/>
+          </a:xfrm>
+          <a:prstGeom prst="rect">
+            <a:avLst/>
+          </a:prstGeom>
+        </p:spPr>
+      </p:pic>
+    </p:spTree>
+  </p:cSld>
+  <p:clrMapOvr>
+    <a:masterClrMapping/>
+  </p:clrMapOvr>
+</p:sld>
+</file>
+
+<file path=ppt/slides/slide18.xml><?xml version="1.0" encoding="utf-8"?>
+<p:sld xmlns:a="http://schemas.openxmlformats.org/drawingml/2006/main" xmlns:r="http://schemas.openxmlformats.org/officeDocument/2006/relationships" xmlns:p="http://schemas.openxmlformats.org/presentationml/2006/main">
+  <p:cSld>
+    <p:spTree>
+      <p:nvGrpSpPr>
+        <p:cNvPr id="1" name=""/>
+        <p:cNvGrpSpPr/>
+        <p:nvPr/>
+      </p:nvGrpSpPr>
+      <p:grpSpPr>
+        <a:xfrm>
+          <a:off x="0" y="0"/>
+          <a:ext cx="0" cy="0"/>
+          <a:chOff x="0" y="0"/>
+          <a:chExt cx="0" cy="0"/>
+        </a:xfrm>
+      </p:grpSpPr>
+      <p:sp>
+        <p:nvSpPr>
+          <p:cNvPr id="2" name="Title 1"/>
+          <p:cNvSpPr>
+            <a:spLocks noGrp="1"/>
+          </p:cNvSpPr>
+          <p:nvPr>
+            <p:ph type="title"/>
+          </p:nvPr>
+        </p:nvSpPr>
+        <p:spPr/>
+        <p:txBody>
+          <a:bodyPr/>
+          <a:lstStyle/>
+          <a:p>
+            <a:r>
+              <a:rPr lang="en-US" dirty="0" err="1" smtClean="0"/>
+              <a:t>AngularJs</a:t>
+            </a:r>
+            <a:r>
+              <a:rPr lang="en-US" dirty="0" smtClean="0"/>
+              <a:t> component</a:t>
+            </a:r>
+            <a:endParaRPr lang="en-US" dirty="0"/>
+          </a:p>
+        </p:txBody>
+      </p:sp>
+      <p:sp>
+        <p:nvSpPr>
+          <p:cNvPr id="3" name="Content Placeholder 2"/>
+          <p:cNvSpPr>
+            <a:spLocks noGrp="1"/>
+          </p:cNvSpPr>
+          <p:nvPr>
+            <p:ph idx="1"/>
+          </p:nvPr>
+        </p:nvSpPr>
+        <p:spPr/>
+        <p:txBody>
+          <a:bodyPr/>
+          <a:lstStyle/>
+          <a:p>
+            <a:r>
+              <a:rPr lang="en-US" dirty="0" smtClean="0"/>
+              <a:t>Routing</a:t>
+            </a:r>
+            <a:endParaRPr lang="en-US" dirty="0"/>
+          </a:p>
+        </p:txBody>
+      </p:sp>
+      <p:pic>
+        <p:nvPicPr>
+          <p:cNvPr id="4" name="Picture 3" descr="angularjs-routing-view-controller.png"/>
+          <p:cNvPicPr>
+            <a:picLocks noChangeAspect="1"/>
+          </p:cNvPicPr>
+          <p:nvPr/>
+        </p:nvPicPr>
+        <p:blipFill>
+          <a:blip r:embed="rId2"/>
+          <a:stretch>
+            <a:fillRect/>
+          </a:stretch>
+        </p:blipFill>
+        <p:spPr>
+          <a:xfrm>
+            <a:off x="762000" y="3124200"/>
+            <a:ext cx="7775013" cy="2362200"/>
+          </a:xfrm>
+          <a:prstGeom prst="rect">
+            <a:avLst/>
+          </a:prstGeom>
+        </p:spPr>
+      </p:pic>
+    </p:spTree>
+  </p:cSld>
+  <p:clrMapOvr>
+    <a:masterClrMapping/>
+  </p:clrMapOvr>
+</p:sld>
+</file>
+
+<file path=ppt/slides/slide19.xml><?xml version="1.0" encoding="utf-8"?>
+<p:sld xmlns:a="http://schemas.openxmlformats.org/drawingml/2006/main" xmlns:r="http://schemas.openxmlformats.org/officeDocument/2006/relationships" xmlns:p="http://schemas.openxmlformats.org/presentationml/2006/main">
+  <p:cSld>
+    <p:spTree>
+      <p:nvGrpSpPr>
+        <p:cNvPr id="1" name=""/>
+        <p:cNvGrpSpPr/>
+        <p:nvPr/>
+      </p:nvGrpSpPr>
+      <p:grpSpPr>
+        <a:xfrm>
+          <a:off x="0" y="0"/>
+          <a:ext cx="0" cy="0"/>
+          <a:chOff x="0" y="0"/>
+          <a:chExt cx="0" cy="0"/>
+        </a:xfrm>
+      </p:grpSpPr>
+      <p:sp>
+        <p:nvSpPr>
+          <p:cNvPr id="2" name="Title 1"/>
+          <p:cNvSpPr>
+            <a:spLocks noGrp="1"/>
+          </p:cNvSpPr>
+          <p:nvPr>
+            <p:ph type="title"/>
+          </p:nvPr>
+        </p:nvSpPr>
+        <p:spPr/>
+        <p:txBody>
+          <a:bodyPr/>
+          <a:lstStyle/>
+          <a:p>
+            <a:r>
+              <a:rPr lang="en-US" dirty="0" err="1" smtClean="0"/>
+              <a:t>AngularJs</a:t>
+            </a:r>
+            <a:r>
+              <a:rPr lang="en-US" dirty="0" smtClean="0"/>
+              <a:t> component</a:t>
+            </a:r>
+            <a:endParaRPr lang="en-US" dirty="0"/>
+          </a:p>
+        </p:txBody>
+      </p:sp>
+      <p:sp>
+        <p:nvSpPr>
+          <p:cNvPr id="5" name="Content Placeholder 4"/>
+          <p:cNvSpPr>
+            <a:spLocks noGrp="1"/>
+          </p:cNvSpPr>
+          <p:nvPr>
+            <p:ph idx="1"/>
+          </p:nvPr>
+        </p:nvSpPr>
+        <p:spPr/>
+        <p:txBody>
+          <a:bodyPr/>
+          <a:lstStyle/>
+          <a:p>
+            <a:r>
+              <a:rPr lang="en-US" dirty="0" smtClean="0"/>
+              <a:t>Routing</a:t>
+            </a:r>
+            <a:endParaRPr lang="en-US" dirty="0"/>
+          </a:p>
+        </p:txBody>
+      </p:sp>
+      <p:pic>
+        <p:nvPicPr>
+          <p:cNvPr id="6" name="Picture 5" descr="hashbang_vs_regular_url.jpg"/>
+          <p:cNvPicPr>
+            <a:picLocks noChangeAspect="1"/>
+          </p:cNvPicPr>
+          <p:nvPr/>
+        </p:nvPicPr>
+        <p:blipFill>
+          <a:blip r:embed="rId2"/>
+          <a:stretch>
+            <a:fillRect/>
+          </a:stretch>
+        </p:blipFill>
+        <p:spPr>
+          <a:xfrm>
+            <a:off x="1295400" y="2438400"/>
+            <a:ext cx="7200900" cy="3949700"/>
+          </a:xfrm>
+          <a:prstGeom prst="rect">
+            <a:avLst/>
+          </a:prstGeom>
+        </p:spPr>
+      </p:pic>
+    </p:spTree>
   </p:cSld>
   <p:clrMapOvr>
     <a:masterClrMapping/>
@@ -3286,11 +5595,7 @@
           <a:p>
             <a:r>
               <a:rPr lang="en-US" dirty="0" smtClean="0"/>
-              <a:t>Browser </a:t>
-            </a:r>
-            <a:r>
-              <a:rPr lang="en-US" dirty="0" smtClean="0"/>
-              <a:t>Basic</a:t>
+              <a:t>Browser Basic</a:t>
             </a:r>
           </a:p>
           <a:p>
@@ -3320,11 +5625,7 @@
             <a:pPr lvl="1"/>
             <a:r>
               <a:rPr lang="en-US" dirty="0" smtClean="0"/>
-              <a:t>Handle </a:t>
-            </a:r>
-            <a:r>
-              <a:rPr lang="en-US" dirty="0" smtClean="0"/>
-              <a:t>a Form using </a:t>
+              <a:t>Handle a Form using </a:t>
             </a:r>
             <a:r>
               <a:rPr lang="en-US" dirty="0" err="1" smtClean="0"/>
@@ -3349,9 +5650,822 @@
     </p:spTree>
     <p:extLst>
       <p:ext uri="{BB962C8B-B14F-4D97-AF65-F5344CB8AC3E}">
-        <p14:creationId xmlns:p14="http://schemas.microsoft.com/office/powerpoint/2010/main" val="1206448357"/>
+        <p14:creationId xmlns:p14="http://schemas.microsoft.com/office/powerpoint/2010/main" xmlns="" val="1206448357"/>
       </p:ext>
     </p:extLst>
+  </p:cSld>
+  <p:clrMapOvr>
+    <a:masterClrMapping/>
+  </p:clrMapOvr>
+</p:sld>
+</file>
+
+<file path=ppt/slides/slide20.xml><?xml version="1.0" encoding="utf-8"?>
+<p:sld xmlns:a="http://schemas.openxmlformats.org/drawingml/2006/main" xmlns:r="http://schemas.openxmlformats.org/officeDocument/2006/relationships" xmlns:p="http://schemas.openxmlformats.org/presentationml/2006/main">
+  <p:cSld>
+    <p:spTree>
+      <p:nvGrpSpPr>
+        <p:cNvPr id="1" name=""/>
+        <p:cNvGrpSpPr/>
+        <p:nvPr/>
+      </p:nvGrpSpPr>
+      <p:grpSpPr>
+        <a:xfrm>
+          <a:off x="0" y="0"/>
+          <a:ext cx="0" cy="0"/>
+          <a:chOff x="0" y="0"/>
+          <a:chExt cx="0" cy="0"/>
+        </a:xfrm>
+      </p:grpSpPr>
+      <p:sp>
+        <p:nvSpPr>
+          <p:cNvPr id="2" name="Title 1"/>
+          <p:cNvSpPr>
+            <a:spLocks noGrp="1"/>
+          </p:cNvSpPr>
+          <p:nvPr>
+            <p:ph type="title"/>
+          </p:nvPr>
+        </p:nvSpPr>
+        <p:spPr/>
+        <p:txBody>
+          <a:bodyPr/>
+          <a:lstStyle/>
+          <a:p>
+            <a:r>
+              <a:rPr lang="en-US" dirty="0" err="1" smtClean="0"/>
+              <a:t>AngularJs</a:t>
+            </a:r>
+            <a:r>
+              <a:rPr lang="en-US" dirty="0" smtClean="0"/>
+              <a:t> component</a:t>
+            </a:r>
+            <a:endParaRPr lang="en-US" dirty="0"/>
+          </a:p>
+        </p:txBody>
+      </p:sp>
+      <p:sp>
+        <p:nvSpPr>
+          <p:cNvPr id="3" name="Content Placeholder 2"/>
+          <p:cNvSpPr>
+            <a:spLocks noGrp="1"/>
+          </p:cNvSpPr>
+          <p:nvPr>
+            <p:ph idx="1"/>
+          </p:nvPr>
+        </p:nvSpPr>
+        <p:spPr/>
+        <p:txBody>
+          <a:bodyPr/>
+          <a:lstStyle/>
+          <a:p>
+            <a:r>
+              <a:rPr lang="en-US" dirty="0" smtClean="0"/>
+              <a:t>Routing</a:t>
+            </a:r>
+            <a:endParaRPr lang="en-US" dirty="0"/>
+          </a:p>
+        </p:txBody>
+      </p:sp>
+      <p:pic>
+        <p:nvPicPr>
+          <p:cNvPr id="4" name="Picture 3" descr="routing1.png"/>
+          <p:cNvPicPr>
+            <a:picLocks noChangeAspect="1"/>
+          </p:cNvPicPr>
+          <p:nvPr/>
+        </p:nvPicPr>
+        <p:blipFill>
+          <a:blip r:embed="rId2"/>
+          <a:stretch>
+            <a:fillRect/>
+          </a:stretch>
+        </p:blipFill>
+        <p:spPr>
+          <a:xfrm>
+            <a:off x="838200" y="2590800"/>
+            <a:ext cx="7049985" cy="2971800"/>
+          </a:xfrm>
+          <a:prstGeom prst="rect">
+            <a:avLst/>
+          </a:prstGeom>
+        </p:spPr>
+      </p:pic>
+    </p:spTree>
+  </p:cSld>
+  <p:clrMapOvr>
+    <a:masterClrMapping/>
+  </p:clrMapOvr>
+</p:sld>
+</file>
+
+<file path=ppt/slides/slide21.xml><?xml version="1.0" encoding="utf-8"?>
+<p:sld xmlns:a="http://schemas.openxmlformats.org/drawingml/2006/main" xmlns:r="http://schemas.openxmlformats.org/officeDocument/2006/relationships" xmlns:p="http://schemas.openxmlformats.org/presentationml/2006/main">
+  <p:cSld>
+    <p:spTree>
+      <p:nvGrpSpPr>
+        <p:cNvPr id="1" name=""/>
+        <p:cNvGrpSpPr/>
+        <p:nvPr/>
+      </p:nvGrpSpPr>
+      <p:grpSpPr>
+        <a:xfrm>
+          <a:off x="0" y="0"/>
+          <a:ext cx="0" cy="0"/>
+          <a:chOff x="0" y="0"/>
+          <a:chExt cx="0" cy="0"/>
+        </a:xfrm>
+      </p:grpSpPr>
+      <p:sp>
+        <p:nvSpPr>
+          <p:cNvPr id="2" name="Title 1"/>
+          <p:cNvSpPr>
+            <a:spLocks noGrp="1"/>
+          </p:cNvSpPr>
+          <p:nvPr>
+            <p:ph type="title"/>
+          </p:nvPr>
+        </p:nvSpPr>
+        <p:spPr/>
+        <p:txBody>
+          <a:bodyPr/>
+          <a:lstStyle/>
+          <a:p>
+            <a:r>
+              <a:rPr lang="en-US" dirty="0" err="1" smtClean="0"/>
+              <a:t>AngularJs</a:t>
+            </a:r>
+            <a:r>
+              <a:rPr lang="en-US" dirty="0" smtClean="0"/>
+              <a:t> component</a:t>
+            </a:r>
+            <a:endParaRPr lang="en-US" dirty="0"/>
+          </a:p>
+        </p:txBody>
+      </p:sp>
+      <p:sp>
+        <p:nvSpPr>
+          <p:cNvPr id="3" name="Content Placeholder 2"/>
+          <p:cNvSpPr>
+            <a:spLocks noGrp="1"/>
+          </p:cNvSpPr>
+          <p:nvPr>
+            <p:ph idx="1"/>
+          </p:nvPr>
+        </p:nvSpPr>
+        <p:spPr/>
+        <p:txBody>
+          <a:bodyPr/>
+          <a:lstStyle/>
+          <a:p>
+            <a:r>
+              <a:rPr lang="en-US" dirty="0" smtClean="0"/>
+              <a:t>Browser History</a:t>
+            </a:r>
+            <a:endParaRPr lang="en-US" dirty="0"/>
+          </a:p>
+        </p:txBody>
+      </p:sp>
+    </p:spTree>
+  </p:cSld>
+  <p:clrMapOvr>
+    <a:masterClrMapping/>
+  </p:clrMapOvr>
+</p:sld>
+</file>
+
+<file path=ppt/slides/slide22.xml><?xml version="1.0" encoding="utf-8"?>
+<p:sld xmlns:a="http://schemas.openxmlformats.org/drawingml/2006/main" xmlns:r="http://schemas.openxmlformats.org/officeDocument/2006/relationships" xmlns:p="http://schemas.openxmlformats.org/presentationml/2006/main">
+  <p:cSld>
+    <p:spTree>
+      <p:nvGrpSpPr>
+        <p:cNvPr id="1" name=""/>
+        <p:cNvGrpSpPr/>
+        <p:nvPr/>
+      </p:nvGrpSpPr>
+      <p:grpSpPr>
+        <a:xfrm>
+          <a:off x="0" y="0"/>
+          <a:ext cx="0" cy="0"/>
+          <a:chOff x="0" y="0"/>
+          <a:chExt cx="0" cy="0"/>
+        </a:xfrm>
+      </p:grpSpPr>
+      <p:sp>
+        <p:nvSpPr>
+          <p:cNvPr id="2" name="Title 1"/>
+          <p:cNvSpPr>
+            <a:spLocks noGrp="1"/>
+          </p:cNvSpPr>
+          <p:nvPr>
+            <p:ph type="title"/>
+          </p:nvPr>
+        </p:nvSpPr>
+        <p:spPr/>
+        <p:txBody>
+          <a:bodyPr/>
+          <a:lstStyle/>
+          <a:p>
+            <a:r>
+              <a:rPr lang="en-US" dirty="0" err="1" smtClean="0"/>
+              <a:t>AngularJs</a:t>
+            </a:r>
+            <a:r>
+              <a:rPr lang="en-US" dirty="0" smtClean="0"/>
+              <a:t> component</a:t>
+            </a:r>
+            <a:endParaRPr lang="en-US" dirty="0"/>
+          </a:p>
+        </p:txBody>
+      </p:sp>
+      <p:sp>
+        <p:nvSpPr>
+          <p:cNvPr id="3" name="Content Placeholder 2"/>
+          <p:cNvSpPr>
+            <a:spLocks noGrp="1"/>
+          </p:cNvSpPr>
+          <p:nvPr>
+            <p:ph idx="1"/>
+          </p:nvPr>
+        </p:nvSpPr>
+        <p:spPr/>
+        <p:txBody>
+          <a:bodyPr/>
+          <a:lstStyle/>
+          <a:p>
+            <a:r>
+              <a:rPr lang="en-US" dirty="0" err="1" smtClean="0"/>
+              <a:t>jQLite</a:t>
+            </a:r>
+            <a:endParaRPr lang="en-US" dirty="0"/>
+          </a:p>
+        </p:txBody>
+      </p:sp>
+    </p:spTree>
+  </p:cSld>
+  <p:clrMapOvr>
+    <a:masterClrMapping/>
+  </p:clrMapOvr>
+</p:sld>
+</file>
+
+<file path=ppt/slides/slide23.xml><?xml version="1.0" encoding="utf-8"?>
+<p:sld xmlns:a="http://schemas.openxmlformats.org/drawingml/2006/main" xmlns:r="http://schemas.openxmlformats.org/officeDocument/2006/relationships" xmlns:p="http://schemas.openxmlformats.org/presentationml/2006/main">
+  <p:cSld>
+    <p:spTree>
+      <p:nvGrpSpPr>
+        <p:cNvPr id="1" name=""/>
+        <p:cNvGrpSpPr/>
+        <p:nvPr/>
+      </p:nvGrpSpPr>
+      <p:grpSpPr>
+        <a:xfrm>
+          <a:off x="0" y="0"/>
+          <a:ext cx="0" cy="0"/>
+          <a:chOff x="0" y="0"/>
+          <a:chExt cx="0" cy="0"/>
+        </a:xfrm>
+      </p:grpSpPr>
+      <p:sp>
+        <p:nvSpPr>
+          <p:cNvPr id="2" name="Title 1"/>
+          <p:cNvSpPr>
+            <a:spLocks noGrp="1"/>
+          </p:cNvSpPr>
+          <p:nvPr>
+            <p:ph type="title"/>
+          </p:nvPr>
+        </p:nvSpPr>
+        <p:spPr/>
+        <p:txBody>
+          <a:bodyPr/>
+          <a:lstStyle/>
+          <a:p>
+            <a:r>
+              <a:rPr lang="en-US" dirty="0" err="1" smtClean="0"/>
+              <a:t>AngularJs</a:t>
+            </a:r>
+            <a:r>
+              <a:rPr lang="en-US" dirty="0" smtClean="0"/>
+              <a:t> component</a:t>
+            </a:r>
+            <a:endParaRPr lang="en-US" dirty="0"/>
+          </a:p>
+        </p:txBody>
+      </p:sp>
+      <p:sp>
+        <p:nvSpPr>
+          <p:cNvPr id="3" name="Content Placeholder 2"/>
+          <p:cNvSpPr>
+            <a:spLocks noGrp="1"/>
+          </p:cNvSpPr>
+          <p:nvPr>
+            <p:ph idx="1"/>
+          </p:nvPr>
+        </p:nvSpPr>
+        <p:spPr/>
+        <p:txBody>
+          <a:bodyPr/>
+          <a:lstStyle/>
+          <a:p>
+            <a:r>
+              <a:rPr lang="en-US" dirty="0" err="1" smtClean="0"/>
+              <a:t>AngularJs</a:t>
+            </a:r>
+            <a:r>
+              <a:rPr lang="en-US" dirty="0" smtClean="0"/>
+              <a:t> Template</a:t>
+            </a:r>
+            <a:endParaRPr lang="en-US" dirty="0"/>
+          </a:p>
+        </p:txBody>
+      </p:sp>
+    </p:spTree>
+  </p:cSld>
+  <p:clrMapOvr>
+    <a:masterClrMapping/>
+  </p:clrMapOvr>
+</p:sld>
+</file>
+
+<file path=ppt/slides/slide24.xml><?xml version="1.0" encoding="utf-8"?>
+<p:sld xmlns:a="http://schemas.openxmlformats.org/drawingml/2006/main" xmlns:r="http://schemas.openxmlformats.org/officeDocument/2006/relationships" xmlns:p="http://schemas.openxmlformats.org/presentationml/2006/main">
+  <p:cSld>
+    <p:spTree>
+      <p:nvGrpSpPr>
+        <p:cNvPr id="1" name=""/>
+        <p:cNvGrpSpPr/>
+        <p:nvPr/>
+      </p:nvGrpSpPr>
+      <p:grpSpPr>
+        <a:xfrm>
+          <a:off x="0" y="0"/>
+          <a:ext cx="0" cy="0"/>
+          <a:chOff x="0" y="0"/>
+          <a:chExt cx="0" cy="0"/>
+        </a:xfrm>
+      </p:grpSpPr>
+      <p:sp>
+        <p:nvSpPr>
+          <p:cNvPr id="2" name="Title 1"/>
+          <p:cNvSpPr>
+            <a:spLocks noGrp="1"/>
+          </p:cNvSpPr>
+          <p:nvPr>
+            <p:ph type="title"/>
+          </p:nvPr>
+        </p:nvSpPr>
+        <p:spPr/>
+        <p:txBody>
+          <a:bodyPr/>
+          <a:lstStyle/>
+          <a:p>
+            <a:r>
+              <a:rPr lang="en-US" dirty="0" err="1" smtClean="0"/>
+              <a:t>AngularJs</a:t>
+            </a:r>
+            <a:r>
+              <a:rPr lang="en-US" dirty="0" smtClean="0"/>
+              <a:t> component</a:t>
+            </a:r>
+            <a:endParaRPr lang="en-US" dirty="0"/>
+          </a:p>
+        </p:txBody>
+      </p:sp>
+      <p:sp>
+        <p:nvSpPr>
+          <p:cNvPr id="3" name="Content Placeholder 2"/>
+          <p:cNvSpPr>
+            <a:spLocks noGrp="1"/>
+          </p:cNvSpPr>
+          <p:nvPr>
+            <p:ph idx="1"/>
+          </p:nvPr>
+        </p:nvSpPr>
+        <p:spPr/>
+        <p:txBody>
+          <a:bodyPr/>
+          <a:lstStyle/>
+          <a:p>
+            <a:r>
+              <a:rPr lang="en-US" dirty="0" smtClean="0"/>
+              <a:t>Services</a:t>
+            </a:r>
+          </a:p>
+          <a:p>
+            <a:pPr lvl="1"/>
+            <a:r>
+              <a:rPr lang="en-US" dirty="0" smtClean="0"/>
+              <a:t>Factories</a:t>
+            </a:r>
+          </a:p>
+          <a:p>
+            <a:pPr lvl="1"/>
+            <a:r>
+              <a:rPr lang="en-US" dirty="0" smtClean="0"/>
+              <a:t>Value Service</a:t>
+            </a:r>
+          </a:p>
+          <a:p>
+            <a:pPr lvl="1"/>
+            <a:r>
+              <a:rPr lang="en-US" dirty="0" smtClean="0"/>
+              <a:t>Constant Service</a:t>
+            </a:r>
+          </a:p>
+          <a:p>
+            <a:pPr lvl="1"/>
+            <a:r>
+              <a:rPr lang="en-US" dirty="0" smtClean="0"/>
+              <a:t>Service</a:t>
+            </a:r>
+          </a:p>
+          <a:p>
+            <a:pPr lvl="1"/>
+            <a:r>
+              <a:rPr lang="en-US" dirty="0" smtClean="0"/>
+              <a:t>Provider</a:t>
+            </a:r>
+            <a:endParaRPr lang="en-US" dirty="0"/>
+          </a:p>
+        </p:txBody>
+      </p:sp>
+    </p:spTree>
+  </p:cSld>
+  <p:clrMapOvr>
+    <a:masterClrMapping/>
+  </p:clrMapOvr>
+</p:sld>
+</file>
+
+<file path=ppt/slides/slide25.xml><?xml version="1.0" encoding="utf-8"?>
+<p:sld xmlns:a="http://schemas.openxmlformats.org/drawingml/2006/main" xmlns:r="http://schemas.openxmlformats.org/officeDocument/2006/relationships" xmlns:p="http://schemas.openxmlformats.org/presentationml/2006/main">
+  <p:cSld>
+    <p:spTree>
+      <p:nvGrpSpPr>
+        <p:cNvPr id="1" name=""/>
+        <p:cNvGrpSpPr/>
+        <p:nvPr/>
+      </p:nvGrpSpPr>
+      <p:grpSpPr>
+        <a:xfrm>
+          <a:off x="0" y="0"/>
+          <a:ext cx="0" cy="0"/>
+          <a:chOff x="0" y="0"/>
+          <a:chExt cx="0" cy="0"/>
+        </a:xfrm>
+      </p:grpSpPr>
+      <p:sp>
+        <p:nvSpPr>
+          <p:cNvPr id="2" name="Title 1"/>
+          <p:cNvSpPr>
+            <a:spLocks noGrp="1"/>
+          </p:cNvSpPr>
+          <p:nvPr>
+            <p:ph type="title"/>
+          </p:nvPr>
+        </p:nvSpPr>
+        <p:spPr/>
+        <p:txBody>
+          <a:bodyPr/>
+          <a:lstStyle/>
+          <a:p>
+            <a:r>
+              <a:rPr lang="en-US" dirty="0" err="1" smtClean="0"/>
+              <a:t>AngularJs</a:t>
+            </a:r>
+            <a:r>
+              <a:rPr lang="en-US" dirty="0" smtClean="0"/>
+              <a:t> component</a:t>
+            </a:r>
+            <a:endParaRPr lang="en-US" dirty="0"/>
+          </a:p>
+        </p:txBody>
+      </p:sp>
+      <p:sp>
+        <p:nvSpPr>
+          <p:cNvPr id="3" name="Content Placeholder 2"/>
+          <p:cNvSpPr>
+            <a:spLocks noGrp="1"/>
+          </p:cNvSpPr>
+          <p:nvPr>
+            <p:ph idx="1"/>
+          </p:nvPr>
+        </p:nvSpPr>
+        <p:spPr/>
+        <p:txBody>
+          <a:bodyPr/>
+          <a:lstStyle/>
+          <a:p>
+            <a:r>
+              <a:rPr lang="en-US" dirty="0" smtClean="0"/>
+              <a:t>View Model</a:t>
+            </a:r>
+            <a:endParaRPr lang="en-US" dirty="0"/>
+          </a:p>
+        </p:txBody>
+      </p:sp>
+    </p:spTree>
+  </p:cSld>
+  <p:clrMapOvr>
+    <a:masterClrMapping/>
+  </p:clrMapOvr>
+</p:sld>
+</file>
+
+<file path=ppt/slides/slide26.xml><?xml version="1.0" encoding="utf-8"?>
+<p:sld xmlns:a="http://schemas.openxmlformats.org/drawingml/2006/main" xmlns:r="http://schemas.openxmlformats.org/officeDocument/2006/relationships" xmlns:p="http://schemas.openxmlformats.org/presentationml/2006/main">
+  <p:cSld>
+    <p:spTree>
+      <p:nvGrpSpPr>
+        <p:cNvPr id="1" name=""/>
+        <p:cNvGrpSpPr/>
+        <p:nvPr/>
+      </p:nvGrpSpPr>
+      <p:grpSpPr>
+        <a:xfrm>
+          <a:off x="0" y="0"/>
+          <a:ext cx="0" cy="0"/>
+          <a:chOff x="0" y="0"/>
+          <a:chExt cx="0" cy="0"/>
+        </a:xfrm>
+      </p:grpSpPr>
+      <p:sp>
+        <p:nvSpPr>
+          <p:cNvPr id="2" name="Title 1"/>
+          <p:cNvSpPr>
+            <a:spLocks noGrp="1"/>
+          </p:cNvSpPr>
+          <p:nvPr>
+            <p:ph type="title"/>
+          </p:nvPr>
+        </p:nvSpPr>
+        <p:spPr/>
+        <p:txBody>
+          <a:bodyPr/>
+          <a:lstStyle/>
+          <a:p>
+            <a:r>
+              <a:rPr lang="en-US" dirty="0" err="1" smtClean="0"/>
+              <a:t>AngularJs</a:t>
+            </a:r>
+            <a:r>
+              <a:rPr lang="en-US" dirty="0" smtClean="0"/>
+              <a:t> component</a:t>
+            </a:r>
+            <a:endParaRPr lang="en-US" dirty="0"/>
+          </a:p>
+        </p:txBody>
+      </p:sp>
+      <p:sp>
+        <p:nvSpPr>
+          <p:cNvPr id="3" name="Content Placeholder 2"/>
+          <p:cNvSpPr>
+            <a:spLocks noGrp="1"/>
+          </p:cNvSpPr>
+          <p:nvPr>
+            <p:ph idx="1"/>
+          </p:nvPr>
+        </p:nvSpPr>
+        <p:spPr/>
+        <p:txBody>
+          <a:bodyPr/>
+          <a:lstStyle/>
+          <a:p>
+            <a:r>
+              <a:rPr lang="en-US" dirty="0" err="1" smtClean="0"/>
+              <a:t>Controlers</a:t>
+            </a:r>
+            <a:endParaRPr lang="en-US" dirty="0"/>
+          </a:p>
+        </p:txBody>
+      </p:sp>
+    </p:spTree>
+  </p:cSld>
+  <p:clrMapOvr>
+    <a:masterClrMapping/>
+  </p:clrMapOvr>
+</p:sld>
+</file>
+
+<file path=ppt/slides/slide27.xml><?xml version="1.0" encoding="utf-8"?>
+<p:sld xmlns:a="http://schemas.openxmlformats.org/drawingml/2006/main" xmlns:r="http://schemas.openxmlformats.org/officeDocument/2006/relationships" xmlns:p="http://schemas.openxmlformats.org/presentationml/2006/main">
+  <p:cSld>
+    <p:spTree>
+      <p:nvGrpSpPr>
+        <p:cNvPr id="1" name=""/>
+        <p:cNvGrpSpPr/>
+        <p:nvPr/>
+      </p:nvGrpSpPr>
+      <p:grpSpPr>
+        <a:xfrm>
+          <a:off x="0" y="0"/>
+          <a:ext cx="0" cy="0"/>
+          <a:chOff x="0" y="0"/>
+          <a:chExt cx="0" cy="0"/>
+        </a:xfrm>
+      </p:grpSpPr>
+      <p:sp>
+        <p:nvSpPr>
+          <p:cNvPr id="2" name="Title 1"/>
+          <p:cNvSpPr>
+            <a:spLocks noGrp="1"/>
+          </p:cNvSpPr>
+          <p:nvPr>
+            <p:ph type="title"/>
+          </p:nvPr>
+        </p:nvSpPr>
+        <p:spPr/>
+        <p:txBody>
+          <a:bodyPr/>
+          <a:lstStyle/>
+          <a:p>
+            <a:r>
+              <a:rPr lang="en-US" dirty="0" err="1" smtClean="0"/>
+              <a:t>AngularJs</a:t>
+            </a:r>
+            <a:r>
+              <a:rPr lang="en-US" dirty="0" smtClean="0"/>
+              <a:t> component</a:t>
+            </a:r>
+            <a:endParaRPr lang="en-US" dirty="0"/>
+          </a:p>
+        </p:txBody>
+      </p:sp>
+      <p:sp>
+        <p:nvSpPr>
+          <p:cNvPr id="3" name="Content Placeholder 2"/>
+          <p:cNvSpPr>
+            <a:spLocks noGrp="1"/>
+          </p:cNvSpPr>
+          <p:nvPr>
+            <p:ph idx="1"/>
+          </p:nvPr>
+        </p:nvSpPr>
+        <p:spPr/>
+        <p:txBody>
+          <a:bodyPr/>
+          <a:lstStyle/>
+          <a:p>
+            <a:r>
+              <a:rPr lang="en-US" dirty="0" smtClean="0"/>
+              <a:t>Views</a:t>
+            </a:r>
+            <a:endParaRPr lang="en-US" dirty="0"/>
+          </a:p>
+        </p:txBody>
+      </p:sp>
+    </p:spTree>
+  </p:cSld>
+  <p:clrMapOvr>
+    <a:masterClrMapping/>
+  </p:clrMapOvr>
+</p:sld>
+</file>
+
+<file path=ppt/slides/slide28.xml><?xml version="1.0" encoding="utf-8"?>
+<p:sld xmlns:a="http://schemas.openxmlformats.org/drawingml/2006/main" xmlns:r="http://schemas.openxmlformats.org/officeDocument/2006/relationships" xmlns:p="http://schemas.openxmlformats.org/presentationml/2006/main">
+  <p:cSld>
+    <p:spTree>
+      <p:nvGrpSpPr>
+        <p:cNvPr id="1" name=""/>
+        <p:cNvGrpSpPr/>
+        <p:nvPr/>
+      </p:nvGrpSpPr>
+      <p:grpSpPr>
+        <a:xfrm>
+          <a:off x="0" y="0"/>
+          <a:ext cx="0" cy="0"/>
+          <a:chOff x="0" y="0"/>
+          <a:chExt cx="0" cy="0"/>
+        </a:xfrm>
+      </p:grpSpPr>
+      <p:sp>
+        <p:nvSpPr>
+          <p:cNvPr id="2" name="Title 1"/>
+          <p:cNvSpPr>
+            <a:spLocks noGrp="1"/>
+          </p:cNvSpPr>
+          <p:nvPr>
+            <p:ph type="title"/>
+          </p:nvPr>
+        </p:nvSpPr>
+        <p:spPr/>
+        <p:txBody>
+          <a:bodyPr/>
+          <a:lstStyle/>
+          <a:p>
+            <a:r>
+              <a:rPr lang="en-US" dirty="0" err="1" smtClean="0"/>
+              <a:t>AngularJs</a:t>
+            </a:r>
+            <a:r>
+              <a:rPr lang="en-US" dirty="0" smtClean="0"/>
+              <a:t> component</a:t>
+            </a:r>
+            <a:endParaRPr lang="en-US" dirty="0"/>
+          </a:p>
+        </p:txBody>
+      </p:sp>
+      <p:sp>
+        <p:nvSpPr>
+          <p:cNvPr id="3" name="Content Placeholder 2"/>
+          <p:cNvSpPr>
+            <a:spLocks noGrp="1"/>
+          </p:cNvSpPr>
+          <p:nvPr>
+            <p:ph idx="1"/>
+          </p:nvPr>
+        </p:nvSpPr>
+        <p:spPr/>
+        <p:txBody>
+          <a:bodyPr/>
+          <a:lstStyle/>
+          <a:p>
+            <a:r>
+              <a:rPr lang="en-US" dirty="0" smtClean="0"/>
+              <a:t>Directives</a:t>
+            </a:r>
+            <a:endParaRPr lang="en-US" dirty="0"/>
+          </a:p>
+        </p:txBody>
+      </p:sp>
+    </p:spTree>
+  </p:cSld>
+  <p:clrMapOvr>
+    <a:masterClrMapping/>
+  </p:clrMapOvr>
+</p:sld>
+</file>
+
+<file path=ppt/slides/slide29.xml><?xml version="1.0" encoding="utf-8"?>
+<p:sld xmlns:a="http://schemas.openxmlformats.org/drawingml/2006/main" xmlns:r="http://schemas.openxmlformats.org/officeDocument/2006/relationships" xmlns:p="http://schemas.openxmlformats.org/presentationml/2006/main">
+  <p:cSld>
+    <p:spTree>
+      <p:nvGrpSpPr>
+        <p:cNvPr id="1" name=""/>
+        <p:cNvGrpSpPr/>
+        <p:nvPr/>
+      </p:nvGrpSpPr>
+      <p:grpSpPr>
+        <a:xfrm>
+          <a:off x="0" y="0"/>
+          <a:ext cx="0" cy="0"/>
+          <a:chOff x="0" y="0"/>
+          <a:chExt cx="0" cy="0"/>
+        </a:xfrm>
+      </p:grpSpPr>
+      <p:sp>
+        <p:nvSpPr>
+          <p:cNvPr id="2" name="Title 1"/>
+          <p:cNvSpPr>
+            <a:spLocks noGrp="1"/>
+          </p:cNvSpPr>
+          <p:nvPr>
+            <p:ph type="title"/>
+          </p:nvPr>
+        </p:nvSpPr>
+        <p:spPr/>
+        <p:txBody>
+          <a:bodyPr/>
+          <a:lstStyle/>
+          <a:p>
+            <a:r>
+              <a:rPr lang="en-US" dirty="0" err="1" smtClean="0"/>
+              <a:t>AngularJs</a:t>
+            </a:r>
+            <a:r>
+              <a:rPr lang="en-US" dirty="0" smtClean="0"/>
+              <a:t> component</a:t>
+            </a:r>
+            <a:endParaRPr lang="en-US" dirty="0"/>
+          </a:p>
+        </p:txBody>
+      </p:sp>
+      <p:sp>
+        <p:nvSpPr>
+          <p:cNvPr id="3" name="Content Placeholder 2"/>
+          <p:cNvSpPr>
+            <a:spLocks noGrp="1"/>
+          </p:cNvSpPr>
+          <p:nvPr>
+            <p:ph idx="1"/>
+          </p:nvPr>
+        </p:nvSpPr>
+        <p:spPr/>
+        <p:txBody>
+          <a:bodyPr/>
+          <a:lstStyle/>
+          <a:p>
+            <a:r>
+              <a:rPr lang="en-US" dirty="0" smtClean="0"/>
+              <a:t>Filters</a:t>
+            </a:r>
+            <a:endParaRPr lang="en-US" dirty="0"/>
+          </a:p>
+        </p:txBody>
+      </p:sp>
+    </p:spTree>
   </p:cSld>
   <p:clrMapOvr>
     <a:masterClrMapping/>
@@ -3413,7 +6527,7 @@
           <a:blip r:embed="rId2">
             <a:extLst>
               <a:ext uri="{28A0092B-C50C-407E-A947-70E740481C1C}">
-                <a14:useLocalDpi xmlns:a14="http://schemas.microsoft.com/office/drawing/2010/main" val="0"/>
+                <a14:useLocalDpi xmlns:a14="http://schemas.microsoft.com/office/drawing/2010/main" xmlns="" val="0"/>
               </a:ext>
             </a:extLst>
           </a:blip>
@@ -3462,9 +6576,801 @@
     </p:spTree>
     <p:extLst>
       <p:ext uri="{BB962C8B-B14F-4D97-AF65-F5344CB8AC3E}">
-        <p14:creationId xmlns:p14="http://schemas.microsoft.com/office/powerpoint/2010/main" val="241145940"/>
+        <p14:creationId xmlns:p14="http://schemas.microsoft.com/office/powerpoint/2010/main" xmlns="" val="241145940"/>
       </p:ext>
     </p:extLst>
+  </p:cSld>
+  <p:clrMapOvr>
+    <a:masterClrMapping/>
+  </p:clrMapOvr>
+</p:sld>
+</file>
+
+<file path=ppt/slides/slide30.xml><?xml version="1.0" encoding="utf-8"?>
+<p:sld xmlns:a="http://schemas.openxmlformats.org/drawingml/2006/main" xmlns:r="http://schemas.openxmlformats.org/officeDocument/2006/relationships" xmlns:p="http://schemas.openxmlformats.org/presentationml/2006/main">
+  <p:cSld>
+    <p:spTree>
+      <p:nvGrpSpPr>
+        <p:cNvPr id="1" name=""/>
+        <p:cNvGrpSpPr/>
+        <p:nvPr/>
+      </p:nvGrpSpPr>
+      <p:grpSpPr>
+        <a:xfrm>
+          <a:off x="0" y="0"/>
+          <a:ext cx="0" cy="0"/>
+          <a:chOff x="0" y="0"/>
+          <a:chExt cx="0" cy="0"/>
+        </a:xfrm>
+      </p:grpSpPr>
+      <p:sp>
+        <p:nvSpPr>
+          <p:cNvPr id="2" name="Title 1"/>
+          <p:cNvSpPr>
+            <a:spLocks noGrp="1"/>
+          </p:cNvSpPr>
+          <p:nvPr>
+            <p:ph type="title"/>
+          </p:nvPr>
+        </p:nvSpPr>
+        <p:spPr/>
+        <p:txBody>
+          <a:bodyPr/>
+          <a:lstStyle/>
+          <a:p>
+            <a:r>
+              <a:rPr lang="en-US" dirty="0" err="1" smtClean="0"/>
+              <a:t>AngularJs</a:t>
+            </a:r>
+            <a:r>
+              <a:rPr lang="en-US" dirty="0" smtClean="0"/>
+              <a:t> component</a:t>
+            </a:r>
+            <a:endParaRPr lang="en-US" dirty="0"/>
+          </a:p>
+        </p:txBody>
+      </p:sp>
+      <p:sp>
+        <p:nvSpPr>
+          <p:cNvPr id="3" name="Content Placeholder 2"/>
+          <p:cNvSpPr>
+            <a:spLocks noGrp="1"/>
+          </p:cNvSpPr>
+          <p:nvPr>
+            <p:ph idx="1"/>
+          </p:nvPr>
+        </p:nvSpPr>
+        <p:spPr/>
+        <p:txBody>
+          <a:bodyPr/>
+          <a:lstStyle/>
+          <a:p>
+            <a:r>
+              <a:rPr lang="en-US" dirty="0" smtClean="0"/>
+              <a:t>Validation</a:t>
+            </a:r>
+            <a:endParaRPr lang="en-US" dirty="0"/>
+          </a:p>
+        </p:txBody>
+      </p:sp>
+    </p:spTree>
+  </p:cSld>
+  <p:clrMapOvr>
+    <a:masterClrMapping/>
+  </p:clrMapOvr>
+</p:sld>
+</file>
+
+<file path=ppt/slides/slide31.xml><?xml version="1.0" encoding="utf-8"?>
+<p:sld xmlns:a="http://schemas.openxmlformats.org/drawingml/2006/main" xmlns:r="http://schemas.openxmlformats.org/officeDocument/2006/relationships" xmlns:p="http://schemas.openxmlformats.org/presentationml/2006/main">
+  <p:cSld>
+    <p:spTree>
+      <p:nvGrpSpPr>
+        <p:cNvPr id="1" name=""/>
+        <p:cNvGrpSpPr/>
+        <p:nvPr/>
+      </p:nvGrpSpPr>
+      <p:grpSpPr>
+        <a:xfrm>
+          <a:off x="0" y="0"/>
+          <a:ext cx="0" cy="0"/>
+          <a:chOff x="0" y="0"/>
+          <a:chExt cx="0" cy="0"/>
+        </a:xfrm>
+      </p:grpSpPr>
+      <p:sp>
+        <p:nvSpPr>
+          <p:cNvPr id="2" name="Title 1"/>
+          <p:cNvSpPr>
+            <a:spLocks noGrp="1"/>
+          </p:cNvSpPr>
+          <p:nvPr>
+            <p:ph type="title"/>
+          </p:nvPr>
+        </p:nvSpPr>
+        <p:spPr/>
+        <p:txBody>
+          <a:bodyPr/>
+          <a:lstStyle/>
+          <a:p>
+            <a:r>
+              <a:rPr lang="en-US" dirty="0" err="1" smtClean="0"/>
+              <a:t>AngularJs</a:t>
+            </a:r>
+            <a:r>
+              <a:rPr lang="en-US" dirty="0" smtClean="0"/>
+              <a:t> component</a:t>
+            </a:r>
+            <a:endParaRPr lang="en-US" dirty="0"/>
+          </a:p>
+        </p:txBody>
+      </p:sp>
+      <p:sp>
+        <p:nvSpPr>
+          <p:cNvPr id="3" name="Content Placeholder 2"/>
+          <p:cNvSpPr>
+            <a:spLocks noGrp="1"/>
+          </p:cNvSpPr>
+          <p:nvPr>
+            <p:ph idx="1"/>
+          </p:nvPr>
+        </p:nvSpPr>
+        <p:spPr/>
+        <p:txBody>
+          <a:bodyPr/>
+          <a:lstStyle/>
+          <a:p>
+            <a:r>
+              <a:rPr lang="en-US" dirty="0" smtClean="0"/>
+              <a:t>Dependency Injection</a:t>
+            </a:r>
+            <a:endParaRPr lang="en-US" dirty="0"/>
+          </a:p>
+        </p:txBody>
+      </p:sp>
+    </p:spTree>
+  </p:cSld>
+  <p:clrMapOvr>
+    <a:masterClrMapping/>
+  </p:clrMapOvr>
+</p:sld>
+</file>
+
+<file path=ppt/slides/slide32.xml><?xml version="1.0" encoding="utf-8"?>
+<p:sld xmlns:a="http://schemas.openxmlformats.org/drawingml/2006/main" xmlns:r="http://schemas.openxmlformats.org/officeDocument/2006/relationships" xmlns:p="http://schemas.openxmlformats.org/presentationml/2006/main">
+  <p:cSld>
+    <p:spTree>
+      <p:nvGrpSpPr>
+        <p:cNvPr id="1" name=""/>
+        <p:cNvGrpSpPr/>
+        <p:nvPr/>
+      </p:nvGrpSpPr>
+      <p:grpSpPr>
+        <a:xfrm>
+          <a:off x="0" y="0"/>
+          <a:ext cx="0" cy="0"/>
+          <a:chOff x="0" y="0"/>
+          <a:chExt cx="0" cy="0"/>
+        </a:xfrm>
+      </p:grpSpPr>
+      <p:sp>
+        <p:nvSpPr>
+          <p:cNvPr id="2" name="Title 1"/>
+          <p:cNvSpPr>
+            <a:spLocks noGrp="1"/>
+          </p:cNvSpPr>
+          <p:nvPr>
+            <p:ph type="title"/>
+          </p:nvPr>
+        </p:nvSpPr>
+        <p:spPr/>
+        <p:txBody>
+          <a:bodyPr/>
+          <a:lstStyle/>
+          <a:p>
+            <a:r>
+              <a:rPr lang="en-US" dirty="0" err="1" smtClean="0"/>
+              <a:t>AngularJs</a:t>
+            </a:r>
+            <a:r>
+              <a:rPr lang="en-US" dirty="0" smtClean="0"/>
+              <a:t> component</a:t>
+            </a:r>
+            <a:endParaRPr lang="en-US" dirty="0"/>
+          </a:p>
+        </p:txBody>
+      </p:sp>
+      <p:sp>
+        <p:nvSpPr>
+          <p:cNvPr id="3" name="Content Placeholder 2"/>
+          <p:cNvSpPr>
+            <a:spLocks noGrp="1"/>
+          </p:cNvSpPr>
+          <p:nvPr>
+            <p:ph idx="1"/>
+          </p:nvPr>
+        </p:nvSpPr>
+        <p:spPr/>
+        <p:txBody>
+          <a:bodyPr/>
+          <a:lstStyle/>
+          <a:p>
+            <a:r>
+              <a:rPr lang="en-US" dirty="0" smtClean="0"/>
+              <a:t>Testing</a:t>
+            </a:r>
+            <a:endParaRPr lang="en-US" dirty="0"/>
+          </a:p>
+        </p:txBody>
+      </p:sp>
+    </p:spTree>
+  </p:cSld>
+  <p:clrMapOvr>
+    <a:masterClrMapping/>
+  </p:clrMapOvr>
+</p:sld>
+</file>
+
+<file path=ppt/slides/slide33.xml><?xml version="1.0" encoding="utf-8"?>
+<p:sld xmlns:a="http://schemas.openxmlformats.org/drawingml/2006/main" xmlns:r="http://schemas.openxmlformats.org/officeDocument/2006/relationships" xmlns:p="http://schemas.openxmlformats.org/presentationml/2006/main">
+  <p:cSld>
+    <p:spTree>
+      <p:nvGrpSpPr>
+        <p:cNvPr id="1" name=""/>
+        <p:cNvGrpSpPr/>
+        <p:nvPr/>
+      </p:nvGrpSpPr>
+      <p:grpSpPr>
+        <a:xfrm>
+          <a:off x="0" y="0"/>
+          <a:ext cx="0" cy="0"/>
+          <a:chOff x="0" y="0"/>
+          <a:chExt cx="0" cy="0"/>
+        </a:xfrm>
+      </p:grpSpPr>
+      <p:sp>
+        <p:nvSpPr>
+          <p:cNvPr id="2" name="Title 1"/>
+          <p:cNvSpPr>
+            <a:spLocks noGrp="1"/>
+          </p:cNvSpPr>
+          <p:nvPr>
+            <p:ph type="title"/>
+          </p:nvPr>
+        </p:nvSpPr>
+        <p:spPr/>
+        <p:txBody>
+          <a:bodyPr/>
+          <a:lstStyle/>
+          <a:p>
+            <a:r>
+              <a:rPr lang="en-US" dirty="0" err="1" smtClean="0"/>
+              <a:t>AngularJs</a:t>
+            </a:r>
+            <a:r>
+              <a:rPr lang="en-US" dirty="0" smtClean="0"/>
+              <a:t> Working Process</a:t>
+            </a:r>
+            <a:endParaRPr lang="en-US" dirty="0"/>
+          </a:p>
+        </p:txBody>
+      </p:sp>
+      <p:pic>
+        <p:nvPicPr>
+          <p:cNvPr id="4" name="Content Placeholder 3" descr="EvHjB.png"/>
+          <p:cNvPicPr>
+            <a:picLocks noGrp="1" noChangeAspect="1"/>
+          </p:cNvPicPr>
+          <p:nvPr>
+            <p:ph idx="1"/>
+          </p:nvPr>
+        </p:nvPicPr>
+        <p:blipFill>
+          <a:blip r:embed="rId2"/>
+          <a:stretch>
+            <a:fillRect/>
+          </a:stretch>
+        </p:blipFill>
+        <p:spPr>
+          <a:xfrm>
+            <a:off x="2353239" y="2162538"/>
+            <a:ext cx="4437521" cy="3401287"/>
+          </a:xfrm>
+        </p:spPr>
+      </p:pic>
+    </p:spTree>
+  </p:cSld>
+  <p:clrMapOvr>
+    <a:masterClrMapping/>
+  </p:clrMapOvr>
+</p:sld>
+</file>
+
+<file path=ppt/slides/slide34.xml><?xml version="1.0" encoding="utf-8"?>
+<p:sld xmlns:a="http://schemas.openxmlformats.org/drawingml/2006/main" xmlns:r="http://schemas.openxmlformats.org/officeDocument/2006/relationships" xmlns:p="http://schemas.openxmlformats.org/presentationml/2006/main">
+  <p:cSld>
+    <p:spTree>
+      <p:nvGrpSpPr>
+        <p:cNvPr id="1" name=""/>
+        <p:cNvGrpSpPr/>
+        <p:nvPr/>
+      </p:nvGrpSpPr>
+      <p:grpSpPr>
+        <a:xfrm>
+          <a:off x="0" y="0"/>
+          <a:ext cx="0" cy="0"/>
+          <a:chOff x="0" y="0"/>
+          <a:chExt cx="0" cy="0"/>
+        </a:xfrm>
+      </p:grpSpPr>
+      <p:sp>
+        <p:nvSpPr>
+          <p:cNvPr id="2" name="Title 1"/>
+          <p:cNvSpPr>
+            <a:spLocks noGrp="1"/>
+          </p:cNvSpPr>
+          <p:nvPr>
+            <p:ph type="title"/>
+          </p:nvPr>
+        </p:nvSpPr>
+        <p:spPr/>
+        <p:txBody>
+          <a:bodyPr/>
+          <a:lstStyle/>
+          <a:p>
+            <a:r>
+              <a:rPr lang="en-US" dirty="0" err="1" smtClean="0"/>
+              <a:t>AngularJs</a:t>
+            </a:r>
+            <a:r>
+              <a:rPr lang="en-US" dirty="0" smtClean="0"/>
+              <a:t> Working Process</a:t>
+            </a:r>
+            <a:endParaRPr lang="en-US" dirty="0"/>
+          </a:p>
+        </p:txBody>
+      </p:sp>
+      <p:sp>
+        <p:nvSpPr>
+          <p:cNvPr id="3" name="Content Placeholder 2"/>
+          <p:cNvSpPr>
+            <a:spLocks noGrp="1"/>
+          </p:cNvSpPr>
+          <p:nvPr>
+            <p:ph idx="1"/>
+          </p:nvPr>
+        </p:nvSpPr>
+        <p:spPr/>
+        <p:txBody>
+          <a:bodyPr/>
+          <a:lstStyle/>
+          <a:p>
+            <a:r>
+              <a:rPr lang="en-US" dirty="0" smtClean="0"/>
+              <a:t>Compilation Phase</a:t>
+            </a:r>
+          </a:p>
+          <a:p>
+            <a:pPr lvl="1"/>
+            <a:r>
+              <a:rPr lang="en-US" dirty="0" smtClean="0"/>
+              <a:t>the </a:t>
+            </a:r>
+            <a:r>
+              <a:rPr lang="en-US" dirty="0" err="1" smtClean="0">
+                <a:hlinkClick r:id="rId2"/>
+              </a:rPr>
+              <a:t>ng</a:t>
+            </a:r>
+            <a:r>
+              <a:rPr lang="en-US" dirty="0" smtClean="0">
+                <a:hlinkClick r:id="rId2"/>
+              </a:rPr>
+              <a:t>-model</a:t>
+            </a:r>
+            <a:r>
+              <a:rPr lang="en-US" dirty="0" smtClean="0"/>
+              <a:t> and </a:t>
+            </a:r>
+            <a:r>
+              <a:rPr lang="en-US" dirty="0" smtClean="0">
+                <a:hlinkClick r:id="rId3"/>
+              </a:rPr>
+              <a:t>input</a:t>
+            </a:r>
+            <a:r>
+              <a:rPr lang="en-US" dirty="0" smtClean="0"/>
+              <a:t> </a:t>
+            </a:r>
+            <a:r>
+              <a:rPr lang="en-US" dirty="0" smtClean="0">
+                <a:hlinkClick r:id="rId4"/>
+              </a:rPr>
+              <a:t>directive</a:t>
+            </a:r>
+            <a:r>
+              <a:rPr lang="en-US" dirty="0" smtClean="0"/>
+              <a:t> set up a </a:t>
+            </a:r>
+            <a:r>
+              <a:rPr lang="en-US" dirty="0" err="1" smtClean="0"/>
+              <a:t>keydown</a:t>
+            </a:r>
+            <a:r>
+              <a:rPr lang="en-US" dirty="0" smtClean="0"/>
+              <a:t> listener on the &lt;input&gt; </a:t>
+            </a:r>
+            <a:r>
+              <a:rPr lang="en-US" dirty="0" smtClean="0"/>
+              <a:t>control</a:t>
+            </a:r>
+          </a:p>
+          <a:p>
+            <a:pPr lvl="1"/>
+            <a:r>
+              <a:rPr lang="en-US" dirty="0" smtClean="0"/>
+              <a:t>the </a:t>
+            </a:r>
+            <a:r>
+              <a:rPr lang="en-US" dirty="0" smtClean="0">
+                <a:hlinkClick r:id="rId5"/>
+              </a:rPr>
+              <a:t>interpolation</a:t>
+            </a:r>
+            <a:r>
+              <a:rPr lang="en-US" dirty="0" smtClean="0"/>
+              <a:t> sets up a </a:t>
+            </a:r>
+            <a:r>
+              <a:rPr lang="en-US" dirty="0" smtClean="0">
+                <a:hlinkClick r:id="rId6"/>
+              </a:rPr>
+              <a:t>$watch</a:t>
+            </a:r>
+            <a:r>
+              <a:rPr lang="en-US" dirty="0" smtClean="0"/>
+              <a:t> to be notified of name changes.</a:t>
+            </a:r>
+          </a:p>
+          <a:p>
+            <a:r>
+              <a:rPr lang="en-US" dirty="0" smtClean="0"/>
+              <a:t>Runtime Phase</a:t>
+            </a:r>
+          </a:p>
+          <a:p>
+            <a:pPr lvl="1"/>
+            <a:r>
+              <a:rPr lang="en-US" dirty="0" smtClean="0"/>
+              <a:t>Pressing an 'X' key causes the browser to emit a </a:t>
+            </a:r>
+            <a:r>
+              <a:rPr lang="en-US" dirty="0" err="1" smtClean="0"/>
+              <a:t>keydown</a:t>
+            </a:r>
+            <a:r>
+              <a:rPr lang="en-US" dirty="0" smtClean="0"/>
+              <a:t> event on the input control.</a:t>
+            </a:r>
+          </a:p>
+          <a:p>
+            <a:pPr lvl="1"/>
+            <a:endParaRPr lang="en-US" dirty="0"/>
+          </a:p>
+        </p:txBody>
+      </p:sp>
+    </p:spTree>
+  </p:cSld>
+  <p:clrMapOvr>
+    <a:masterClrMapping/>
+  </p:clrMapOvr>
+</p:sld>
+</file>
+
+<file path=ppt/slides/slide35.xml><?xml version="1.0" encoding="utf-8"?>
+<p:sld xmlns:a="http://schemas.openxmlformats.org/drawingml/2006/main" xmlns:r="http://schemas.openxmlformats.org/officeDocument/2006/relationships" xmlns:p="http://schemas.openxmlformats.org/presentationml/2006/main">
+  <p:cSld>
+    <p:spTree>
+      <p:nvGrpSpPr>
+        <p:cNvPr id="1" name=""/>
+        <p:cNvGrpSpPr/>
+        <p:nvPr/>
+      </p:nvGrpSpPr>
+      <p:grpSpPr>
+        <a:xfrm>
+          <a:off x="0" y="0"/>
+          <a:ext cx="0" cy="0"/>
+          <a:chOff x="0" y="0"/>
+          <a:chExt cx="0" cy="0"/>
+        </a:xfrm>
+      </p:grpSpPr>
+      <p:sp>
+        <p:nvSpPr>
+          <p:cNvPr id="2" name="Title 1"/>
+          <p:cNvSpPr>
+            <a:spLocks noGrp="1"/>
+          </p:cNvSpPr>
+          <p:nvPr>
+            <p:ph type="title"/>
+          </p:nvPr>
+        </p:nvSpPr>
+        <p:spPr/>
+        <p:txBody>
+          <a:bodyPr/>
+          <a:lstStyle/>
+          <a:p>
+            <a:r>
+              <a:rPr lang="en-US" dirty="0" err="1" smtClean="0"/>
+              <a:t>AngularJs</a:t>
+            </a:r>
+            <a:r>
+              <a:rPr lang="en-US" dirty="0" smtClean="0"/>
+              <a:t> Working Process</a:t>
+            </a:r>
+            <a:endParaRPr lang="en-US" dirty="0"/>
+          </a:p>
+        </p:txBody>
+      </p:sp>
+      <p:sp>
+        <p:nvSpPr>
+          <p:cNvPr id="3" name="Content Placeholder 2"/>
+          <p:cNvSpPr>
+            <a:spLocks noGrp="1"/>
+          </p:cNvSpPr>
+          <p:nvPr>
+            <p:ph idx="1"/>
+          </p:nvPr>
+        </p:nvSpPr>
+        <p:spPr/>
+        <p:txBody>
+          <a:bodyPr/>
+          <a:lstStyle/>
+          <a:p>
+            <a:pPr lvl="1"/>
+            <a:r>
+              <a:rPr lang="en-US" dirty="0" smtClean="0"/>
+              <a:t>The </a:t>
+            </a:r>
+            <a:r>
+              <a:rPr lang="en-US" dirty="0" smtClean="0">
+                <a:hlinkClick r:id="rId2"/>
+              </a:rPr>
+              <a:t>input</a:t>
+            </a:r>
+            <a:r>
+              <a:rPr lang="en-US" dirty="0" smtClean="0"/>
+              <a:t> directive captures the change to the input's value and calls </a:t>
+            </a:r>
+            <a:r>
+              <a:rPr lang="en-US" dirty="0" smtClean="0">
+                <a:hlinkClick r:id="rId3"/>
+              </a:rPr>
+              <a:t>$apply</a:t>
+            </a:r>
+            <a:r>
+              <a:rPr lang="en-US" dirty="0" smtClean="0"/>
+              <a:t>("name = 'X';")to update the application model inside the Angular execution context.</a:t>
+            </a:r>
+          </a:p>
+          <a:p>
+            <a:pPr lvl="1"/>
+            <a:r>
+              <a:rPr lang="en-US" dirty="0" smtClean="0"/>
+              <a:t>Angular applies the name = 'X'; to the model.</a:t>
+            </a:r>
+          </a:p>
+          <a:p>
+            <a:pPr lvl="1"/>
+            <a:r>
+              <a:rPr lang="en-US" dirty="0" smtClean="0"/>
+              <a:t>The </a:t>
+            </a:r>
+            <a:r>
+              <a:rPr lang="en-US" dirty="0" smtClean="0">
+                <a:hlinkClick r:id="rId3"/>
+              </a:rPr>
+              <a:t>$digest</a:t>
+            </a:r>
+            <a:r>
+              <a:rPr lang="en-US" dirty="0" smtClean="0"/>
+              <a:t> loop begins</a:t>
+            </a:r>
+          </a:p>
+          <a:p>
+            <a:pPr lvl="1"/>
+            <a:r>
+              <a:rPr lang="en-US" dirty="0" smtClean="0"/>
+              <a:t>The </a:t>
+            </a:r>
+            <a:r>
+              <a:rPr lang="en-US" dirty="0" smtClean="0">
+                <a:hlinkClick r:id="rId3"/>
+              </a:rPr>
+              <a:t>$watch</a:t>
+            </a:r>
+            <a:r>
+              <a:rPr lang="en-US" dirty="0" smtClean="0"/>
+              <a:t> list detects a change on the name property and notifies the </a:t>
+            </a:r>
+            <a:r>
+              <a:rPr lang="en-US" dirty="0" smtClean="0">
+                <a:hlinkClick r:id="rId4"/>
+              </a:rPr>
+              <a:t>interpolation</a:t>
+            </a:r>
+            <a:r>
+              <a:rPr lang="en-US" dirty="0" smtClean="0"/>
+              <a:t>, which in turn updates the DOM.</a:t>
+            </a:r>
+          </a:p>
+          <a:p>
+            <a:pPr lvl="1"/>
+            <a:endParaRPr lang="en-US" dirty="0"/>
+          </a:p>
+        </p:txBody>
+      </p:sp>
+    </p:spTree>
+  </p:cSld>
+  <p:clrMapOvr>
+    <a:masterClrMapping/>
+  </p:clrMapOvr>
+</p:sld>
+</file>
+
+<file path=ppt/slides/slide36.xml><?xml version="1.0" encoding="utf-8"?>
+<p:sld xmlns:a="http://schemas.openxmlformats.org/drawingml/2006/main" xmlns:r="http://schemas.openxmlformats.org/officeDocument/2006/relationships" xmlns:p="http://schemas.openxmlformats.org/presentationml/2006/main">
+  <p:cSld>
+    <p:spTree>
+      <p:nvGrpSpPr>
+        <p:cNvPr id="1" name=""/>
+        <p:cNvGrpSpPr/>
+        <p:nvPr/>
+      </p:nvGrpSpPr>
+      <p:grpSpPr>
+        <a:xfrm>
+          <a:off x="0" y="0"/>
+          <a:ext cx="0" cy="0"/>
+          <a:chOff x="0" y="0"/>
+          <a:chExt cx="0" cy="0"/>
+        </a:xfrm>
+      </p:grpSpPr>
+      <p:sp>
+        <p:nvSpPr>
+          <p:cNvPr id="2" name="Title 1"/>
+          <p:cNvSpPr>
+            <a:spLocks noGrp="1"/>
+          </p:cNvSpPr>
+          <p:nvPr>
+            <p:ph type="title"/>
+          </p:nvPr>
+        </p:nvSpPr>
+        <p:spPr/>
+        <p:txBody>
+          <a:bodyPr/>
+          <a:lstStyle/>
+          <a:p>
+            <a:r>
+              <a:rPr lang="en-US" dirty="0" err="1" smtClean="0"/>
+              <a:t>AngularJs</a:t>
+            </a:r>
+            <a:r>
+              <a:rPr lang="en-US" dirty="0" smtClean="0"/>
+              <a:t> Working Process</a:t>
+            </a:r>
+            <a:endParaRPr lang="en-US" dirty="0"/>
+          </a:p>
+        </p:txBody>
+      </p:sp>
+      <p:sp>
+        <p:nvSpPr>
+          <p:cNvPr id="3" name="Content Placeholder 2"/>
+          <p:cNvSpPr>
+            <a:spLocks noGrp="1"/>
+          </p:cNvSpPr>
+          <p:nvPr>
+            <p:ph idx="1"/>
+          </p:nvPr>
+        </p:nvSpPr>
+        <p:spPr/>
+        <p:txBody>
+          <a:bodyPr/>
+          <a:lstStyle/>
+          <a:p>
+            <a:pPr lvl="1"/>
+            <a:r>
+              <a:rPr lang="en-US" dirty="0" smtClean="0"/>
+              <a:t>Angular exits the execution context, which in turn exits the </a:t>
+            </a:r>
+            <a:r>
+              <a:rPr lang="en-US" dirty="0" err="1" smtClean="0"/>
+              <a:t>keydown</a:t>
+            </a:r>
+            <a:r>
+              <a:rPr lang="en-US" dirty="0" smtClean="0"/>
+              <a:t> event and with it the JavaScript execution context.</a:t>
+            </a:r>
+          </a:p>
+          <a:p>
+            <a:pPr lvl="1"/>
+            <a:r>
+              <a:rPr lang="en-US" dirty="0" smtClean="0"/>
+              <a:t>The browser re-renders the view with update text.</a:t>
+            </a:r>
+          </a:p>
+          <a:p>
+            <a:pPr lvl="1"/>
+            <a:endParaRPr lang="en-US" dirty="0"/>
+          </a:p>
+        </p:txBody>
+      </p:sp>
+    </p:spTree>
+  </p:cSld>
+  <p:clrMapOvr>
+    <a:masterClrMapping/>
+  </p:clrMapOvr>
+</p:sld>
+</file>
+
+<file path=ppt/slides/slide37.xml><?xml version="1.0" encoding="utf-8"?>
+<p:sld xmlns:a="http://schemas.openxmlformats.org/drawingml/2006/main" xmlns:r="http://schemas.openxmlformats.org/officeDocument/2006/relationships" xmlns:p="http://schemas.openxmlformats.org/presentationml/2006/main">
+  <p:cSld>
+    <p:spTree>
+      <p:nvGrpSpPr>
+        <p:cNvPr id="1" name=""/>
+        <p:cNvGrpSpPr/>
+        <p:nvPr/>
+      </p:nvGrpSpPr>
+      <p:grpSpPr>
+        <a:xfrm>
+          <a:off x="0" y="0"/>
+          <a:ext cx="0" cy="0"/>
+          <a:chOff x="0" y="0"/>
+          <a:chExt cx="0" cy="0"/>
+        </a:xfrm>
+      </p:grpSpPr>
+      <p:sp>
+        <p:nvSpPr>
+          <p:cNvPr id="2" name="Title 1"/>
+          <p:cNvSpPr>
+            <a:spLocks noGrp="1"/>
+          </p:cNvSpPr>
+          <p:nvPr>
+            <p:ph type="title"/>
+          </p:nvPr>
+        </p:nvSpPr>
+        <p:spPr/>
+        <p:txBody>
+          <a:bodyPr/>
+          <a:lstStyle/>
+          <a:p>
+            <a:endParaRPr lang="en-US" dirty="0"/>
+          </a:p>
+        </p:txBody>
+      </p:sp>
+      <p:pic>
+        <p:nvPicPr>
+          <p:cNvPr id="4" name="Content Placeholder 3" descr="thanks.jpg"/>
+          <p:cNvPicPr>
+            <a:picLocks noGrp="1" noChangeAspect="1"/>
+          </p:cNvPicPr>
+          <p:nvPr>
+            <p:ph idx="1"/>
+          </p:nvPr>
+        </p:nvPicPr>
+        <p:blipFill>
+          <a:blip r:embed="rId2"/>
+          <a:stretch>
+            <a:fillRect/>
+          </a:stretch>
+        </p:blipFill>
+        <p:spPr>
+          <a:xfrm>
+            <a:off x="2319337" y="2286794"/>
+            <a:ext cx="4505325" cy="3152775"/>
+          </a:xfrm>
+        </p:spPr>
+      </p:pic>
+    </p:spTree>
   </p:cSld>
   <p:clrMapOvr>
     <a:masterClrMapping/>
@@ -3565,7 +7471,7 @@
           <a:blip r:embed="rId2">
             <a:extLst>
               <a:ext uri="{28A0092B-C50C-407E-A947-70E740481C1C}">
-                <a14:useLocalDpi xmlns:a14="http://schemas.microsoft.com/office/drawing/2010/main" val="0"/>
+                <a14:useLocalDpi xmlns:a14="http://schemas.microsoft.com/office/drawing/2010/main" xmlns="" val="0"/>
               </a:ext>
             </a:extLst>
           </a:blip>
@@ -3586,7 +7492,7 @@
     </p:spTree>
     <p:extLst>
       <p:ext uri="{BB962C8B-B14F-4D97-AF65-F5344CB8AC3E}">
-        <p14:creationId xmlns:p14="http://schemas.microsoft.com/office/powerpoint/2010/main" val="905673591"/>
+        <p14:creationId xmlns:p14="http://schemas.microsoft.com/office/powerpoint/2010/main" xmlns="" val="905673591"/>
       </p:ext>
     </p:extLst>
   </p:cSld>
@@ -3769,7 +7675,7 @@
     </p:spTree>
     <p:extLst>
       <p:ext uri="{BB962C8B-B14F-4D97-AF65-F5344CB8AC3E}">
-        <p14:creationId xmlns:p14="http://schemas.microsoft.com/office/powerpoint/2010/main" val="323403614"/>
+        <p14:creationId xmlns:p14="http://schemas.microsoft.com/office/powerpoint/2010/main" xmlns="" val="323403614"/>
       </p:ext>
     </p:extLst>
   </p:cSld>
@@ -3877,14 +7783,13 @@
               <a:rPr lang="en-US" dirty="0"/>
               <a:t>" object.</a:t>
             </a:r>
-            <a:endParaRPr lang="en-US" dirty="0"/>
           </a:p>
         </p:txBody>
       </p:sp>
     </p:spTree>
     <p:extLst>
       <p:ext uri="{BB962C8B-B14F-4D97-AF65-F5344CB8AC3E}">
-        <p14:creationId xmlns:p14="http://schemas.microsoft.com/office/powerpoint/2010/main" val="2374592750"/>
+        <p14:creationId xmlns:p14="http://schemas.microsoft.com/office/powerpoint/2010/main" xmlns="" val="2374592750"/>
       </p:ext>
     </p:extLst>
   </p:cSld>
@@ -3948,7 +7853,7 @@
           <a:blip r:embed="rId2">
             <a:extLst>
               <a:ext uri="{28A0092B-C50C-407E-A947-70E740481C1C}">
-                <a14:useLocalDpi xmlns:a14="http://schemas.microsoft.com/office/drawing/2010/main" val="0"/>
+                <a14:useLocalDpi xmlns:a14="http://schemas.microsoft.com/office/drawing/2010/main" xmlns="" val="0"/>
               </a:ext>
             </a:extLst>
           </a:blip>
@@ -3975,7 +7880,7 @@
           <a:blip r:embed="rId3">
             <a:extLst>
               <a:ext uri="{28A0092B-C50C-407E-A947-70E740481C1C}">
-                <a14:useLocalDpi xmlns:a14="http://schemas.microsoft.com/office/drawing/2010/main" val="0"/>
+                <a14:useLocalDpi xmlns:a14="http://schemas.microsoft.com/office/drawing/2010/main" xmlns="" val="0"/>
               </a:ext>
             </a:extLst>
           </a:blip>
@@ -3996,7 +7901,7 @@
     </p:spTree>
     <p:extLst>
       <p:ext uri="{BB962C8B-B14F-4D97-AF65-F5344CB8AC3E}">
-        <p14:creationId xmlns:p14="http://schemas.microsoft.com/office/powerpoint/2010/main" val="3606670478"/>
+        <p14:creationId xmlns:p14="http://schemas.microsoft.com/office/powerpoint/2010/main" xmlns="" val="3606670478"/>
       </p:ext>
     </p:extLst>
   </p:cSld>
@@ -4060,7 +7965,7 @@
           <a:blip r:embed="rId2">
             <a:extLst>
               <a:ext uri="{28A0092B-C50C-407E-A947-70E740481C1C}">
-                <a14:useLocalDpi xmlns:a14="http://schemas.microsoft.com/office/drawing/2010/main" val="0"/>
+                <a14:useLocalDpi xmlns:a14="http://schemas.microsoft.com/office/drawing/2010/main" xmlns="" val="0"/>
               </a:ext>
             </a:extLst>
           </a:blip>
@@ -4109,7 +8014,7 @@
     </p:spTree>
     <p:extLst>
       <p:ext uri="{BB962C8B-B14F-4D97-AF65-F5344CB8AC3E}">
-        <p14:creationId xmlns:p14="http://schemas.microsoft.com/office/powerpoint/2010/main" val="3150999363"/>
+        <p14:creationId xmlns:p14="http://schemas.microsoft.com/office/powerpoint/2010/main" xmlns="" val="3150999363"/>
       </p:ext>
     </p:extLst>
   </p:cSld>
@@ -4791,7 +8696,7 @@
     </p:spTree>
     <p:extLst>
       <p:ext uri="{BB962C8B-B14F-4D97-AF65-F5344CB8AC3E}">
-        <p14:creationId xmlns:p14="http://schemas.microsoft.com/office/powerpoint/2010/main" val="1704719681"/>
+        <p14:creationId xmlns:p14="http://schemas.microsoft.com/office/powerpoint/2010/main" xmlns="" val="1704719681"/>
       </p:ext>
     </p:extLst>
   </p:cSld>
@@ -5082,4 +8987,287 @@
   <a:objectDefaults/>
   <a:extraClrSchemeLst/>
 </a:theme>
+</file>
+
+<file path=ppt/theme/theme2.xml><?xml version="1.0" encoding="utf-8"?>
+<a:theme xmlns:a="http://schemas.openxmlformats.org/drawingml/2006/main" name="Office Theme">
+  <a:themeElements>
+    <a:clrScheme name="Office">
+      <a:dk1>
+        <a:sysClr val="windowText" lastClr="000000"/>
+      </a:dk1>
+      <a:lt1>
+        <a:sysClr val="window" lastClr="FFFFFF"/>
+      </a:lt1>
+      <a:dk2>
+        <a:srgbClr val="1F497D"/>
+      </a:dk2>
+      <a:lt2>
+        <a:srgbClr val="EEECE1"/>
+      </a:lt2>
+      <a:accent1>
+        <a:srgbClr val="4F81BD"/>
+      </a:accent1>
+      <a:accent2>
+        <a:srgbClr val="C0504D"/>
+      </a:accent2>
+      <a:accent3>
+        <a:srgbClr val="9BBB59"/>
+      </a:accent3>
+      <a:accent4>
+        <a:srgbClr val="8064A2"/>
+      </a:accent4>
+      <a:accent5>
+        <a:srgbClr val="4BACC6"/>
+      </a:accent5>
+      <a:accent6>
+        <a:srgbClr val="F79646"/>
+      </a:accent6>
+      <a:hlink>
+        <a:srgbClr val="0000FF"/>
+      </a:hlink>
+      <a:folHlink>
+        <a:srgbClr val="800080"/>
+      </a:folHlink>
+    </a:clrScheme>
+    <a:fontScheme name="Office">
+      <a:majorFont>
+        <a:latin typeface="Calibri"/>
+        <a:ea typeface=""/>
+        <a:cs typeface=""/>
+        <a:font script="Jpan" typeface="ＭＳ Ｐゴシック"/>
+        <a:font script="Hang" typeface="맑은 고딕"/>
+        <a:font script="Hans" typeface="宋体"/>
+        <a:font script="Hant" typeface="新細明體"/>
+        <a:font script="Arab" typeface="Times New Roman"/>
+        <a:font script="Hebr" typeface="Times New Roman"/>
+        <a:font script="Thai" typeface="Angsana New"/>
+        <a:font script="Ethi" typeface="Nyala"/>
+        <a:font script="Beng" typeface="Vrinda"/>
+        <a:font script="Gujr" typeface="Shruti"/>
+        <a:font script="Khmr" typeface="MoolBoran"/>
+        <a:font script="Knda" typeface="Tunga"/>
+        <a:font script="Guru" typeface="Raavi"/>
+        <a:font script="Cans" typeface="Euphemia"/>
+        <a:font script="Cher" typeface="Plantagenet Cherokee"/>
+        <a:font script="Yiii" typeface="Microsoft Yi Baiti"/>
+        <a:font script="Tibt" typeface="Microsoft Himalaya"/>
+        <a:font script="Thaa" typeface="MV Boli"/>
+        <a:font script="Deva" typeface="Mangal"/>
+        <a:font script="Telu" typeface="Gautami"/>
+        <a:font script="Taml" typeface="Latha"/>
+        <a:font script="Syrc" typeface="Estrangelo Edessa"/>
+        <a:font script="Orya" typeface="Kalinga"/>
+        <a:font script="Mlym" typeface="Kartika"/>
+        <a:font script="Laoo" typeface="DokChampa"/>
+        <a:font script="Sinh" typeface="Iskoola Pota"/>
+        <a:font script="Mong" typeface="Mongolian Baiti"/>
+        <a:font script="Viet" typeface="Times New Roman"/>
+        <a:font script="Uigh" typeface="Microsoft Uighur"/>
+      </a:majorFont>
+      <a:minorFont>
+        <a:latin typeface="Calibri"/>
+        <a:ea typeface=""/>
+        <a:cs typeface=""/>
+        <a:font script="Jpan" typeface="ＭＳ Ｐゴシック"/>
+        <a:font script="Hang" typeface="맑은 고딕"/>
+        <a:font script="Hans" typeface="宋体"/>
+        <a:font script="Hant" typeface="新細明體"/>
+        <a:font script="Arab" typeface="Arial"/>
+        <a:font script="Hebr" typeface="Arial"/>
+        <a:font script="Thai" typeface="Cordia New"/>
+        <a:font script="Ethi" typeface="Nyala"/>
+        <a:font script="Beng" typeface="Vrinda"/>
+        <a:font script="Gujr" typeface="Shruti"/>
+        <a:font script="Khmr" typeface="DaunPenh"/>
+        <a:font script="Knda" typeface="Tunga"/>
+        <a:font script="Guru" typeface="Raavi"/>
+        <a:font script="Cans" typeface="Euphemia"/>
+        <a:font script="Cher" typeface="Plantagenet Cherokee"/>
+        <a:font script="Yiii" typeface="Microsoft Yi Baiti"/>
+        <a:font script="Tibt" typeface="Microsoft Himalaya"/>
+        <a:font script="Thaa" typeface="MV Boli"/>
+        <a:font script="Deva" typeface="Mangal"/>
+        <a:font script="Telu" typeface="Gautami"/>
+        <a:font script="Taml" typeface="Latha"/>
+        <a:font script="Syrc" typeface="Estrangelo Edessa"/>
+        <a:font script="Orya" typeface="Kalinga"/>
+        <a:font script="Mlym" typeface="Kartika"/>
+        <a:font script="Laoo" typeface="DokChampa"/>
+        <a:font script="Sinh" typeface="Iskoola Pota"/>
+        <a:font script="Mong" typeface="Mongolian Baiti"/>
+        <a:font script="Viet" typeface="Arial"/>
+        <a:font script="Uigh" typeface="Microsoft Uighur"/>
+      </a:minorFont>
+    </a:fontScheme>
+    <a:fmtScheme name="Office">
+      <a:fillStyleLst>
+        <a:solidFill>
+          <a:schemeClr val="phClr"/>
+        </a:solidFill>
+        <a:gradFill rotWithShape="1">
+          <a:gsLst>
+            <a:gs pos="0">
+              <a:schemeClr val="phClr">
+                <a:tint val="50000"/>
+                <a:satMod val="300000"/>
+              </a:schemeClr>
+            </a:gs>
+            <a:gs pos="35000">
+              <a:schemeClr val="phClr">
+                <a:tint val="37000"/>
+                <a:satMod val="300000"/>
+              </a:schemeClr>
+            </a:gs>
+            <a:gs pos="100000">
+              <a:schemeClr val="phClr">
+                <a:tint val="15000"/>
+                <a:satMod val="350000"/>
+              </a:schemeClr>
+            </a:gs>
+          </a:gsLst>
+          <a:lin ang="16200000" scaled="1"/>
+        </a:gradFill>
+        <a:gradFill rotWithShape="1">
+          <a:gsLst>
+            <a:gs pos="0">
+              <a:schemeClr val="phClr">
+                <a:shade val="51000"/>
+                <a:satMod val="130000"/>
+              </a:schemeClr>
+            </a:gs>
+            <a:gs pos="80000">
+              <a:schemeClr val="phClr">
+                <a:shade val="93000"/>
+                <a:satMod val="130000"/>
+              </a:schemeClr>
+            </a:gs>
+            <a:gs pos="100000">
+              <a:schemeClr val="phClr">
+                <a:shade val="94000"/>
+                <a:satMod val="135000"/>
+              </a:schemeClr>
+            </a:gs>
+          </a:gsLst>
+          <a:lin ang="16200000" scaled="0"/>
+        </a:gradFill>
+      </a:fillStyleLst>
+      <a:lnStyleLst>
+        <a:ln w="9525" cap="flat" cmpd="sng" algn="ctr">
+          <a:solidFill>
+            <a:schemeClr val="phClr">
+              <a:shade val="95000"/>
+              <a:satMod val="105000"/>
+            </a:schemeClr>
+          </a:solidFill>
+          <a:prstDash val="solid"/>
+        </a:ln>
+        <a:ln w="25400" cap="flat" cmpd="sng" algn="ctr">
+          <a:solidFill>
+            <a:schemeClr val="phClr"/>
+          </a:solidFill>
+          <a:prstDash val="solid"/>
+        </a:ln>
+        <a:ln w="38100" cap="flat" cmpd="sng" algn="ctr">
+          <a:solidFill>
+            <a:schemeClr val="phClr"/>
+          </a:solidFill>
+          <a:prstDash val="solid"/>
+        </a:ln>
+      </a:lnStyleLst>
+      <a:effectStyleLst>
+        <a:effectStyle>
+          <a:effectLst>
+            <a:outerShdw blurRad="40000" dist="20000" dir="5400000" rotWithShape="0">
+              <a:srgbClr val="000000">
+                <a:alpha val="38000"/>
+              </a:srgbClr>
+            </a:outerShdw>
+          </a:effectLst>
+        </a:effectStyle>
+        <a:effectStyle>
+          <a:effectLst>
+            <a:outerShdw blurRad="40000" dist="23000" dir="5400000" rotWithShape="0">
+              <a:srgbClr val="000000">
+                <a:alpha val="35000"/>
+              </a:srgbClr>
+            </a:outerShdw>
+          </a:effectLst>
+        </a:effectStyle>
+        <a:effectStyle>
+          <a:effectLst>
+            <a:outerShdw blurRad="40000" dist="23000" dir="5400000" rotWithShape="0">
+              <a:srgbClr val="000000">
+                <a:alpha val="35000"/>
+              </a:srgbClr>
+            </a:outerShdw>
+          </a:effectLst>
+          <a:scene3d>
+            <a:camera prst="orthographicFront">
+              <a:rot lat="0" lon="0" rev="0"/>
+            </a:camera>
+            <a:lightRig rig="threePt" dir="t">
+              <a:rot lat="0" lon="0" rev="1200000"/>
+            </a:lightRig>
+          </a:scene3d>
+          <a:sp3d>
+            <a:bevelT w="63500" h="25400"/>
+          </a:sp3d>
+        </a:effectStyle>
+      </a:effectStyleLst>
+      <a:bgFillStyleLst>
+        <a:solidFill>
+          <a:schemeClr val="phClr"/>
+        </a:solidFill>
+        <a:gradFill rotWithShape="1">
+          <a:gsLst>
+            <a:gs pos="0">
+              <a:schemeClr val="phClr">
+                <a:tint val="40000"/>
+                <a:satMod val="350000"/>
+              </a:schemeClr>
+            </a:gs>
+            <a:gs pos="40000">
+              <a:schemeClr val="phClr">
+                <a:tint val="45000"/>
+                <a:shade val="99000"/>
+                <a:satMod val="350000"/>
+              </a:schemeClr>
+            </a:gs>
+            <a:gs pos="100000">
+              <a:schemeClr val="phClr">
+                <a:shade val="20000"/>
+                <a:satMod val="255000"/>
+              </a:schemeClr>
+            </a:gs>
+          </a:gsLst>
+          <a:path path="circle">
+            <a:fillToRect l="50000" t="-80000" r="50000" b="180000"/>
+          </a:path>
+        </a:gradFill>
+        <a:gradFill rotWithShape="1">
+          <a:gsLst>
+            <a:gs pos="0">
+              <a:schemeClr val="phClr">
+                <a:tint val="80000"/>
+                <a:satMod val="300000"/>
+              </a:schemeClr>
+            </a:gs>
+            <a:gs pos="100000">
+              <a:schemeClr val="phClr">
+                <a:shade val="30000"/>
+                <a:satMod val="200000"/>
+              </a:schemeClr>
+            </a:gs>
+          </a:gsLst>
+          <a:path path="circle">
+            <a:fillToRect l="50000" t="50000" r="50000" b="50000"/>
+          </a:path>
+        </a:gradFill>
+      </a:bgFillStyleLst>
+    </a:fmtScheme>
+  </a:themeElements>
+  <a:objectDefaults/>
+  <a:extraClrSchemeLst/>
+</a:theme>
 </file>
</xml_diff>

<commit_message>
added angularjs component description class-2
</commit_message>
<xml_diff>
--- a/class-2-Basic AngularJs/slides/basic angularjs.pptx
+++ b/class-2-Basic AngularJs/slides/basic angularjs.pptx
@@ -13,8 +13,8 @@
     <p:sldId id="258" r:id="rId4"/>
     <p:sldId id="259" r:id="rId5"/>
     <p:sldId id="260" r:id="rId6"/>
-    <p:sldId id="261" r:id="rId7"/>
-    <p:sldId id="262" r:id="rId8"/>
+    <p:sldId id="262" r:id="rId7"/>
+    <p:sldId id="261" r:id="rId8"/>
     <p:sldId id="263" r:id="rId9"/>
     <p:sldId id="264" r:id="rId10"/>
     <p:sldId id="265" r:id="rId11"/>
@@ -29,17 +29,17 @@
     <p:sldId id="274" r:id="rId20"/>
     <p:sldId id="275" r:id="rId21"/>
     <p:sldId id="280" r:id="rId22"/>
-    <p:sldId id="277" r:id="rId23"/>
-    <p:sldId id="278" r:id="rId24"/>
-    <p:sldId id="279" r:id="rId25"/>
-    <p:sldId id="281" r:id="rId26"/>
-    <p:sldId id="282" r:id="rId27"/>
-    <p:sldId id="283" r:id="rId28"/>
-    <p:sldId id="284" r:id="rId29"/>
-    <p:sldId id="285" r:id="rId30"/>
-    <p:sldId id="286" r:id="rId31"/>
-    <p:sldId id="287" r:id="rId32"/>
-    <p:sldId id="276" r:id="rId33"/>
+    <p:sldId id="278" r:id="rId23"/>
+    <p:sldId id="279" r:id="rId24"/>
+    <p:sldId id="281" r:id="rId25"/>
+    <p:sldId id="282" r:id="rId26"/>
+    <p:sldId id="294" r:id="rId27"/>
+    <p:sldId id="284" r:id="rId28"/>
+    <p:sldId id="285" r:id="rId29"/>
+    <p:sldId id="286" r:id="rId30"/>
+    <p:sldId id="287" r:id="rId31"/>
+    <p:sldId id="276" r:id="rId32"/>
+    <p:sldId id="295" r:id="rId33"/>
     <p:sldId id="291" r:id="rId34"/>
     <p:sldId id="288" r:id="rId35"/>
     <p:sldId id="289" r:id="rId36"/>
@@ -228,7 +228,7 @@
           <a:p>
             <a:fld id="{F9C3EE13-C31A-4CAB-97DF-93F46CB008FB}" type="datetimeFigureOut">
               <a:rPr lang="en-US" smtClean="0"/>
-              <a:t>06-11-14</a:t>
+              <a:t>11/6/2014</a:t>
             </a:fld>
             <a:endParaRPr lang="en-US"/>
           </a:p>
@@ -396,6 +396,11 @@
         </p:txBody>
       </p:sp>
     </p:spTree>
+    <p:extLst>
+      <p:ext uri="{BB962C8B-B14F-4D97-AF65-F5344CB8AC3E}">
+        <p14:creationId xmlns:p14="http://schemas.microsoft.com/office/powerpoint/2010/main" val="3618643870"/>
+      </p:ext>
+    </p:extLst>
   </p:cSld>
   <p:clrMap bg1="lt1" tx1="dk1" bg2="lt2" tx2="dk2" accent1="accent1" accent2="accent2" accent3="accent3" accent4="accent4" accent5="accent5" accent6="accent6" hlink="hlink" folHlink="folHlink"/>
   <p:notesStyle>
@@ -833,7 +838,7 @@
             <a:fld id="{1D8BD707-D9CF-40AE-B4C6-C98DA3205C09}" type="datetimeFigureOut">
               <a:rPr lang="en-US" smtClean="0"/>
               <a:pPr/>
-              <a:t>06-11-14</a:t>
+              <a:t>11/6/2014</a:t>
             </a:fld>
             <a:endParaRPr lang="en-US"/>
           </a:p>
@@ -1000,7 +1005,7 @@
             <a:fld id="{1D8BD707-D9CF-40AE-B4C6-C98DA3205C09}" type="datetimeFigureOut">
               <a:rPr lang="en-US" smtClean="0"/>
               <a:pPr/>
-              <a:t>06-11-14</a:t>
+              <a:t>11/6/2014</a:t>
             </a:fld>
             <a:endParaRPr lang="en-US"/>
           </a:p>
@@ -1177,7 +1182,7 @@
             <a:fld id="{1D8BD707-D9CF-40AE-B4C6-C98DA3205C09}" type="datetimeFigureOut">
               <a:rPr lang="en-US" smtClean="0"/>
               <a:pPr/>
-              <a:t>06-11-14</a:t>
+              <a:t>11/6/2014</a:t>
             </a:fld>
             <a:endParaRPr lang="en-US"/>
           </a:p>
@@ -1344,7 +1349,7 @@
             <a:fld id="{1D8BD707-D9CF-40AE-B4C6-C98DA3205C09}" type="datetimeFigureOut">
               <a:rPr lang="en-US" smtClean="0"/>
               <a:pPr/>
-              <a:t>06-11-14</a:t>
+              <a:t>11/6/2014</a:t>
             </a:fld>
             <a:endParaRPr lang="en-US"/>
           </a:p>
@@ -1587,7 +1592,7 @@
             <a:fld id="{1D8BD707-D9CF-40AE-B4C6-C98DA3205C09}" type="datetimeFigureOut">
               <a:rPr lang="en-US" smtClean="0"/>
               <a:pPr/>
-              <a:t>06-11-14</a:t>
+              <a:t>11/6/2014</a:t>
             </a:fld>
             <a:endParaRPr lang="en-US"/>
           </a:p>
@@ -1872,7 +1877,7 @@
             <a:fld id="{1D8BD707-D9CF-40AE-B4C6-C98DA3205C09}" type="datetimeFigureOut">
               <a:rPr lang="en-US" smtClean="0"/>
               <a:pPr/>
-              <a:t>06-11-14</a:t>
+              <a:t>11/6/2014</a:t>
             </a:fld>
             <a:endParaRPr lang="en-US"/>
           </a:p>
@@ -2291,7 +2296,7 @@
             <a:fld id="{1D8BD707-D9CF-40AE-B4C6-C98DA3205C09}" type="datetimeFigureOut">
               <a:rPr lang="en-US" smtClean="0"/>
               <a:pPr/>
-              <a:t>06-11-14</a:t>
+              <a:t>11/6/2014</a:t>
             </a:fld>
             <a:endParaRPr lang="en-US"/>
           </a:p>
@@ -2406,7 +2411,7 @@
             <a:fld id="{1D8BD707-D9CF-40AE-B4C6-C98DA3205C09}" type="datetimeFigureOut">
               <a:rPr lang="en-US" smtClean="0"/>
               <a:pPr/>
-              <a:t>06-11-14</a:t>
+              <a:t>11/6/2014</a:t>
             </a:fld>
             <a:endParaRPr lang="en-US"/>
           </a:p>
@@ -2498,7 +2503,7 @@
             <a:fld id="{1D8BD707-D9CF-40AE-B4C6-C98DA3205C09}" type="datetimeFigureOut">
               <a:rPr lang="en-US" smtClean="0"/>
               <a:pPr/>
-              <a:t>06-11-14</a:t>
+              <a:t>11/6/2014</a:t>
             </a:fld>
             <a:endParaRPr lang="en-US"/>
           </a:p>
@@ -2772,7 +2777,7 @@
             <a:fld id="{1D8BD707-D9CF-40AE-B4C6-C98DA3205C09}" type="datetimeFigureOut">
               <a:rPr lang="en-US" smtClean="0"/>
               <a:pPr/>
-              <a:t>06-11-14</a:t>
+              <a:t>11/6/2014</a:t>
             </a:fld>
             <a:endParaRPr lang="en-US"/>
           </a:p>
@@ -3022,7 +3027,7 @@
             <a:fld id="{1D8BD707-D9CF-40AE-B4C6-C98DA3205C09}" type="datetimeFigureOut">
               <a:rPr lang="en-US" smtClean="0"/>
               <a:pPr/>
-              <a:t>06-11-14</a:t>
+              <a:t>11/6/2014</a:t>
             </a:fld>
             <a:endParaRPr lang="en-US"/>
           </a:p>
@@ -3232,7 +3237,7 @@
             <a:fld id="{1D8BD707-D9CF-40AE-B4C6-C98DA3205C09}" type="datetimeFigureOut">
               <a:rPr lang="en-US" smtClean="0"/>
               <a:pPr/>
-              <a:t>06-11-14</a:t>
+              <a:t>11/6/2014</a:t>
             </a:fld>
             <a:endParaRPr lang="en-US"/>
           </a:p>
@@ -3656,39 +3661,46 @@
           </a:p>
           <a:p>
             <a:r>
-              <a:rPr lang="en-US" dirty="0" err="1"/>
+              <a:rPr lang="en-US" sz="2400" dirty="0" err="1"/>
               <a:t>Git</a:t>
             </a:r>
             <a:r>
-              <a:rPr lang="en-US" dirty="0" smtClean="0"/>
+              <a:rPr lang="en-US" sz="2400" dirty="0" smtClean="0"/>
               <a:t>: </a:t>
             </a:r>
             <a:r>
-              <a:rPr lang="en-US" dirty="0" smtClean="0">
+              <a:rPr lang="en-US" sz="2400" dirty="0" smtClean="0">
                 <a:hlinkClick r:id="rId2"/>
               </a:rPr>
               <a:t>https</a:t>
             </a:r>
             <a:r>
-              <a:rPr lang="en-US" dirty="0">
+              <a:rPr lang="en-US" sz="2400" dirty="0">
                 <a:hlinkClick r:id="rId2"/>
               </a:rPr>
               <a:t>://github.com/tasnim-reza/angularjs-class</a:t>
             </a:r>
-            <a:endParaRPr lang="en-US" dirty="0"/>
+            <a:endParaRPr lang="en-US" sz="2400" dirty="0"/>
           </a:p>
         </p:txBody>
       </p:sp>
     </p:spTree>
     <p:extLst>
       <p:ext uri="{BB962C8B-B14F-4D97-AF65-F5344CB8AC3E}">
-        <p14:creationId xmlns:p14="http://schemas.microsoft.com/office/powerpoint/2010/main" xmlns="" val="582859480"/>
+        <p14:creationId xmlns:p14="http://schemas.microsoft.com/office/powerpoint/2010/main" val="582859480"/>
       </p:ext>
     </p:extLst>
   </p:cSld>
   <p:clrMapOvr>
     <a:masterClrMapping/>
   </p:clrMapOvr>
+  <p:timing>
+    <p:tnLst>
+      <p:par>
+        <p:cTn id="1" dur="indefinite" restart="never" nodeType="tmRoot"/>
+      </p:par>
+    </p:tnLst>
+  </p:timing>
 </p:sld>
 </file>
 
@@ -3756,8 +3768,22 @@
           <a:lstStyle/>
           <a:p>
             <a:r>
-              <a:rPr lang="en-US" dirty="0" smtClean="0"/>
-              <a:t>Architect your application instead of design a page</a:t>
+              <a:rPr lang="en-US" dirty="0" err="1" smtClean="0"/>
+              <a:t>AngularJs</a:t>
+            </a:r>
+            <a:r>
+              <a:rPr lang="en-US" dirty="0" smtClean="0"/>
+              <a:t> is a Framework and Library also.</a:t>
+            </a:r>
+          </a:p>
+          <a:p>
+            <a:r>
+              <a:rPr lang="en-US" dirty="0" smtClean="0"/>
+              <a:t>Architect </a:t>
+            </a:r>
+            <a:r>
+              <a:rPr lang="en-US" dirty="0" smtClean="0"/>
+              <a:t>your application instead of design a page</a:t>
             </a:r>
           </a:p>
           <a:p>
@@ -3789,8 +3815,13 @@
             <a:pPr lvl="1"/>
             <a:r>
               <a:rPr lang="en-US" dirty="0" smtClean="0"/>
-              <a:t>What is Single Page Application</a:t>
-            </a:r>
+              <a:t>What is Single Page </a:t>
+            </a:r>
+            <a:r>
+              <a:rPr lang="en-US" dirty="0" smtClean="0"/>
+              <a:t>Application ?</a:t>
+            </a:r>
+            <a:endParaRPr lang="en-US" dirty="0" smtClean="0"/>
           </a:p>
           <a:p>
             <a:pPr lvl="2"/>
@@ -3836,13 +3867,348 @@
     </p:spTree>
     <p:extLst>
       <p:ext uri="{BB962C8B-B14F-4D97-AF65-F5344CB8AC3E}">
-        <p14:creationId xmlns:p14="http://schemas.microsoft.com/office/powerpoint/2010/main" xmlns="" val="603966949"/>
+        <p14:creationId xmlns:p14="http://schemas.microsoft.com/office/powerpoint/2010/main" val="603966949"/>
       </p:ext>
     </p:extLst>
   </p:cSld>
   <p:clrMapOvr>
     <a:masterClrMapping/>
   </p:clrMapOvr>
+  <p:timing>
+    <p:tnLst>
+      <p:par>
+        <p:cTn id="1" dur="indefinite" restart="never" nodeType="tmRoot">
+          <p:childTnLst>
+            <p:seq concurrent="1" nextAc="seek">
+              <p:cTn id="2" dur="indefinite" nodeType="mainSeq">
+                <p:childTnLst>
+                  <p:par>
+                    <p:cTn id="3" fill="hold">
+                      <p:stCondLst>
+                        <p:cond delay="indefinite"/>
+                      </p:stCondLst>
+                      <p:childTnLst>
+                        <p:par>
+                          <p:cTn id="4" fill="hold">
+                            <p:stCondLst>
+                              <p:cond delay="0"/>
+                            </p:stCondLst>
+                            <p:childTnLst>
+                              <p:par>
+                                <p:cTn id="5" presetID="22" presetClass="entr" presetSubtype="4" fill="hold" nodeType="clickEffect">
+                                  <p:stCondLst>
+                                    <p:cond delay="0"/>
+                                  </p:stCondLst>
+                                  <p:childTnLst>
+                                    <p:set>
+                                      <p:cBhvr>
+                                        <p:cTn id="6" dur="1" fill="hold">
+                                          <p:stCondLst>
+                                            <p:cond delay="0"/>
+                                          </p:stCondLst>
+                                        </p:cTn>
+                                        <p:tgtEl>
+                                          <p:spTgt spid="3">
+                                            <p:txEl>
+                                              <p:pRg st="1" end="1"/>
+                                            </p:txEl>
+                                          </p:spTgt>
+                                        </p:tgtEl>
+                                        <p:attrNameLst>
+                                          <p:attrName>style.visibility</p:attrName>
+                                        </p:attrNameLst>
+                                      </p:cBhvr>
+                                      <p:to>
+                                        <p:strVal val="visible"/>
+                                      </p:to>
+                                    </p:set>
+                                    <p:animEffect transition="in" filter="wipe(down)">
+                                      <p:cBhvr>
+                                        <p:cTn id="7" dur="500"/>
+                                        <p:tgtEl>
+                                          <p:spTgt spid="3">
+                                            <p:txEl>
+                                              <p:pRg st="1" end="1"/>
+                                            </p:txEl>
+                                          </p:spTgt>
+                                        </p:tgtEl>
+                                      </p:cBhvr>
+                                    </p:animEffect>
+                                  </p:childTnLst>
+                                </p:cTn>
+                              </p:par>
+                            </p:childTnLst>
+                          </p:cTn>
+                        </p:par>
+                      </p:childTnLst>
+                    </p:cTn>
+                  </p:par>
+                  <p:par>
+                    <p:cTn id="8" fill="hold">
+                      <p:stCondLst>
+                        <p:cond delay="indefinite"/>
+                      </p:stCondLst>
+                      <p:childTnLst>
+                        <p:par>
+                          <p:cTn id="9" fill="hold">
+                            <p:stCondLst>
+                              <p:cond delay="0"/>
+                            </p:stCondLst>
+                            <p:childTnLst>
+                              <p:par>
+                                <p:cTn id="10" presetID="22" presetClass="entr" presetSubtype="4" fill="hold" nodeType="clickEffect">
+                                  <p:stCondLst>
+                                    <p:cond delay="0"/>
+                                  </p:stCondLst>
+                                  <p:childTnLst>
+                                    <p:set>
+                                      <p:cBhvr>
+                                        <p:cTn id="11" dur="1" fill="hold">
+                                          <p:stCondLst>
+                                            <p:cond delay="0"/>
+                                          </p:stCondLst>
+                                        </p:cTn>
+                                        <p:tgtEl>
+                                          <p:spTgt spid="3">
+                                            <p:txEl>
+                                              <p:pRg st="2" end="2"/>
+                                            </p:txEl>
+                                          </p:spTgt>
+                                        </p:tgtEl>
+                                        <p:attrNameLst>
+                                          <p:attrName>style.visibility</p:attrName>
+                                        </p:attrNameLst>
+                                      </p:cBhvr>
+                                      <p:to>
+                                        <p:strVal val="visible"/>
+                                      </p:to>
+                                    </p:set>
+                                    <p:animEffect transition="in" filter="wipe(down)">
+                                      <p:cBhvr>
+                                        <p:cTn id="12" dur="500"/>
+                                        <p:tgtEl>
+                                          <p:spTgt spid="3">
+                                            <p:txEl>
+                                              <p:pRg st="2" end="2"/>
+                                            </p:txEl>
+                                          </p:spTgt>
+                                        </p:tgtEl>
+                                      </p:cBhvr>
+                                    </p:animEffect>
+                                  </p:childTnLst>
+                                </p:cTn>
+                              </p:par>
+                            </p:childTnLst>
+                          </p:cTn>
+                        </p:par>
+                      </p:childTnLst>
+                    </p:cTn>
+                  </p:par>
+                  <p:par>
+                    <p:cTn id="13" fill="hold">
+                      <p:stCondLst>
+                        <p:cond delay="indefinite"/>
+                      </p:stCondLst>
+                      <p:childTnLst>
+                        <p:par>
+                          <p:cTn id="14" fill="hold">
+                            <p:stCondLst>
+                              <p:cond delay="0"/>
+                            </p:stCondLst>
+                            <p:childTnLst>
+                              <p:par>
+                                <p:cTn id="15" presetID="22" presetClass="entr" presetSubtype="4" fill="hold" nodeType="clickEffect">
+                                  <p:stCondLst>
+                                    <p:cond delay="0"/>
+                                  </p:stCondLst>
+                                  <p:childTnLst>
+                                    <p:set>
+                                      <p:cBhvr>
+                                        <p:cTn id="16" dur="1" fill="hold">
+                                          <p:stCondLst>
+                                            <p:cond delay="0"/>
+                                          </p:stCondLst>
+                                        </p:cTn>
+                                        <p:tgtEl>
+                                          <p:spTgt spid="3">
+                                            <p:txEl>
+                                              <p:pRg st="3" end="3"/>
+                                            </p:txEl>
+                                          </p:spTgt>
+                                        </p:tgtEl>
+                                        <p:attrNameLst>
+                                          <p:attrName>style.visibility</p:attrName>
+                                        </p:attrNameLst>
+                                      </p:cBhvr>
+                                      <p:to>
+                                        <p:strVal val="visible"/>
+                                      </p:to>
+                                    </p:set>
+                                    <p:animEffect transition="in" filter="wipe(down)">
+                                      <p:cBhvr>
+                                        <p:cTn id="17" dur="500"/>
+                                        <p:tgtEl>
+                                          <p:spTgt spid="3">
+                                            <p:txEl>
+                                              <p:pRg st="3" end="3"/>
+                                            </p:txEl>
+                                          </p:spTgt>
+                                        </p:tgtEl>
+                                      </p:cBhvr>
+                                    </p:animEffect>
+                                  </p:childTnLst>
+                                </p:cTn>
+                              </p:par>
+                            </p:childTnLst>
+                          </p:cTn>
+                        </p:par>
+                      </p:childTnLst>
+                    </p:cTn>
+                  </p:par>
+                  <p:par>
+                    <p:cTn id="18" fill="hold">
+                      <p:stCondLst>
+                        <p:cond delay="indefinite"/>
+                      </p:stCondLst>
+                      <p:childTnLst>
+                        <p:par>
+                          <p:cTn id="19" fill="hold">
+                            <p:stCondLst>
+                              <p:cond delay="0"/>
+                            </p:stCondLst>
+                            <p:childTnLst>
+                              <p:par>
+                                <p:cTn id="20" presetID="22" presetClass="entr" presetSubtype="4" fill="hold" nodeType="clickEffect">
+                                  <p:stCondLst>
+                                    <p:cond delay="0"/>
+                                  </p:stCondLst>
+                                  <p:childTnLst>
+                                    <p:set>
+                                      <p:cBhvr>
+                                        <p:cTn id="21" dur="1" fill="hold">
+                                          <p:stCondLst>
+                                            <p:cond delay="0"/>
+                                          </p:stCondLst>
+                                        </p:cTn>
+                                        <p:tgtEl>
+                                          <p:spTgt spid="3">
+                                            <p:txEl>
+                                              <p:pRg st="4" end="4"/>
+                                            </p:txEl>
+                                          </p:spTgt>
+                                        </p:tgtEl>
+                                        <p:attrNameLst>
+                                          <p:attrName>style.visibility</p:attrName>
+                                        </p:attrNameLst>
+                                      </p:cBhvr>
+                                      <p:to>
+                                        <p:strVal val="visible"/>
+                                      </p:to>
+                                    </p:set>
+                                    <p:animEffect transition="in" filter="wipe(down)">
+                                      <p:cBhvr>
+                                        <p:cTn id="22" dur="500"/>
+                                        <p:tgtEl>
+                                          <p:spTgt spid="3">
+                                            <p:txEl>
+                                              <p:pRg st="4" end="4"/>
+                                            </p:txEl>
+                                          </p:spTgt>
+                                        </p:tgtEl>
+                                      </p:cBhvr>
+                                    </p:animEffect>
+                                  </p:childTnLst>
+                                </p:cTn>
+                              </p:par>
+                            </p:childTnLst>
+                          </p:cTn>
+                        </p:par>
+                      </p:childTnLst>
+                    </p:cTn>
+                  </p:par>
+                  <p:par>
+                    <p:cTn id="23" fill="hold">
+                      <p:stCondLst>
+                        <p:cond delay="indefinite"/>
+                      </p:stCondLst>
+                      <p:childTnLst>
+                        <p:par>
+                          <p:cTn id="24" fill="hold">
+                            <p:stCondLst>
+                              <p:cond delay="0"/>
+                            </p:stCondLst>
+                            <p:childTnLst>
+                              <p:par>
+                                <p:cTn id="25" presetID="22" presetClass="entr" presetSubtype="4" fill="hold" nodeType="clickEffect">
+                                  <p:stCondLst>
+                                    <p:cond delay="0"/>
+                                  </p:stCondLst>
+                                  <p:childTnLst>
+                                    <p:set>
+                                      <p:cBhvr>
+                                        <p:cTn id="26" dur="1" fill="hold">
+                                          <p:stCondLst>
+                                            <p:cond delay="0"/>
+                                          </p:stCondLst>
+                                        </p:cTn>
+                                        <p:tgtEl>
+                                          <p:spTgt spid="3">
+                                            <p:txEl>
+                                              <p:pRg st="5" end="5"/>
+                                            </p:txEl>
+                                          </p:spTgt>
+                                        </p:tgtEl>
+                                        <p:attrNameLst>
+                                          <p:attrName>style.visibility</p:attrName>
+                                        </p:attrNameLst>
+                                      </p:cBhvr>
+                                      <p:to>
+                                        <p:strVal val="visible"/>
+                                      </p:to>
+                                    </p:set>
+                                    <p:animEffect transition="in" filter="wipe(down)">
+                                      <p:cBhvr>
+                                        <p:cTn id="27" dur="500"/>
+                                        <p:tgtEl>
+                                          <p:spTgt spid="3">
+                                            <p:txEl>
+                                              <p:pRg st="5" end="5"/>
+                                            </p:txEl>
+                                          </p:spTgt>
+                                        </p:tgtEl>
+                                      </p:cBhvr>
+                                    </p:animEffect>
+                                  </p:childTnLst>
+                                </p:cTn>
+                              </p:par>
+                            </p:childTnLst>
+                          </p:cTn>
+                        </p:par>
+                      </p:childTnLst>
+                    </p:cTn>
+                  </p:par>
+                </p:childTnLst>
+              </p:cTn>
+              <p:prevCondLst>
+                <p:cond evt="onPrev" delay="0">
+                  <p:tgtEl>
+                    <p:sldTgt/>
+                  </p:tgtEl>
+                </p:cond>
+              </p:prevCondLst>
+              <p:nextCondLst>
+                <p:cond evt="onNext" delay="0">
+                  <p:tgtEl>
+                    <p:sldTgt/>
+                  </p:tgtEl>
+                </p:cond>
+              </p:nextCondLst>
+            </p:seq>
+          </p:childTnLst>
+        </p:cTn>
+      </p:par>
+    </p:tnLst>
+  </p:timing>
 </p:sld>
 </file>
 
@@ -3994,11 +4360,6 @@
               </a:rPr>
               <a:t> </a:t>
             </a:r>
-            <a:endParaRPr lang="en-US" dirty="0" smtClean="0">
-              <a:solidFill>
-                <a:srgbClr val="000000"/>
-              </a:solidFill>
-            </a:endParaRPr>
           </a:p>
           <a:p>
             <a:pPr lvl="1">
@@ -4076,11 +4437,6 @@
               </a:rPr>
               <a:t> </a:t>
             </a:r>
-            <a:endParaRPr lang="en-US" dirty="0" smtClean="0">
-              <a:solidFill>
-                <a:srgbClr val="000000"/>
-              </a:solidFill>
-            </a:endParaRPr>
           </a:p>
           <a:p>
             <a:pPr lvl="1">
@@ -4092,31 +4448,71 @@
                   <a:srgbClr val="000000"/>
                 </a:solidFill>
               </a:rPr>
-              <a:t>	</a:t>
+              <a:t>		</a:t>
             </a:r>
             <a:r>
               <a:rPr lang="en-US" dirty="0" smtClean="0">
                 <a:solidFill>
+                  <a:srgbClr val="800000"/>
+                </a:solidFill>
+              </a:rPr>
+              <a:t>&lt;a</a:t>
+            </a:r>
+            <a:r>
+              <a:rPr lang="en-US" dirty="0" smtClean="0">
+                <a:solidFill>
                   <a:srgbClr val="000000"/>
                 </a:solidFill>
               </a:rPr>
-              <a:t>	</a:t>
+              <a:t> </a:t>
+            </a:r>
+            <a:r>
+              <a:rPr lang="en-US" dirty="0" err="1" smtClean="0">
+                <a:solidFill>
+                  <a:srgbClr val="FF0000"/>
+                </a:solidFill>
+              </a:rPr>
+              <a:t>href</a:t>
             </a:r>
             <a:r>
               <a:rPr lang="en-US" dirty="0" smtClean="0">
                 <a:solidFill>
+                  <a:srgbClr val="000000"/>
+                </a:solidFill>
+              </a:rPr>
+              <a:t>=</a:t>
+            </a:r>
+            <a:r>
+              <a:rPr lang="en-US" dirty="0" smtClean="0">
+                <a:solidFill>
+                  <a:srgbClr val="0000FF"/>
+                </a:solidFill>
+              </a:rPr>
+              <a:t>"#/home"</a:t>
+            </a:r>
+            <a:r>
+              <a:rPr lang="en-US" dirty="0" smtClean="0">
+                <a:solidFill>
                   <a:srgbClr val="800000"/>
                 </a:solidFill>
               </a:rPr>
-              <a:t>&lt;</a:t>
+              <a:t>&gt;</a:t>
             </a:r>
             <a:r>
               <a:rPr lang="en-US" dirty="0" smtClean="0">
                 <a:solidFill>
+                  <a:srgbClr val="000000"/>
+                </a:solidFill>
+              </a:rPr>
+              <a:t>Home</a:t>
+            </a:r>
+            <a:r>
+              <a:rPr lang="en-US" dirty="0" smtClean="0">
+                <a:solidFill>
                   <a:srgbClr val="800000"/>
                 </a:solidFill>
               </a:rPr>
-              <a:t>a</a:t>
+              <a:t>&lt;/a&gt;</a:t>
             </a:r>
             <a:r>
               <a:rPr lang="en-US" dirty="0" smtClean="0">
@@ -4126,67 +4522,6 @@
               </a:rPr>
               <a:t> </a:t>
             </a:r>
-            <a:r>
-              <a:rPr lang="en-US" dirty="0" err="1" smtClean="0">
-                <a:solidFill>
-                  <a:srgbClr val="FF0000"/>
-                </a:solidFill>
-              </a:rPr>
-              <a:t>href</a:t>
-            </a:r>
-            <a:r>
-              <a:rPr lang="en-US" dirty="0" smtClean="0">
-                <a:solidFill>
-                  <a:srgbClr val="000000"/>
-                </a:solidFill>
-              </a:rPr>
-              <a:t>=</a:t>
-            </a:r>
-            <a:r>
-              <a:rPr lang="en-US" dirty="0" smtClean="0">
-                <a:solidFill>
-                  <a:srgbClr val="0000FF"/>
-                </a:solidFill>
-              </a:rPr>
-              <a:t>"#/home"</a:t>
-            </a:r>
-            <a:r>
-              <a:rPr lang="en-US" dirty="0" smtClean="0">
-                <a:solidFill>
-                  <a:srgbClr val="800000"/>
-                </a:solidFill>
-              </a:rPr>
-              <a:t>&gt;</a:t>
-            </a:r>
-            <a:r>
-              <a:rPr lang="en-US" dirty="0" smtClean="0">
-                <a:solidFill>
-                  <a:srgbClr val="000000"/>
-                </a:solidFill>
-              </a:rPr>
-              <a:t>Home</a:t>
-            </a:r>
-            <a:r>
-              <a:rPr lang="en-US" dirty="0" smtClean="0">
-                <a:solidFill>
-                  <a:srgbClr val="800000"/>
-                </a:solidFill>
-              </a:rPr>
-              <a:t>&lt;/a&gt;</a:t>
-            </a:r>
-            <a:r>
-              <a:rPr lang="en-US" dirty="0" smtClean="0">
-                <a:solidFill>
-                  <a:srgbClr val="000000"/>
-                </a:solidFill>
-              </a:rPr>
-              <a:t> </a:t>
-            </a:r>
-            <a:endParaRPr lang="en-US" dirty="0" smtClean="0">
-              <a:solidFill>
-                <a:srgbClr val="000000"/>
-              </a:solidFill>
-            </a:endParaRPr>
           </a:p>
           <a:p>
             <a:pPr lvl="1">
@@ -4307,6 +4642,13 @@
   <p:clrMapOvr>
     <a:masterClrMapping/>
   </p:clrMapOvr>
+  <p:timing>
+    <p:tnLst>
+      <p:par>
+        <p:cTn id="1" dur="indefinite" restart="never" nodeType="tmRoot"/>
+      </p:par>
+    </p:tnLst>
+  </p:timing>
 </p:sld>
 </file>
 
@@ -4373,7 +4715,6 @@
           <a:bodyPr/>
           <a:lstStyle/>
           <a:p>
-            <a:pPr lvl="1"/>
             <a:r>
               <a:rPr lang="en-US" dirty="0" smtClean="0"/>
               <a:t>In </a:t>
@@ -4494,6 +4835,7 @@
             </a:r>
           </a:p>
           <a:p>
+            <a:pPr lvl="1"/>
             <a:r>
               <a:rPr lang="en-US" dirty="0" smtClean="0"/>
               <a:t>This is called </a:t>
@@ -4508,6 +4850,7 @@
             </a:r>
           </a:p>
           <a:p>
+            <a:pPr lvl="1"/>
             <a:r>
               <a:rPr lang="en-US" dirty="0" smtClean="0"/>
               <a:t>Here ‘</a:t>
@@ -4587,6 +4930,13 @@
   <p:clrMapOvr>
     <a:masterClrMapping/>
   </p:clrMapOvr>
+  <p:timing>
+    <p:tnLst>
+      <p:par>
+        <p:cTn id="1" dur="indefinite" restart="never" nodeType="tmRoot"/>
+      </p:par>
+    </p:tnLst>
+  </p:timing>
 </p:sld>
 </file>
 
@@ -4650,7 +5000,9 @@
         </p:nvSpPr>
         <p:spPr/>
         <p:txBody>
-          <a:bodyPr/>
+          <a:bodyPr>
+            <a:normAutofit lnSpcReduction="10000"/>
+          </a:bodyPr>
           <a:lstStyle/>
           <a:p>
             <a:r>
@@ -4773,16 +5125,29 @@
                   <a:srgbClr val="800000"/>
                 </a:solidFill>
               </a:rPr>
-              <a:t>'Reza'</a:t>
+              <a:t>'Reza</a:t>
             </a:r>
             <a:r>
               <a:rPr lang="en-US" dirty="0" smtClean="0">
                 <a:solidFill>
+                  <a:srgbClr val="800000"/>
+                </a:solidFill>
+              </a:rPr>
+              <a:t>'</a:t>
+            </a:r>
+            <a:r>
+              <a:rPr lang="en-US" dirty="0" smtClean="0">
+                <a:solidFill>
                   <a:srgbClr val="000000"/>
                 </a:solidFill>
               </a:rPr>
               <a:t>)</a:t>
             </a:r>
+          </a:p>
+          <a:p>
+            <a:pPr lvl="1">
+              <a:buNone/>
+            </a:pPr>
             <a:endParaRPr lang="en-US" dirty="0" smtClean="0">
               <a:solidFill>
                 <a:srgbClr val="000000"/>
@@ -4855,63 +5220,39 @@
                   <a:srgbClr val="0000FF"/>
                 </a:solidFill>
               </a:rPr>
-              <a:t>"</a:t>
+              <a:t>"username"  </a:t>
+            </a:r>
+            <a:r>
+              <a:rPr lang="en-US" dirty="0" err="1" smtClean="0">
+                <a:solidFill>
+                  <a:srgbClr val="FF0000"/>
+                </a:solidFill>
+              </a:rPr>
+              <a:t>ng</a:t>
             </a:r>
             <a:r>
               <a:rPr lang="en-US" dirty="0" smtClean="0">
                 <a:solidFill>
+                  <a:srgbClr val="FF0000"/>
+                </a:solidFill>
+              </a:rPr>
+              <a:t>-model</a:t>
+            </a:r>
+            <a:r>
+              <a:rPr lang="en-US" dirty="0" smtClean="0">
+                <a:solidFill>
+                  <a:srgbClr val="000000"/>
+                </a:solidFill>
+              </a:rPr>
+              <a:t>=</a:t>
+            </a:r>
+            <a:r>
+              <a:rPr lang="en-US" dirty="0" smtClean="0">
+                <a:solidFill>
                   <a:srgbClr val="0000FF"/>
                 </a:solidFill>
               </a:rPr>
-              <a:t>username"  </a:t>
-            </a:r>
-            <a:r>
-              <a:rPr lang="en-US" dirty="0" err="1" smtClean="0">
-                <a:solidFill>
-                  <a:srgbClr val="FF0000"/>
-                </a:solidFill>
-              </a:rPr>
-              <a:t>ng</a:t>
-            </a:r>
-            <a:r>
-              <a:rPr lang="en-US" dirty="0" smtClean="0">
-                <a:solidFill>
-                  <a:srgbClr val="FF0000"/>
-                </a:solidFill>
-              </a:rPr>
-              <a:t>-model</a:t>
-            </a:r>
-            <a:r>
-              <a:rPr lang="en-US" dirty="0" smtClean="0">
-                <a:solidFill>
-                  <a:srgbClr val="000000"/>
-                </a:solidFill>
-              </a:rPr>
-              <a:t>=</a:t>
-            </a:r>
-            <a:r>
-              <a:rPr lang="en-US" dirty="0" smtClean="0">
-                <a:solidFill>
-                  <a:srgbClr val="0000FF"/>
-                </a:solidFill>
-              </a:rPr>
-              <a:t>"</a:t>
-            </a:r>
-            <a:r>
-              <a:rPr lang="en-US" dirty="0" smtClean="0">
-                <a:solidFill>
-                  <a:srgbClr val="0000FF"/>
-                </a:solidFill>
-              </a:rPr>
-              <a:t>username</a:t>
-            </a:r>
-            <a:r>
-              <a:rPr lang="en-US" dirty="0" smtClean="0">
-                <a:solidFill>
-                  <a:srgbClr val="0000FF"/>
-                </a:solidFill>
-              </a:rPr>
-              <a:t>"</a:t>
+              <a:t>"username"</a:t>
             </a:r>
             <a:r>
               <a:rPr lang="en-US" dirty="0" smtClean="0">
@@ -4950,7 +5291,6 @@
               <a:rPr lang="en-US" dirty="0" smtClean="0"/>
               <a:t>;</a:t>
             </a:r>
-            <a:endParaRPr lang="en-US" dirty="0" smtClean="0"/>
           </a:p>
           <a:p>
             <a:r>
@@ -4969,6 +5309,13 @@
   <p:clrMapOvr>
     <a:masterClrMapping/>
   </p:clrMapOvr>
+  <p:timing>
+    <p:tnLst>
+      <p:par>
+        <p:cTn id="1" dur="indefinite" restart="never" nodeType="tmRoot"/>
+      </p:par>
+    </p:tnLst>
+  </p:timing>
 </p:sld>
 </file>
 
@@ -5040,6 +5387,13 @@
   <p:clrMapOvr>
     <a:masterClrMapping/>
   </p:clrMapOvr>
+  <p:timing>
+    <p:tnLst>
+      <p:par>
+        <p:cTn id="1" dur="indefinite" restart="never" nodeType="tmRoot"/>
+      </p:par>
+    </p:tnLst>
+  </p:timing>
 </p:sld>
 </file>
 
@@ -5139,6 +5493,13 @@
   <p:clrMapOvr>
     <a:masterClrMapping/>
   </p:clrMapOvr>
+  <p:timing>
+    <p:tnLst>
+      <p:par>
+        <p:cTn id="1" dur="indefinite" restart="never" nodeType="tmRoot"/>
+      </p:par>
+    </p:tnLst>
+  </p:timing>
 </p:sld>
 </file>
 
@@ -5238,6 +5599,13 @@
   <p:clrMapOvr>
     <a:masterClrMapping/>
   </p:clrMapOvr>
+  <p:timing>
+    <p:tnLst>
+      <p:par>
+        <p:cTn id="1" dur="indefinite" restart="never" nodeType="tmRoot"/>
+      </p:par>
+    </p:tnLst>
+  </p:timing>
 </p:sld>
 </file>
 
@@ -5337,6 +5705,13 @@
   <p:clrMapOvr>
     <a:masterClrMapping/>
   </p:clrMapOvr>
+  <p:timing>
+    <p:tnLst>
+      <p:par>
+        <p:cTn id="1" dur="indefinite" restart="never" nodeType="tmRoot"/>
+      </p:par>
+    </p:tnLst>
+  </p:timing>
 </p:sld>
 </file>
 
@@ -5436,6 +5811,13 @@
   <p:clrMapOvr>
     <a:masterClrMapping/>
   </p:clrMapOvr>
+  <p:timing>
+    <p:tnLst>
+      <p:par>
+        <p:cTn id="1" dur="indefinite" restart="never" nodeType="tmRoot"/>
+      </p:par>
+    </p:tnLst>
+  </p:timing>
 </p:sld>
 </file>
 
@@ -5535,6 +5917,13 @@
   <p:clrMapOvr>
     <a:masterClrMapping/>
   </p:clrMapOvr>
+  <p:timing>
+    <p:tnLst>
+      <p:par>
+        <p:cTn id="1" dur="indefinite" restart="never" nodeType="tmRoot"/>
+      </p:par>
+    </p:tnLst>
+  </p:timing>
 </p:sld>
 </file>
 
@@ -5650,13 +6039,20 @@
     </p:spTree>
     <p:extLst>
       <p:ext uri="{BB962C8B-B14F-4D97-AF65-F5344CB8AC3E}">
-        <p14:creationId xmlns:p14="http://schemas.microsoft.com/office/powerpoint/2010/main" xmlns="" val="1206448357"/>
+        <p14:creationId xmlns:p14="http://schemas.microsoft.com/office/powerpoint/2010/main" val="1206448357"/>
       </p:ext>
     </p:extLst>
   </p:cSld>
   <p:clrMapOvr>
     <a:masterClrMapping/>
   </p:clrMapOvr>
+  <p:timing>
+    <p:tnLst>
+      <p:par>
+        <p:cTn id="1" dur="indefinite" restart="never" nodeType="tmRoot"/>
+      </p:par>
+    </p:tnLst>
+  </p:timing>
 </p:sld>
 </file>
 
@@ -5756,6 +6152,13 @@
   <p:clrMapOvr>
     <a:masterClrMapping/>
   </p:clrMapOvr>
+  <p:timing>
+    <p:tnLst>
+      <p:par>
+        <p:cTn id="1" dur="indefinite" restart="never" nodeType="tmRoot"/>
+      </p:par>
+    </p:tnLst>
+  </p:timing>
 </p:sld>
 </file>
 
@@ -5820,9 +6223,76 @@
           <a:p>
             <a:r>
               <a:rPr lang="en-US" dirty="0" smtClean="0"/>
-              <a:t>Browser History</a:t>
-            </a:r>
-            <a:endParaRPr lang="en-US" dirty="0"/>
+              <a:t>Browser </a:t>
+            </a:r>
+            <a:r>
+              <a:rPr lang="en-US" dirty="0" smtClean="0"/>
+              <a:t>History</a:t>
+            </a:r>
+          </a:p>
+          <a:p>
+            <a:pPr lvl="1"/>
+            <a:r>
+              <a:rPr lang="en-US" dirty="0" smtClean="0"/>
+              <a:t>Browser automatically handle </a:t>
+            </a:r>
+            <a:r>
+              <a:rPr lang="en-US" b="1" i="1" dirty="0" err="1" smtClean="0"/>
+              <a:t>url</a:t>
+            </a:r>
+            <a:r>
+              <a:rPr lang="en-US" dirty="0" smtClean="0"/>
+              <a:t> based routing</a:t>
+            </a:r>
+          </a:p>
+          <a:p>
+            <a:pPr lvl="1"/>
+            <a:r>
+              <a:rPr lang="en-US" dirty="0" smtClean="0">
+                <a:hlinkClick r:id="rId2"/>
+              </a:rPr>
+              <a:t>$location</a:t>
+            </a:r>
+            <a:r>
+              <a:rPr lang="en-US" dirty="0" smtClean="0"/>
+              <a:t> is used for </a:t>
+            </a:r>
+            <a:r>
+              <a:rPr lang="en-US" dirty="0"/>
+              <a:t>parses the URL in the </a:t>
+            </a:r>
+            <a:r>
+              <a:rPr lang="en-US" dirty="0" smtClean="0"/>
+              <a:t>browser</a:t>
+            </a:r>
+          </a:p>
+          <a:p>
+            <a:r>
+              <a:rPr lang="en-US" dirty="0" smtClean="0">
+                <a:hlinkClick r:id="rId3"/>
+              </a:rPr>
+              <a:t>jQLite</a:t>
+            </a:r>
+            <a:endParaRPr lang="en-US" dirty="0" smtClean="0"/>
+          </a:p>
+          <a:p>
+            <a:pPr lvl="1"/>
+            <a:r>
+              <a:rPr lang="en-US" dirty="0" err="1" smtClean="0"/>
+              <a:t>angular.element</a:t>
+            </a:r>
+            <a:r>
+              <a:rPr lang="en-US" dirty="0" smtClean="0"/>
+              <a:t> return </a:t>
+            </a:r>
+            <a:r>
+              <a:rPr lang="en-US" dirty="0" err="1" smtClean="0"/>
+              <a:t>jQuery</a:t>
+            </a:r>
+            <a:r>
+              <a:rPr lang="en-US" dirty="0" smtClean="0"/>
+              <a:t> object</a:t>
+            </a:r>
           </a:p>
         </p:txBody>
       </p:sp>
@@ -5831,6 +6301,13 @@
   <p:clrMapOvr>
     <a:masterClrMapping/>
   </p:clrMapOvr>
+  <p:timing>
+    <p:tnLst>
+      <p:par>
+        <p:cTn id="1" dur="indefinite" restart="never" nodeType="tmRoot"/>
+      </p:par>
+    </p:tnLst>
+  </p:timing>
 </p:sld>
 </file>
 
@@ -5895,17 +6372,69 @@
           <a:p>
             <a:r>
               <a:rPr lang="en-US" dirty="0" err="1" smtClean="0"/>
-              <a:t>jQLite</a:t>
+              <a:t>AngularJs</a:t>
+            </a:r>
+            <a:r>
+              <a:rPr lang="en-US" dirty="0" smtClean="0"/>
+              <a:t> </a:t>
+            </a:r>
+            <a:r>
+              <a:rPr lang="en-US" dirty="0" smtClean="0"/>
+              <a:t>Template</a:t>
+            </a:r>
+          </a:p>
+          <a:p>
+            <a:pPr lvl="1"/>
+            <a:r>
+              <a:rPr lang="en-US" dirty="0"/>
+              <a:t>In a simple app, the template consists of HTML, CSS, and Angular directives contained in just one HTML file (usually index.html).</a:t>
             </a:r>
             <a:endParaRPr lang="en-US" dirty="0"/>
           </a:p>
         </p:txBody>
       </p:sp>
+      <p:pic>
+        <p:nvPicPr>
+          <p:cNvPr id="4" name="Picture 3"/>
+          <p:cNvPicPr>
+            <a:picLocks noChangeAspect="1"/>
+          </p:cNvPicPr>
+          <p:nvPr/>
+        </p:nvPicPr>
+        <p:blipFill>
+          <a:blip r:embed="rId2">
+            <a:extLst>
+              <a:ext uri="{28A0092B-C50C-407E-A947-70E740481C1C}">
+                <a14:useLocalDpi xmlns:a14="http://schemas.microsoft.com/office/drawing/2010/main" val="0"/>
+              </a:ext>
+            </a:extLst>
+          </a:blip>
+          <a:stretch>
+            <a:fillRect/>
+          </a:stretch>
+        </p:blipFill>
+        <p:spPr>
+          <a:xfrm>
+            <a:off x="1600200" y="3733800"/>
+            <a:ext cx="5715000" cy="2911246"/>
+          </a:xfrm>
+          <a:prstGeom prst="rect">
+            <a:avLst/>
+          </a:prstGeom>
+        </p:spPr>
+      </p:pic>
     </p:spTree>
   </p:cSld>
   <p:clrMapOvr>
     <a:masterClrMapping/>
   </p:clrMapOvr>
+  <p:timing>
+    <p:tnLst>
+      <p:par>
+        <p:cTn id="1" dur="indefinite" restart="never" nodeType="tmRoot"/>
+      </p:par>
+    </p:tnLst>
+  </p:timing>
 </p:sld>
 </file>
 
@@ -5965,16 +6494,77 @@
         </p:nvSpPr>
         <p:spPr/>
         <p:txBody>
-          <a:bodyPr/>
-          <a:lstStyle/>
-          <a:p>
-            <a:r>
-              <a:rPr lang="en-US" dirty="0" err="1" smtClean="0"/>
-              <a:t>AngularJs</a:t>
-            </a:r>
-            <a:r>
-              <a:rPr lang="en-US" dirty="0" smtClean="0"/>
-              <a:t> Template</a:t>
+          <a:bodyPr>
+            <a:normAutofit lnSpcReduction="10000"/>
+          </a:bodyPr>
+          <a:lstStyle/>
+          <a:p>
+            <a:r>
+              <a:rPr lang="en-US" dirty="0" smtClean="0"/>
+              <a:t>Services</a:t>
+            </a:r>
+          </a:p>
+          <a:p>
+            <a:pPr lvl="1"/>
+            <a:r>
+              <a:rPr lang="en-US" dirty="0"/>
+              <a:t>Lazily </a:t>
+            </a:r>
+            <a:r>
+              <a:rPr lang="en-US" dirty="0" smtClean="0"/>
+              <a:t>instantiated</a:t>
+            </a:r>
+          </a:p>
+          <a:p>
+            <a:pPr lvl="1"/>
+            <a:r>
+              <a:rPr lang="en-US" dirty="0"/>
+              <a:t>Singletons </a:t>
+            </a:r>
+            <a:endParaRPr lang="en-US" dirty="0" smtClean="0"/>
+          </a:p>
+          <a:p>
+            <a:r>
+              <a:rPr lang="en-US" dirty="0" smtClean="0"/>
+              <a:t>Types</a:t>
+            </a:r>
+            <a:endParaRPr lang="en-US" dirty="0" smtClean="0"/>
+          </a:p>
+          <a:p>
+            <a:pPr lvl="1"/>
+            <a:r>
+              <a:rPr lang="en-US" dirty="0" smtClean="0"/>
+              <a:t>Factories</a:t>
+            </a:r>
+          </a:p>
+          <a:p>
+            <a:pPr lvl="1"/>
+            <a:r>
+              <a:rPr lang="en-US" dirty="0" smtClean="0"/>
+              <a:t>Value</a:t>
+            </a:r>
+            <a:endParaRPr lang="en-US" dirty="0" smtClean="0"/>
+          </a:p>
+          <a:p>
+            <a:pPr lvl="1"/>
+            <a:r>
+              <a:rPr lang="en-US" dirty="0" smtClean="0"/>
+              <a:t>Constant</a:t>
+            </a:r>
+            <a:endParaRPr lang="en-US" dirty="0" smtClean="0"/>
+          </a:p>
+          <a:p>
+            <a:pPr lvl="1"/>
+            <a:r>
+              <a:rPr lang="en-US" dirty="0" smtClean="0"/>
+              <a:t>Service</a:t>
+            </a:r>
+          </a:p>
+          <a:p>
+            <a:pPr lvl="1"/>
+            <a:r>
+              <a:rPr lang="en-US" dirty="0" smtClean="0"/>
+              <a:t>Provider</a:t>
             </a:r>
             <a:endParaRPr lang="en-US" dirty="0"/>
           </a:p>
@@ -5985,6 +6575,13 @@
   <p:clrMapOvr>
     <a:masterClrMapping/>
   </p:clrMapOvr>
+  <p:timing>
+    <p:tnLst>
+      <p:par>
+        <p:cTn id="1" dur="indefinite" restart="never" nodeType="tmRoot"/>
+      </p:par>
+    </p:tnLst>
+  </p:timing>
 </p:sld>
 </file>
 
@@ -6049,42 +6646,102 @@
           <a:p>
             <a:r>
               <a:rPr lang="en-US" dirty="0" smtClean="0"/>
-              <a:t>Services</a:t>
+              <a:t>View </a:t>
+            </a:r>
+            <a:r>
+              <a:rPr lang="en-US" dirty="0" smtClean="0"/>
+              <a:t>Model</a:t>
             </a:r>
           </a:p>
           <a:p>
             <a:pPr lvl="1"/>
             <a:r>
               <a:rPr lang="en-US" dirty="0" smtClean="0"/>
-              <a:t>Factories</a:t>
+              <a:t>Distinct model layer</a:t>
             </a:r>
           </a:p>
           <a:p>
             <a:pPr lvl="1"/>
             <a:r>
-              <a:rPr lang="en-US" dirty="0" smtClean="0"/>
-              <a:t>Value Service</a:t>
-            </a:r>
-          </a:p>
-          <a:p>
-            <a:pPr lvl="1"/>
-            <a:r>
-              <a:rPr lang="en-US" dirty="0" smtClean="0"/>
-              <a:t>Constant Service</a:t>
-            </a:r>
-          </a:p>
-          <a:p>
-            <a:pPr lvl="1"/>
-            <a:r>
-              <a:rPr lang="en-US" dirty="0" smtClean="0"/>
-              <a:t>Service</a:t>
-            </a:r>
-          </a:p>
-          <a:p>
-            <a:pPr lvl="1"/>
-            <a:r>
-              <a:rPr lang="en-US" dirty="0" smtClean="0"/>
-              <a:t>Provider</a:t>
+              <a:rPr lang="en-US" dirty="0">
+                <a:hlinkClick r:id="rId2"/>
+              </a:rPr>
+              <a:t>scope</a:t>
+            </a:r>
+            <a:r>
+              <a:rPr lang="en-US" dirty="0"/>
+              <a:t> is an object that refers to the application model</a:t>
+            </a:r>
+            <a:endParaRPr lang="en-US" dirty="0" smtClean="0"/>
+          </a:p>
+          <a:p>
+            <a:pPr marL="457200" lvl="1" indent="0">
+              <a:buNone/>
+            </a:pPr>
+            <a:r>
+              <a:rPr lang="en-US" dirty="0"/>
+              <a:t>$</a:t>
+            </a:r>
+            <a:r>
+              <a:rPr lang="en-US" dirty="0" err="1"/>
+              <a:t>scope.</a:t>
+            </a:r>
+            <a:r>
+              <a:rPr lang="en-US" dirty="0" err="1">
+                <a:solidFill>
+                  <a:srgbClr val="C00000"/>
+                </a:solidFill>
+              </a:rPr>
+              <a:t>countries</a:t>
+            </a:r>
+            <a:r>
+              <a:rPr lang="en-US" dirty="0"/>
+              <a:t> = ['can', '</a:t>
+            </a:r>
+            <a:r>
+              <a:rPr lang="en-US" dirty="0" err="1"/>
+              <a:t>usa</a:t>
+            </a:r>
+            <a:r>
+              <a:rPr lang="en-US" dirty="0"/>
+              <a:t>', '</a:t>
+            </a:r>
+            <a:r>
+              <a:rPr lang="en-US" dirty="0" err="1"/>
+              <a:t>fra</a:t>
+            </a:r>
+            <a:r>
+              <a:rPr lang="en-US" dirty="0"/>
+              <a:t>', 'jap</a:t>
+            </a:r>
+            <a:r>
+              <a:rPr lang="en-US" dirty="0" smtClean="0"/>
+              <a:t>'];</a:t>
+            </a:r>
+          </a:p>
+          <a:p>
+            <a:pPr marL="457200" lvl="1" indent="0">
+              <a:buNone/>
+            </a:pPr>
+            <a:r>
+              <a:rPr lang="en-US" dirty="0"/>
+              <a:t>$</a:t>
+            </a:r>
+            <a:r>
+              <a:rPr lang="en-US" dirty="0" err="1"/>
+              <a:t>scope.</a:t>
+            </a:r>
+            <a:r>
+              <a:rPr lang="en-US" dirty="0" err="1">
+                <a:solidFill>
+                  <a:srgbClr val="C00000"/>
+                </a:solidFill>
+              </a:rPr>
+              <a:t>user</a:t>
+            </a:r>
+            <a:r>
+              <a:rPr lang="en-US" dirty="0"/>
+              <a:t> = {name: "Evil Trout"};</a:t>
             </a:r>
             <a:endParaRPr lang="en-US" dirty="0"/>
           </a:p>
@@ -6095,6 +6752,13 @@
   <p:clrMapOvr>
     <a:masterClrMapping/>
   </p:clrMapOvr>
+  <p:timing>
+    <p:tnLst>
+      <p:par>
+        <p:cTn id="1" dur="indefinite" restart="never" nodeType="tmRoot"/>
+      </p:par>
+    </p:tnLst>
+  </p:timing>
 </p:sld>
 </file>
 
@@ -6158,18 +6822,123 @@
           <a:lstStyle/>
           <a:p>
             <a:r>
-              <a:rPr lang="en-US" dirty="0" smtClean="0"/>
-              <a:t>View Model</a:t>
+              <a:rPr lang="en-US" dirty="0" err="1" smtClean="0"/>
+              <a:t>Controlers</a:t>
+            </a:r>
+            <a:endParaRPr lang="en-US" dirty="0" smtClean="0"/>
+          </a:p>
+          <a:p>
+            <a:pPr lvl="1"/>
+            <a:r>
+              <a:rPr lang="en-US" dirty="0"/>
+              <a:t>A</a:t>
+            </a:r>
+            <a:r>
+              <a:rPr lang="en-US" dirty="0" smtClean="0"/>
+              <a:t> </a:t>
+            </a:r>
+            <a:r>
+              <a:rPr lang="en-US" dirty="0"/>
+              <a:t>Controller is a JavaScript </a:t>
+            </a:r>
+            <a:r>
+              <a:rPr lang="en-US" b="1" dirty="0"/>
+              <a:t>constructor function</a:t>
+            </a:r>
+            <a:r>
+              <a:rPr lang="en-US" dirty="0"/>
+              <a:t> that is used to augment the </a:t>
+            </a:r>
+            <a:r>
+              <a:rPr lang="en-US" dirty="0">
+                <a:hlinkClick r:id="rId2"/>
+              </a:rPr>
+              <a:t>Angular </a:t>
+            </a:r>
+            <a:r>
+              <a:rPr lang="en-US" dirty="0" smtClean="0">
+                <a:hlinkClick r:id="rId2"/>
+              </a:rPr>
+              <a:t>Scope</a:t>
+            </a:r>
+            <a:endParaRPr lang="en-US" dirty="0" smtClean="0"/>
+          </a:p>
+          <a:p>
+            <a:pPr lvl="1"/>
+            <a:r>
+              <a:rPr lang="en-US" dirty="0"/>
+              <a:t>A</a:t>
+            </a:r>
+            <a:r>
+              <a:rPr lang="en-US" dirty="0" smtClean="0"/>
+              <a:t> </a:t>
+            </a:r>
+            <a:r>
+              <a:rPr lang="en-US" dirty="0"/>
+              <a:t>Controller is attached to the DOM via the </a:t>
+            </a:r>
+            <a:r>
+              <a:rPr lang="en-US" dirty="0" err="1">
+                <a:hlinkClick r:id="rId3"/>
+              </a:rPr>
+              <a:t>ng</a:t>
+            </a:r>
+            <a:r>
+              <a:rPr lang="en-US" dirty="0">
+                <a:hlinkClick r:id="rId3"/>
+              </a:rPr>
+              <a:t>-controller</a:t>
+            </a:r>
+            <a:r>
+              <a:rPr lang="en-US" dirty="0"/>
+              <a:t> directive</a:t>
             </a:r>
             <a:endParaRPr lang="en-US" dirty="0"/>
           </a:p>
         </p:txBody>
       </p:sp>
+      <p:pic>
+        <p:nvPicPr>
+          <p:cNvPr id="4" name="Picture 3"/>
+          <p:cNvPicPr>
+            <a:picLocks noChangeAspect="1"/>
+          </p:cNvPicPr>
+          <p:nvPr/>
+        </p:nvPicPr>
+        <p:blipFill>
+          <a:blip r:embed="rId4">
+            <a:extLst>
+              <a:ext uri="{28A0092B-C50C-407E-A947-70E740481C1C}">
+                <a14:useLocalDpi xmlns:a14="http://schemas.microsoft.com/office/drawing/2010/main" val="0"/>
+              </a:ext>
+            </a:extLst>
+          </a:blip>
+          <a:stretch>
+            <a:fillRect/>
+          </a:stretch>
+        </p:blipFill>
+        <p:spPr>
+          <a:xfrm>
+            <a:off x="762000" y="4876800"/>
+            <a:ext cx="7701611" cy="1600200"/>
+          </a:xfrm>
+          <a:prstGeom prst="rect">
+            <a:avLst/>
+          </a:prstGeom>
+        </p:spPr>
+      </p:pic>
     </p:spTree>
   </p:cSld>
   <p:clrMapOvr>
     <a:masterClrMapping/>
   </p:clrMapOvr>
+  <p:timing>
+    <p:tnLst>
+      <p:par>
+        <p:cTn id="1" dur="indefinite" restart="never" nodeType="tmRoot"/>
+      </p:par>
+    </p:tnLst>
+  </p:timing>
 </p:sld>
 </file>
 
@@ -6206,45 +6975,158 @@
           <a:lstStyle/>
           <a:p>
             <a:r>
-              <a:rPr lang="en-US" dirty="0" err="1" smtClean="0"/>
+              <a:rPr lang="en-US" dirty="0" err="1"/>
               <a:t>AngularJs</a:t>
             </a:r>
             <a:r>
-              <a:rPr lang="en-US" dirty="0" smtClean="0"/>
+              <a:rPr lang="en-US" dirty="0"/>
               <a:t> component</a:t>
             </a:r>
+          </a:p>
+        </p:txBody>
+      </p:sp>
+      <p:sp>
+        <p:nvSpPr>
+          <p:cNvPr id="3" name="Content Placeholder 2"/>
+          <p:cNvSpPr>
+            <a:spLocks noGrp="1"/>
+          </p:cNvSpPr>
+          <p:nvPr>
+            <p:ph idx="1"/>
+          </p:nvPr>
+        </p:nvSpPr>
+        <p:spPr/>
+        <p:txBody>
+          <a:bodyPr>
+            <a:normAutofit fontScale="92500" lnSpcReduction="20000"/>
+          </a:bodyPr>
+          <a:lstStyle/>
+          <a:p>
+            <a:r>
+              <a:rPr lang="en-US" dirty="0"/>
+              <a:t>Use controllers to</a:t>
+            </a:r>
+            <a:r>
+              <a:rPr lang="en-US" dirty="0" smtClean="0"/>
+              <a:t>:</a:t>
+            </a:r>
+          </a:p>
+          <a:p>
+            <a:pPr lvl="1"/>
+            <a:r>
+              <a:rPr lang="en-US" dirty="0"/>
+              <a:t>Set up the initial state of the $scope object.</a:t>
+            </a:r>
+          </a:p>
+          <a:p>
+            <a:pPr lvl="1"/>
+            <a:r>
+              <a:rPr lang="en-US" dirty="0"/>
+              <a:t>Add behavior to the $scope object.</a:t>
+            </a:r>
+          </a:p>
+          <a:p>
+            <a:r>
+              <a:rPr lang="en-US" dirty="0"/>
+              <a:t>Do not use controllers to</a:t>
+            </a:r>
+            <a:r>
+              <a:rPr lang="en-US" dirty="0" smtClean="0"/>
+              <a:t>:</a:t>
+            </a:r>
+          </a:p>
+          <a:p>
+            <a:pPr lvl="1"/>
+            <a:r>
+              <a:rPr lang="en-US" dirty="0"/>
+              <a:t>Manipulate </a:t>
+            </a:r>
+            <a:r>
+              <a:rPr lang="en-US" dirty="0" smtClean="0"/>
+              <a:t>DOM</a:t>
+            </a:r>
+          </a:p>
+          <a:p>
+            <a:pPr lvl="1"/>
+            <a:r>
+              <a:rPr lang="en-US" dirty="0"/>
+              <a:t>Format input — Use </a:t>
+            </a:r>
+            <a:r>
+              <a:rPr lang="en-US" dirty="0">
+                <a:hlinkClick r:id="rId2"/>
+              </a:rPr>
+              <a:t>angular form controls</a:t>
+            </a:r>
+            <a:r>
+              <a:rPr lang="en-US" dirty="0"/>
+              <a:t> instead.</a:t>
+            </a:r>
+          </a:p>
+          <a:p>
+            <a:pPr lvl="1"/>
+            <a:r>
+              <a:rPr lang="en-US" dirty="0"/>
+              <a:t>Filter output — Use </a:t>
+            </a:r>
+            <a:r>
+              <a:rPr lang="en-US" dirty="0">
+                <a:hlinkClick r:id="rId3"/>
+              </a:rPr>
+              <a:t>angular filters</a:t>
+            </a:r>
+            <a:r>
+              <a:rPr lang="en-US" dirty="0"/>
+              <a:t> instead.</a:t>
+            </a:r>
+          </a:p>
+          <a:p>
+            <a:pPr lvl="1"/>
+            <a:r>
+              <a:rPr lang="en-US" dirty="0"/>
+              <a:t>Share code or state across controllers — Use </a:t>
+            </a:r>
+            <a:r>
+              <a:rPr lang="en-US" dirty="0">
+                <a:hlinkClick r:id="rId4"/>
+              </a:rPr>
+              <a:t>angular services</a:t>
+            </a:r>
+            <a:r>
+              <a:rPr lang="en-US" dirty="0"/>
+              <a:t> instead.</a:t>
+            </a:r>
+          </a:p>
+          <a:p>
+            <a:pPr lvl="1"/>
+            <a:r>
+              <a:rPr lang="en-US" dirty="0"/>
+              <a:t>Manage the life-cycle of other components (for example, to create service instances).</a:t>
+            </a:r>
+          </a:p>
+          <a:p>
+            <a:pPr lvl="1"/>
             <a:endParaRPr lang="en-US" dirty="0"/>
           </a:p>
         </p:txBody>
       </p:sp>
-      <p:sp>
-        <p:nvSpPr>
-          <p:cNvPr id="3" name="Content Placeholder 2"/>
-          <p:cNvSpPr>
-            <a:spLocks noGrp="1"/>
-          </p:cNvSpPr>
-          <p:nvPr>
-            <p:ph idx="1"/>
-          </p:nvPr>
-        </p:nvSpPr>
-        <p:spPr/>
-        <p:txBody>
-          <a:bodyPr/>
-          <a:lstStyle/>
-          <a:p>
-            <a:r>
-              <a:rPr lang="en-US" dirty="0" err="1" smtClean="0"/>
-              <a:t>Controlers</a:t>
-            </a:r>
-            <a:endParaRPr lang="en-US" dirty="0"/>
-          </a:p>
-        </p:txBody>
-      </p:sp>
     </p:spTree>
+    <p:extLst>
+      <p:ext uri="{BB962C8B-B14F-4D97-AF65-F5344CB8AC3E}">
+        <p14:creationId xmlns:p14="http://schemas.microsoft.com/office/powerpoint/2010/main" val="1015594596"/>
+      </p:ext>
+    </p:extLst>
   </p:cSld>
   <p:clrMapOvr>
     <a:masterClrMapping/>
   </p:clrMapOvr>
+  <p:timing>
+    <p:tnLst>
+      <p:par>
+        <p:cTn id="1" dur="indefinite" restart="never" nodeType="tmRoot"/>
+      </p:par>
+    </p:tnLst>
+  </p:timing>
 </p:sld>
 </file>
 
@@ -6304,12 +7186,189 @@
         </p:nvSpPr>
         <p:spPr/>
         <p:txBody>
-          <a:bodyPr/>
-          <a:lstStyle/>
-          <a:p>
-            <a:r>
-              <a:rPr lang="en-US" dirty="0" smtClean="0"/>
-              <a:t>Views</a:t>
+          <a:bodyPr>
+            <a:normAutofit lnSpcReduction="10000"/>
+          </a:bodyPr>
+          <a:lstStyle/>
+          <a:p>
+            <a:r>
+              <a:rPr lang="en-US" dirty="0" smtClean="0"/>
+              <a:t>Directives</a:t>
+            </a:r>
+          </a:p>
+          <a:p>
+            <a:pPr lvl="1"/>
+            <a:r>
+              <a:rPr lang="en-US" dirty="0" smtClean="0"/>
+              <a:t>Directives </a:t>
+            </a:r>
+            <a:r>
+              <a:rPr lang="en-US" dirty="0"/>
+              <a:t>are markers on a DOM element (such as an </a:t>
+            </a:r>
+            <a:r>
+              <a:rPr lang="en-US" dirty="0" smtClean="0"/>
+              <a:t>attribute, </a:t>
+            </a:r>
+            <a:r>
+              <a:rPr lang="en-US" dirty="0"/>
+              <a:t>element name, comment or CSS class) that tell </a:t>
+            </a:r>
+            <a:r>
+              <a:rPr lang="en-US" dirty="0" err="1"/>
+              <a:t>AngularJS's</a:t>
+            </a:r>
+            <a:r>
+              <a:rPr lang="en-US" b="1" dirty="0" err="1"/>
+              <a:t>HTML</a:t>
+            </a:r>
+            <a:r>
+              <a:rPr lang="en-US" b="1" dirty="0"/>
+              <a:t> compiler</a:t>
+            </a:r>
+            <a:r>
+              <a:rPr lang="en-US" dirty="0"/>
+              <a:t> (</a:t>
+            </a:r>
+            <a:r>
+              <a:rPr lang="en-US" dirty="0">
+                <a:hlinkClick r:id="rId2"/>
+              </a:rPr>
+              <a:t>$compile</a:t>
+            </a:r>
+            <a:r>
+              <a:rPr lang="en-US" dirty="0"/>
+              <a:t>) to attach a specified behavior to that DOM element or even transform the DOM element and its </a:t>
+            </a:r>
+            <a:r>
+              <a:rPr lang="en-US" dirty="0" smtClean="0"/>
+              <a:t>children.</a:t>
+            </a:r>
+          </a:p>
+          <a:p>
+            <a:pPr lvl="1"/>
+            <a:endParaRPr lang="en-US" dirty="0" smtClean="0"/>
+          </a:p>
+          <a:p>
+            <a:pPr marL="457200" lvl="1" indent="0">
+              <a:buNone/>
+            </a:pPr>
+            <a:r>
+              <a:rPr lang="en-US" dirty="0">
+                <a:solidFill>
+                  <a:srgbClr val="000080"/>
+                </a:solidFill>
+              </a:rPr>
+              <a:t>&lt;input</a:t>
+            </a:r>
+            <a:r>
+              <a:rPr lang="en-US" dirty="0">
+                <a:solidFill>
+                  <a:srgbClr val="333333"/>
+                </a:solidFill>
+              </a:rPr>
+              <a:t> </a:t>
+            </a:r>
+            <a:r>
+              <a:rPr lang="en-US" dirty="0" err="1">
+                <a:solidFill>
+                  <a:srgbClr val="008080"/>
+                </a:solidFill>
+              </a:rPr>
+              <a:t>ng</a:t>
+            </a:r>
+            <a:r>
+              <a:rPr lang="en-US" dirty="0">
+                <a:solidFill>
+                  <a:srgbClr val="008080"/>
+                </a:solidFill>
+              </a:rPr>
+              <a:t>-model</a:t>
+            </a:r>
+            <a:r>
+              <a:rPr lang="en-US" dirty="0">
+                <a:solidFill>
+                  <a:srgbClr val="333333"/>
+                </a:solidFill>
+              </a:rPr>
+              <a:t>=</a:t>
+            </a:r>
+            <a:r>
+              <a:rPr lang="en-US" dirty="0">
+                <a:solidFill>
+                  <a:srgbClr val="DD1144"/>
+                </a:solidFill>
+              </a:rPr>
+              <a:t>"foo</a:t>
+            </a:r>
+            <a:r>
+              <a:rPr lang="en-US" dirty="0" smtClean="0">
+                <a:solidFill>
+                  <a:srgbClr val="DD1144"/>
+                </a:solidFill>
+              </a:rPr>
+              <a:t>"</a:t>
+            </a:r>
+            <a:r>
+              <a:rPr lang="en-US" dirty="0" smtClean="0">
+                <a:solidFill>
+                  <a:srgbClr val="000080"/>
+                </a:solidFill>
+              </a:rPr>
+              <a:t>&gt;</a:t>
+            </a:r>
+          </a:p>
+          <a:p>
+            <a:pPr marL="457200" lvl="1" indent="0">
+              <a:buNone/>
+            </a:pPr>
+            <a:r>
+              <a:rPr lang="en-US" dirty="0">
+                <a:solidFill>
+                  <a:srgbClr val="000080"/>
+                </a:solidFill>
+              </a:rPr>
+              <a:t>&lt;input</a:t>
+            </a:r>
+            <a:r>
+              <a:rPr lang="en-US" dirty="0">
+                <a:solidFill>
+                  <a:srgbClr val="333333"/>
+                </a:solidFill>
+              </a:rPr>
+              <a:t> </a:t>
+            </a:r>
+            <a:r>
+              <a:rPr lang="en-US" dirty="0" err="1">
+                <a:solidFill>
+                  <a:srgbClr val="008080"/>
+                </a:solidFill>
+              </a:rPr>
+              <a:t>data-ng:model</a:t>
+            </a:r>
+            <a:r>
+              <a:rPr lang="en-US" dirty="0">
+                <a:solidFill>
+                  <a:srgbClr val="333333"/>
+                </a:solidFill>
+              </a:rPr>
+              <a:t>=</a:t>
+            </a:r>
+            <a:r>
+              <a:rPr lang="en-US" dirty="0">
+                <a:solidFill>
+                  <a:srgbClr val="DD1144"/>
+                </a:solidFill>
+              </a:rPr>
+              <a:t>"foo"</a:t>
+            </a:r>
+            <a:r>
+              <a:rPr lang="en-US" dirty="0">
+                <a:solidFill>
+                  <a:srgbClr val="000080"/>
+                </a:solidFill>
+              </a:rPr>
+              <a:t>&gt;</a:t>
             </a:r>
             <a:endParaRPr lang="en-US" dirty="0"/>
           </a:p>
@@ -6320,6 +7379,13 @@
   <p:clrMapOvr>
     <a:masterClrMapping/>
   </p:clrMapOvr>
+  <p:timing>
+    <p:tnLst>
+      <p:par>
+        <p:cTn id="1" dur="indefinite" restart="never" nodeType="tmRoot"/>
+      </p:par>
+    </p:tnLst>
+  </p:timing>
 </p:sld>
 </file>
 
@@ -6384,17 +7450,121 @@
           <a:p>
             <a:r>
               <a:rPr lang="en-US" dirty="0" smtClean="0"/>
-              <a:t>Directives</a:t>
+              <a:t>Filters</a:t>
+            </a:r>
+          </a:p>
+          <a:p>
+            <a:pPr lvl="1"/>
+            <a:r>
+              <a:rPr lang="en-US" dirty="0"/>
+              <a:t>A filter formats the value of an expression for display to the user</a:t>
             </a:r>
             <a:endParaRPr lang="en-US" dirty="0"/>
           </a:p>
         </p:txBody>
       </p:sp>
+      <p:pic>
+        <p:nvPicPr>
+          <p:cNvPr id="4" name="Picture 3"/>
+          <p:cNvPicPr>
+            <a:picLocks noChangeAspect="1"/>
+          </p:cNvPicPr>
+          <p:nvPr/>
+        </p:nvPicPr>
+        <p:blipFill>
+          <a:blip r:embed="rId2">
+            <a:extLst>
+              <a:ext uri="{28A0092B-C50C-407E-A947-70E740481C1C}">
+                <a14:useLocalDpi xmlns:a14="http://schemas.microsoft.com/office/drawing/2010/main" val="0"/>
+              </a:ext>
+            </a:extLst>
+          </a:blip>
+          <a:stretch>
+            <a:fillRect/>
+          </a:stretch>
+        </p:blipFill>
+        <p:spPr>
+          <a:xfrm>
+            <a:off x="1752600" y="3352800"/>
+            <a:ext cx="4637311" cy="685800"/>
+          </a:xfrm>
+          <a:prstGeom prst="rect">
+            <a:avLst/>
+          </a:prstGeom>
+        </p:spPr>
+      </p:pic>
+      <p:pic>
+        <p:nvPicPr>
+          <p:cNvPr id="5" name="Picture 4"/>
+          <p:cNvPicPr>
+            <a:picLocks noChangeAspect="1"/>
+          </p:cNvPicPr>
+          <p:nvPr/>
+        </p:nvPicPr>
+        <p:blipFill>
+          <a:blip r:embed="rId3">
+            <a:extLst>
+              <a:ext uri="{28A0092B-C50C-407E-A947-70E740481C1C}">
+                <a14:useLocalDpi xmlns:a14="http://schemas.microsoft.com/office/drawing/2010/main" val="0"/>
+              </a:ext>
+            </a:extLst>
+          </a:blip>
+          <a:stretch>
+            <a:fillRect/>
+          </a:stretch>
+        </p:blipFill>
+        <p:spPr>
+          <a:xfrm>
+            <a:off x="2209800" y="4191000"/>
+            <a:ext cx="4514916" cy="902982"/>
+          </a:xfrm>
+          <a:prstGeom prst="rect">
+            <a:avLst/>
+          </a:prstGeom>
+        </p:spPr>
+      </p:pic>
+      <p:pic>
+        <p:nvPicPr>
+          <p:cNvPr id="6" name="Picture 5"/>
+          <p:cNvPicPr>
+            <a:picLocks noChangeAspect="1"/>
+          </p:cNvPicPr>
+          <p:nvPr/>
+        </p:nvPicPr>
+        <p:blipFill>
+          <a:blip r:embed="rId4">
+            <a:extLst>
+              <a:ext uri="{28A0092B-C50C-407E-A947-70E740481C1C}">
+                <a14:useLocalDpi xmlns:a14="http://schemas.microsoft.com/office/drawing/2010/main" val="0"/>
+              </a:ext>
+            </a:extLst>
+          </a:blip>
+          <a:stretch>
+            <a:fillRect/>
+          </a:stretch>
+        </p:blipFill>
+        <p:spPr>
+          <a:xfrm>
+            <a:off x="3352800" y="5319481"/>
+            <a:ext cx="1817252" cy="791038"/>
+          </a:xfrm>
+          <a:prstGeom prst="rect">
+            <a:avLst/>
+          </a:prstGeom>
+        </p:spPr>
+      </p:pic>
     </p:spTree>
   </p:cSld>
   <p:clrMapOvr>
     <a:masterClrMapping/>
   </p:clrMapOvr>
+  <p:timing>
+    <p:tnLst>
+      <p:par>
+        <p:cTn id="1" dur="indefinite" restart="never" nodeType="tmRoot"/>
+      </p:par>
+    </p:tnLst>
+  </p:timing>
 </p:sld>
 </file>
 
@@ -6459,8 +7629,18 @@
           <a:p>
             <a:r>
               <a:rPr lang="en-US" dirty="0" smtClean="0"/>
-              <a:t>Filters</a:t>
-            </a:r>
+              <a:t>Validation</a:t>
+            </a:r>
+          </a:p>
+          <a:p>
+            <a:pPr lvl="1"/>
+            <a:r>
+              <a:rPr lang="en-US" dirty="0" smtClean="0"/>
+              <a:t>Form directive</a:t>
+            </a:r>
+          </a:p>
+          <a:p>
+            <a:pPr lvl="1"/>
             <a:endParaRPr lang="en-US" dirty="0"/>
           </a:p>
         </p:txBody>
@@ -6470,6 +7650,13 @@
   <p:clrMapOvr>
     <a:masterClrMapping/>
   </p:clrMapOvr>
+  <p:timing>
+    <p:tnLst>
+      <p:par>
+        <p:cTn id="1" dur="indefinite" restart="never" nodeType="tmRoot"/>
+      </p:par>
+    </p:tnLst>
+  </p:timing>
 </p:sld>
 </file>
 
@@ -6527,7 +7714,7 @@
           <a:blip r:embed="rId2">
             <a:extLst>
               <a:ext uri="{28A0092B-C50C-407E-A947-70E740481C1C}">
-                <a14:useLocalDpi xmlns:a14="http://schemas.microsoft.com/office/drawing/2010/main" xmlns="" val="0"/>
+                <a14:useLocalDpi xmlns:a14="http://schemas.microsoft.com/office/drawing/2010/main" val="0"/>
               </a:ext>
             </a:extLst>
           </a:blip>
@@ -6576,13 +7763,20 @@
     </p:spTree>
     <p:extLst>
       <p:ext uri="{BB962C8B-B14F-4D97-AF65-F5344CB8AC3E}">
-        <p14:creationId xmlns:p14="http://schemas.microsoft.com/office/powerpoint/2010/main" xmlns="" val="241145940"/>
+        <p14:creationId xmlns:p14="http://schemas.microsoft.com/office/powerpoint/2010/main" val="241145940"/>
       </p:ext>
     </p:extLst>
   </p:cSld>
   <p:clrMapOvr>
     <a:masterClrMapping/>
   </p:clrMapOvr>
+  <p:timing>
+    <p:tnLst>
+      <p:par>
+        <p:cTn id="1" dur="indefinite" restart="never" nodeType="tmRoot"/>
+      </p:par>
+    </p:tnLst>
+  </p:timing>
 </p:sld>
 </file>
 
@@ -6647,17 +7841,54 @@
           <a:p>
             <a:r>
               <a:rPr lang="en-US" dirty="0" smtClean="0"/>
-              <a:t>Validation</a:t>
+              <a:t>DI</a:t>
             </a:r>
             <a:endParaRPr lang="en-US" dirty="0"/>
           </a:p>
         </p:txBody>
       </p:sp>
+      <p:pic>
+        <p:nvPicPr>
+          <p:cNvPr id="4" name="Picture 3"/>
+          <p:cNvPicPr>
+            <a:picLocks noChangeAspect="1"/>
+          </p:cNvPicPr>
+          <p:nvPr/>
+        </p:nvPicPr>
+        <p:blipFill>
+          <a:blip r:embed="rId2">
+            <a:extLst>
+              <a:ext uri="{28A0092B-C50C-407E-A947-70E740481C1C}">
+                <a14:useLocalDpi xmlns:a14="http://schemas.microsoft.com/office/drawing/2010/main" val="0"/>
+              </a:ext>
+            </a:extLst>
+          </a:blip>
+          <a:stretch>
+            <a:fillRect/>
+          </a:stretch>
+        </p:blipFill>
+        <p:spPr>
+          <a:xfrm>
+            <a:off x="1676400" y="1550651"/>
+            <a:ext cx="6120348" cy="5078749"/>
+          </a:xfrm>
+          <a:prstGeom prst="rect">
+            <a:avLst/>
+          </a:prstGeom>
+        </p:spPr>
+      </p:pic>
     </p:spTree>
   </p:cSld>
   <p:clrMapOvr>
     <a:masterClrMapping/>
   </p:clrMapOvr>
+  <p:timing>
+    <p:tnLst>
+      <p:par>
+        <p:cTn id="1" dur="indefinite" restart="never" nodeType="tmRoot"/>
+      </p:par>
+    </p:tnLst>
+  </p:timing>
 </p:sld>
 </file>
 
@@ -6717,12 +7948,39 @@
         </p:nvSpPr>
         <p:spPr/>
         <p:txBody>
-          <a:bodyPr/>
-          <a:lstStyle/>
-          <a:p>
-            <a:r>
-              <a:rPr lang="en-US" dirty="0" smtClean="0"/>
-              <a:t>Dependency Injection</a:t>
+          <a:bodyPr>
+            <a:normAutofit/>
+          </a:bodyPr>
+          <a:lstStyle/>
+          <a:p>
+            <a:r>
+              <a:rPr lang="en-US" dirty="0" smtClean="0"/>
+              <a:t>Testing</a:t>
+            </a:r>
+          </a:p>
+          <a:p>
+            <a:pPr marL="0" indent="0" algn="ctr">
+              <a:buNone/>
+            </a:pPr>
+            <a:r>
+              <a:rPr lang="en-US" dirty="0" smtClean="0"/>
+              <a:t>‘</a:t>
+            </a:r>
+            <a:r>
+              <a:rPr lang="en-US" sz="2400" dirty="0"/>
+              <a:t>JavaScript is a dynamically typed language which comes with great power of expression, but it also comes with almost no help from the compiler. For this reason we feel very strongly that any code written in JavaScript needs to come with a strong set of tests. We have built many features into Angular which makes testing your Angular applications easy. </a:t>
+            </a:r>
+            <a:r>
+              <a:rPr lang="en-US" sz="2400" b="1" dirty="0"/>
+              <a:t>So there is no excuse for not </a:t>
+            </a:r>
+            <a:r>
+              <a:rPr lang="en-US" sz="2400" b="1" dirty="0" smtClean="0"/>
+              <a:t>testing</a:t>
+            </a:r>
+            <a:r>
+              <a:rPr lang="en-US" dirty="0" smtClean="0"/>
+              <a:t>’</a:t>
             </a:r>
             <a:endParaRPr lang="en-US" dirty="0"/>
           </a:p>
@@ -6733,6 +7991,13 @@
   <p:clrMapOvr>
     <a:masterClrMapping/>
   </p:clrMapOvr>
+  <p:timing>
+    <p:tnLst>
+      <p:par>
+        <p:cTn id="1" dur="indefinite" restart="never" nodeType="tmRoot"/>
+      </p:par>
+    </p:tnLst>
+  </p:timing>
 </p:sld>
 </file>
 
@@ -6769,45 +8034,76 @@
           <a:lstStyle/>
           <a:p>
             <a:r>
-              <a:rPr lang="en-US" dirty="0" err="1" smtClean="0"/>
+              <a:rPr lang="en-US" dirty="0" err="1"/>
               <a:t>AngularJs</a:t>
             </a:r>
             <a:r>
-              <a:rPr lang="en-US" dirty="0" smtClean="0"/>
+              <a:rPr lang="en-US" dirty="0"/>
               <a:t> component</a:t>
             </a:r>
+          </a:p>
+        </p:txBody>
+      </p:sp>
+      <p:sp>
+        <p:nvSpPr>
+          <p:cNvPr id="3" name="Content Placeholder 2"/>
+          <p:cNvSpPr>
+            <a:spLocks noGrp="1"/>
+          </p:cNvSpPr>
+          <p:nvPr>
+            <p:ph idx="1"/>
+          </p:nvPr>
+        </p:nvSpPr>
+        <p:spPr/>
+        <p:txBody>
+          <a:bodyPr/>
+          <a:lstStyle/>
+          <a:p>
+            <a:r>
+              <a:rPr lang="en-US" dirty="0" smtClean="0"/>
+              <a:t>Unit Testing</a:t>
+            </a:r>
+          </a:p>
+          <a:p>
+            <a:pPr lvl="1"/>
+            <a:r>
+              <a:rPr lang="en-US" dirty="0" smtClean="0"/>
+              <a:t>Assert JS object</a:t>
+            </a:r>
+          </a:p>
+          <a:p>
+            <a:r>
+              <a:rPr lang="en-US" dirty="0" smtClean="0"/>
+              <a:t>E2E Testing</a:t>
+            </a:r>
+          </a:p>
+          <a:p>
+            <a:pPr lvl="1"/>
+            <a:r>
+              <a:rPr lang="en-US" dirty="0" smtClean="0"/>
+              <a:t>Assert HTML attribute, value, style</a:t>
+            </a:r>
             <a:endParaRPr lang="en-US" dirty="0"/>
           </a:p>
         </p:txBody>
       </p:sp>
-      <p:sp>
-        <p:nvSpPr>
-          <p:cNvPr id="3" name="Content Placeholder 2"/>
-          <p:cNvSpPr>
-            <a:spLocks noGrp="1"/>
-          </p:cNvSpPr>
-          <p:nvPr>
-            <p:ph idx="1"/>
-          </p:nvPr>
-        </p:nvSpPr>
-        <p:spPr/>
-        <p:txBody>
-          <a:bodyPr/>
-          <a:lstStyle/>
-          <a:p>
-            <a:r>
-              <a:rPr lang="en-US" dirty="0" smtClean="0"/>
-              <a:t>Testing</a:t>
-            </a:r>
-            <a:endParaRPr lang="en-US" dirty="0"/>
-          </a:p>
-        </p:txBody>
-      </p:sp>
     </p:spTree>
+    <p:extLst>
+      <p:ext uri="{BB962C8B-B14F-4D97-AF65-F5344CB8AC3E}">
+        <p14:creationId xmlns:p14="http://schemas.microsoft.com/office/powerpoint/2010/main" val="1828908388"/>
+      </p:ext>
+    </p:extLst>
   </p:cSld>
   <p:clrMapOvr>
     <a:masterClrMapping/>
   </p:clrMapOvr>
+  <p:timing>
+    <p:tnLst>
+      <p:par>
+        <p:cTn id="1" dur="indefinite" restart="never" nodeType="tmRoot"/>
+      </p:par>
+    </p:tnLst>
+  </p:timing>
 </p:sld>
 </file>
 
@@ -6883,6 +8179,13 @@
   <p:clrMapOvr>
     <a:masterClrMapping/>
   </p:clrMapOvr>
+  <p:timing>
+    <p:tnLst>
+      <p:par>
+        <p:cTn id="1" dur="indefinite" restart="never" nodeType="tmRoot"/>
+      </p:par>
+    </p:tnLst>
+  </p:timing>
 </p:sld>
 </file>
 
@@ -6998,11 +8301,7 @@
             </a:r>
             <a:r>
               <a:rPr lang="en-US" dirty="0" smtClean="0"/>
-              <a:t> listener on the &lt;input&gt; </a:t>
-            </a:r>
-            <a:r>
-              <a:rPr lang="en-US" dirty="0" smtClean="0"/>
-              <a:t>control</a:t>
+              <a:t> listener on the &lt;input&gt; control</a:t>
             </a:r>
           </a:p>
           <a:p>
@@ -7064,6 +8363,13 @@
   <p:clrMapOvr>
     <a:masterClrMapping/>
   </p:clrMapOvr>
+  <p:timing>
+    <p:tnLst>
+      <p:par>
+        <p:cTn id="1" dur="indefinite" restart="never" nodeType="tmRoot"/>
+      </p:par>
+    </p:tnLst>
+  </p:timing>
 </p:sld>
 </file>
 
@@ -7214,6 +8520,13 @@
   <p:clrMapOvr>
     <a:masterClrMapping/>
   </p:clrMapOvr>
+  <p:timing>
+    <p:tnLst>
+      <p:par>
+        <p:cTn id="1" dur="indefinite" restart="never" nodeType="tmRoot"/>
+      </p:par>
+    </p:tnLst>
+  </p:timing>
 </p:sld>
 </file>
 
@@ -7308,6 +8621,13 @@
   <p:clrMapOvr>
     <a:masterClrMapping/>
   </p:clrMapOvr>
+  <p:timing>
+    <p:tnLst>
+      <p:par>
+        <p:cTn id="1" dur="indefinite" restart="never" nodeType="tmRoot"/>
+      </p:par>
+    </p:tnLst>
+  </p:timing>
 </p:sld>
 </file>
 
@@ -7375,6 +8695,13 @@
   <p:clrMapOvr>
     <a:masterClrMapping/>
   </p:clrMapOvr>
+  <p:timing>
+    <p:tnLst>
+      <p:par>
+        <p:cTn id="1" dur="indefinite" restart="never" nodeType="tmRoot"/>
+      </p:par>
+    </p:tnLst>
+  </p:timing>
 </p:sld>
 </file>
 
@@ -7471,7 +8798,7 @@
           <a:blip r:embed="rId2">
             <a:extLst>
               <a:ext uri="{28A0092B-C50C-407E-A947-70E740481C1C}">
-                <a14:useLocalDpi xmlns:a14="http://schemas.microsoft.com/office/drawing/2010/main" xmlns="" val="0"/>
+                <a14:useLocalDpi xmlns:a14="http://schemas.microsoft.com/office/drawing/2010/main" val="0"/>
               </a:ext>
             </a:extLst>
           </a:blip>
@@ -7492,13 +8819,28 @@
     </p:spTree>
     <p:extLst>
       <p:ext uri="{BB962C8B-B14F-4D97-AF65-F5344CB8AC3E}">
-        <p14:creationId xmlns:p14="http://schemas.microsoft.com/office/powerpoint/2010/main" xmlns="" val="905673591"/>
+        <p14:creationId xmlns:p14="http://schemas.microsoft.com/office/powerpoint/2010/main" val="905673591"/>
       </p:ext>
     </p:extLst>
   </p:cSld>
   <p:clrMapOvr>
     <a:masterClrMapping/>
   </p:clrMapOvr>
+  <mc:AlternateContent xmlns:mc="http://schemas.openxmlformats.org/markup-compatibility/2006">
+    <mc:Choice xmlns:p14="http://schemas.microsoft.com/office/powerpoint/2010/main" Requires="p14">
+      <p:transition p14:dur="0"/>
+    </mc:Choice>
+    <mc:Fallback>
+      <p:transition/>
+    </mc:Fallback>
+  </mc:AlternateContent>
+  <p:timing>
+    <p:tnLst>
+      <p:par>
+        <p:cTn id="1" dur="indefinite" restart="never" nodeType="tmRoot"/>
+      </p:par>
+    </p:tnLst>
+  </p:timing>
 </p:sld>
 </file>
 
@@ -7649,14 +8991,18 @@
               <a:t> for </a:t>
             </a:r>
             <a:r>
-              <a:rPr lang="en-US" dirty="0">
+              <a:rPr lang="en-US" dirty="0" smtClean="0">
                 <a:hlinkClick r:id="rId10" tooltip="Apple Inc."/>
               </a:rPr>
               <a:t>Apple</a:t>
             </a:r>
             <a:r>
               <a:rPr lang="en-US" dirty="0"/>
-              <a:t> for </a:t>
+              <a:t>,</a:t>
+            </a:r>
+            <a:r>
+              <a:rPr lang="en-US" dirty="0"/>
+              <a:t> </a:t>
             </a:r>
             <a:r>
               <a:rPr lang="en-US" dirty="0">
@@ -7675,13 +9021,20 @@
     </p:spTree>
     <p:extLst>
       <p:ext uri="{BB962C8B-B14F-4D97-AF65-F5344CB8AC3E}">
-        <p14:creationId xmlns:p14="http://schemas.microsoft.com/office/powerpoint/2010/main" xmlns="" val="323403614"/>
+        <p14:creationId xmlns:p14="http://schemas.microsoft.com/office/powerpoint/2010/main" val="323403614"/>
       </p:ext>
     </p:extLst>
   </p:cSld>
   <p:clrMapOvr>
     <a:masterClrMapping/>
   </p:clrMapOvr>
+  <p:timing>
+    <p:tnLst>
+      <p:par>
+        <p:cTn id="1" dur="indefinite" restart="never" nodeType="tmRoot"/>
+      </p:par>
+    </p:tnLst>
+  </p:timing>
 </p:sld>
 </file>
 
@@ -7725,120 +9078,6 @@
           </a:p>
         </p:txBody>
       </p:sp>
-      <p:sp>
-        <p:nvSpPr>
-          <p:cNvPr id="3" name="Content Placeholder 2"/>
-          <p:cNvSpPr>
-            <a:spLocks noGrp="1"/>
-          </p:cNvSpPr>
-          <p:nvPr>
-            <p:ph idx="1"/>
-          </p:nvPr>
-        </p:nvSpPr>
-        <p:spPr/>
-        <p:txBody>
-          <a:bodyPr/>
-          <a:lstStyle/>
-          <a:p>
-            <a:r>
-              <a:rPr lang="en-US" dirty="0" smtClean="0"/>
-              <a:t>Document Object Model</a:t>
-            </a:r>
-          </a:p>
-          <a:p>
-            <a:pPr lvl="1"/>
-            <a:r>
-              <a:rPr lang="en-US" dirty="0"/>
-              <a:t>Web browsers rely on layout engines to parse HTML into a </a:t>
-            </a:r>
-            <a:r>
-              <a:rPr lang="en-US" dirty="0" smtClean="0"/>
-              <a:t>DOM</a:t>
-            </a:r>
-          </a:p>
-          <a:p>
-            <a:pPr lvl="1"/>
-            <a:r>
-              <a:rPr lang="en-US" dirty="0"/>
-              <a:t>It is the object presentation of the HTML </a:t>
-            </a:r>
-            <a:r>
-              <a:rPr lang="en-US" dirty="0" smtClean="0"/>
-              <a:t>document</a:t>
-            </a:r>
-          </a:p>
-          <a:p>
-            <a:pPr lvl="1"/>
-            <a:r>
-              <a:rPr lang="en-US" dirty="0"/>
-              <a:t>The root of the tree is the "</a:t>
-            </a:r>
-            <a:r>
-              <a:rPr lang="en-US" u="sng" dirty="0">
-                <a:hlinkClick r:id="rId2"/>
-              </a:rPr>
-              <a:t>Document</a:t>
-            </a:r>
-            <a:r>
-              <a:rPr lang="en-US" dirty="0"/>
-              <a:t>" object.</a:t>
-            </a:r>
-          </a:p>
-        </p:txBody>
-      </p:sp>
-    </p:spTree>
-    <p:extLst>
-      <p:ext uri="{BB962C8B-B14F-4D97-AF65-F5344CB8AC3E}">
-        <p14:creationId xmlns:p14="http://schemas.microsoft.com/office/powerpoint/2010/main" xmlns="" val="2374592750"/>
-      </p:ext>
-    </p:extLst>
-  </p:cSld>
-  <p:clrMapOvr>
-    <a:masterClrMapping/>
-  </p:clrMapOvr>
-</p:sld>
-</file>
-
-<file path=ppt/slides/slide7.xml><?xml version="1.0" encoding="utf-8"?>
-<p:sld xmlns:a="http://schemas.openxmlformats.org/drawingml/2006/main" xmlns:r="http://schemas.openxmlformats.org/officeDocument/2006/relationships" xmlns:p="http://schemas.openxmlformats.org/presentationml/2006/main">
-  <p:cSld>
-    <p:spTree>
-      <p:nvGrpSpPr>
-        <p:cNvPr id="1" name=""/>
-        <p:cNvGrpSpPr/>
-        <p:nvPr/>
-      </p:nvGrpSpPr>
-      <p:grpSpPr>
-        <a:xfrm>
-          <a:off x="0" y="0"/>
-          <a:ext cx="0" cy="0"/>
-          <a:chOff x="0" y="0"/>
-          <a:chExt cx="0" cy="0"/>
-        </a:xfrm>
-      </p:grpSpPr>
-      <p:sp>
-        <p:nvSpPr>
-          <p:cNvPr id="2" name="Title 1"/>
-          <p:cNvSpPr>
-            <a:spLocks noGrp="1"/>
-          </p:cNvSpPr>
-          <p:nvPr>
-            <p:ph type="title"/>
-          </p:nvPr>
-        </p:nvSpPr>
-        <p:spPr/>
-        <p:txBody>
-          <a:bodyPr/>
-          <a:lstStyle/>
-          <a:p>
-            <a:r>
-              <a:rPr lang="en-US" dirty="0" smtClean="0"/>
-              <a:t>DOM</a:t>
-            </a:r>
-            <a:endParaRPr lang="en-US" dirty="0"/>
-          </a:p>
-        </p:txBody>
-      </p:sp>
       <p:pic>
         <p:nvPicPr>
           <p:cNvPr id="4" name="Content Placeholder 3"/>
@@ -7853,7 +9092,7 @@
           <a:blip r:embed="rId2">
             <a:extLst>
               <a:ext uri="{28A0092B-C50C-407E-A947-70E740481C1C}">
-                <a14:useLocalDpi xmlns:a14="http://schemas.microsoft.com/office/drawing/2010/main" xmlns="" val="0"/>
+                <a14:useLocalDpi xmlns:a14="http://schemas.microsoft.com/office/drawing/2010/main" val="0"/>
               </a:ext>
             </a:extLst>
           </a:blip>
@@ -7880,7 +9119,7 @@
           <a:blip r:embed="rId3">
             <a:extLst>
               <a:ext uri="{28A0092B-C50C-407E-A947-70E740481C1C}">
-                <a14:useLocalDpi xmlns:a14="http://schemas.microsoft.com/office/drawing/2010/main" xmlns="" val="0"/>
+                <a14:useLocalDpi xmlns:a14="http://schemas.microsoft.com/office/drawing/2010/main" val="0"/>
               </a:ext>
             </a:extLst>
           </a:blip>
@@ -7901,13 +9140,141 @@
     </p:spTree>
     <p:extLst>
       <p:ext uri="{BB962C8B-B14F-4D97-AF65-F5344CB8AC3E}">
-        <p14:creationId xmlns:p14="http://schemas.microsoft.com/office/powerpoint/2010/main" xmlns="" val="3606670478"/>
+        <p14:creationId xmlns:p14="http://schemas.microsoft.com/office/powerpoint/2010/main" val="3606670478"/>
       </p:ext>
     </p:extLst>
   </p:cSld>
   <p:clrMapOvr>
     <a:masterClrMapping/>
   </p:clrMapOvr>
+  <p:timing>
+    <p:tnLst>
+      <p:par>
+        <p:cTn id="1" dur="indefinite" restart="never" nodeType="tmRoot"/>
+      </p:par>
+    </p:tnLst>
+  </p:timing>
+</p:sld>
+</file>
+
+<file path=ppt/slides/slide7.xml><?xml version="1.0" encoding="utf-8"?>
+<p:sld xmlns:a="http://schemas.openxmlformats.org/drawingml/2006/main" xmlns:r="http://schemas.openxmlformats.org/officeDocument/2006/relationships" xmlns:p="http://schemas.openxmlformats.org/presentationml/2006/main">
+  <p:cSld>
+    <p:spTree>
+      <p:nvGrpSpPr>
+        <p:cNvPr id="1" name=""/>
+        <p:cNvGrpSpPr/>
+        <p:nvPr/>
+      </p:nvGrpSpPr>
+      <p:grpSpPr>
+        <a:xfrm>
+          <a:off x="0" y="0"/>
+          <a:ext cx="0" cy="0"/>
+          <a:chOff x="0" y="0"/>
+          <a:chExt cx="0" cy="0"/>
+        </a:xfrm>
+      </p:grpSpPr>
+      <p:sp>
+        <p:nvSpPr>
+          <p:cNvPr id="2" name="Title 1"/>
+          <p:cNvSpPr>
+            <a:spLocks noGrp="1"/>
+          </p:cNvSpPr>
+          <p:nvPr>
+            <p:ph type="title"/>
+          </p:nvPr>
+        </p:nvSpPr>
+        <p:spPr/>
+        <p:txBody>
+          <a:bodyPr/>
+          <a:lstStyle/>
+          <a:p>
+            <a:r>
+              <a:rPr lang="en-US" dirty="0" smtClean="0"/>
+              <a:t>DOM</a:t>
+            </a:r>
+            <a:endParaRPr lang="en-US" dirty="0"/>
+          </a:p>
+        </p:txBody>
+      </p:sp>
+      <p:sp>
+        <p:nvSpPr>
+          <p:cNvPr id="3" name="Content Placeholder 2"/>
+          <p:cNvSpPr>
+            <a:spLocks noGrp="1"/>
+          </p:cNvSpPr>
+          <p:nvPr>
+            <p:ph idx="1"/>
+          </p:nvPr>
+        </p:nvSpPr>
+        <p:spPr/>
+        <p:txBody>
+          <a:bodyPr/>
+          <a:lstStyle/>
+          <a:p>
+            <a:r>
+              <a:rPr lang="en-US" dirty="0" smtClean="0"/>
+              <a:t>Document Object Model</a:t>
+            </a:r>
+          </a:p>
+          <a:p>
+            <a:pPr lvl="1"/>
+            <a:r>
+              <a:rPr lang="en-US" dirty="0"/>
+              <a:t>Web browsers rely on layout engines to parse HTML into a </a:t>
+            </a:r>
+            <a:r>
+              <a:rPr lang="en-US" dirty="0" smtClean="0"/>
+              <a:t>DOM</a:t>
+            </a:r>
+          </a:p>
+          <a:p>
+            <a:pPr lvl="1"/>
+            <a:r>
+              <a:rPr lang="en-US" dirty="0"/>
+              <a:t>It is the object presentation of the HTML </a:t>
+            </a:r>
+            <a:r>
+              <a:rPr lang="en-US" dirty="0" smtClean="0"/>
+              <a:t>document</a:t>
+            </a:r>
+          </a:p>
+          <a:p>
+            <a:pPr lvl="1"/>
+            <a:r>
+              <a:rPr lang="en-US" dirty="0"/>
+              <a:t>The root of the tree is the "</a:t>
+            </a:r>
+            <a:r>
+              <a:rPr lang="en-US" u="sng" dirty="0">
+                <a:hlinkClick r:id="rId2"/>
+              </a:rPr>
+              <a:t>Document</a:t>
+            </a:r>
+            <a:r>
+              <a:rPr lang="en-US" dirty="0"/>
+              <a:t>" object.</a:t>
+            </a:r>
+          </a:p>
+        </p:txBody>
+      </p:sp>
+    </p:spTree>
+    <p:extLst>
+      <p:ext uri="{BB962C8B-B14F-4D97-AF65-F5344CB8AC3E}">
+        <p14:creationId xmlns:p14="http://schemas.microsoft.com/office/powerpoint/2010/main" val="2374592750"/>
+      </p:ext>
+    </p:extLst>
+  </p:cSld>
+  <p:clrMapOvr>
+    <a:masterClrMapping/>
+  </p:clrMapOvr>
+  <p:timing>
+    <p:tnLst>
+      <p:par>
+        <p:cTn id="1" dur="indefinite" restart="never" nodeType="tmRoot"/>
+      </p:par>
+    </p:tnLst>
+  </p:timing>
 </p:sld>
 </file>
 
@@ -7965,7 +9332,7 @@
           <a:blip r:embed="rId2">
             <a:extLst>
               <a:ext uri="{28A0092B-C50C-407E-A947-70E740481C1C}">
-                <a14:useLocalDpi xmlns:a14="http://schemas.microsoft.com/office/drawing/2010/main" xmlns="" val="0"/>
+                <a14:useLocalDpi xmlns:a14="http://schemas.microsoft.com/office/drawing/2010/main" val="0"/>
               </a:ext>
             </a:extLst>
           </a:blip>
@@ -8014,13 +9381,20 @@
     </p:spTree>
     <p:extLst>
       <p:ext uri="{BB962C8B-B14F-4D97-AF65-F5344CB8AC3E}">
-        <p14:creationId xmlns:p14="http://schemas.microsoft.com/office/powerpoint/2010/main" xmlns="" val="3150999363"/>
+        <p14:creationId xmlns:p14="http://schemas.microsoft.com/office/powerpoint/2010/main" val="3150999363"/>
       </p:ext>
     </p:extLst>
   </p:cSld>
   <p:clrMapOvr>
     <a:masterClrMapping/>
   </p:clrMapOvr>
+  <p:timing>
+    <p:tnLst>
+      <p:par>
+        <p:cTn id="1" dur="indefinite" restart="never" nodeType="tmRoot"/>
+      </p:par>
+    </p:tnLst>
+  </p:timing>
 </p:sld>
 </file>
 
@@ -8696,13 +10070,20 @@
     </p:spTree>
     <p:extLst>
       <p:ext uri="{BB962C8B-B14F-4D97-AF65-F5344CB8AC3E}">
-        <p14:creationId xmlns:p14="http://schemas.microsoft.com/office/powerpoint/2010/main" xmlns="" val="1704719681"/>
+        <p14:creationId xmlns:p14="http://schemas.microsoft.com/office/powerpoint/2010/main" val="1704719681"/>
       </p:ext>
     </p:extLst>
   </p:cSld>
   <p:clrMapOvr>
     <a:masterClrMapping/>
   </p:clrMapOvr>
+  <p:timing>
+    <p:tnLst>
+      <p:par>
+        <p:cTn id="1" dur="indefinite" restart="never" nodeType="tmRoot"/>
+      </p:par>
+    </p:tnLst>
+  </p:timing>
 </p:sld>
 </file>
 

</xml_diff>